<commit_message>
Design des VertretungsalarmScreens fast abgeschlossen
</commit_message>
<xml_diff>
--- a/doc/vertretungsalarm.pptx
+++ b/doc/vertretungsalarm.pptx
@@ -13,9 +13,11 @@
     <p:sldId id="257" r:id="rId7"/>
     <p:sldId id="262" r:id="rId8"/>
     <p:sldId id="261" r:id="rId9"/>
-    <p:sldId id="264" r:id="rId10"/>
-    <p:sldId id="266" r:id="rId11"/>
-    <p:sldId id="267" r:id="rId12"/>
+    <p:sldId id="268" r:id="rId10"/>
+    <p:sldId id="264" r:id="rId11"/>
+    <p:sldId id="269" r:id="rId12"/>
+    <p:sldId id="266" r:id="rId13"/>
+    <p:sldId id="267" r:id="rId14"/>
   </p:sldIdLst>
   <p:sldSz cx="12192000" cy="6858000"/>
   <p:notesSz cx="6858000" cy="9144000"/>
@@ -269,7 +271,7 @@
           <a:p>
             <a:fld id="{E4E225A6-F9C6-4B3F-A3A1-E1FDB84ED865}" type="datetimeFigureOut">
               <a:rPr lang="de-DE" smtClean="0"/>
-              <a:t>11.07.2019</a:t>
+              <a:t>15.08.2019</a:t>
             </a:fld>
             <a:endParaRPr lang="de-DE"/>
           </a:p>
@@ -557,7 +559,7 @@
           <a:p>
             <a:fld id="{E4E225A6-F9C6-4B3F-A3A1-E1FDB84ED865}" type="datetimeFigureOut">
               <a:rPr lang="de-DE" smtClean="0"/>
-              <a:t>11.07.2019</a:t>
+              <a:t>15.08.2019</a:t>
             </a:fld>
             <a:endParaRPr lang="de-DE"/>
           </a:p>
@@ -755,7 +757,7 @@
           <a:p>
             <a:fld id="{E4E225A6-F9C6-4B3F-A3A1-E1FDB84ED865}" type="datetimeFigureOut">
               <a:rPr lang="de-DE" smtClean="0"/>
-              <a:t>11.07.2019</a:t>
+              <a:t>15.08.2019</a:t>
             </a:fld>
             <a:endParaRPr lang="de-DE"/>
           </a:p>
@@ -963,7 +965,7 @@
           <a:p>
             <a:fld id="{E4E225A6-F9C6-4B3F-A3A1-E1FDB84ED865}" type="datetimeFigureOut">
               <a:rPr lang="de-DE" smtClean="0"/>
-              <a:t>11.07.2019</a:t>
+              <a:t>15.08.2019</a:t>
             </a:fld>
             <a:endParaRPr lang="de-DE"/>
           </a:p>
@@ -1161,7 +1163,7 @@
           <a:p>
             <a:fld id="{E4E225A6-F9C6-4B3F-A3A1-E1FDB84ED865}" type="datetimeFigureOut">
               <a:rPr lang="de-DE" smtClean="0"/>
-              <a:t>11.07.2019</a:t>
+              <a:t>15.08.2019</a:t>
             </a:fld>
             <a:endParaRPr lang="de-DE"/>
           </a:p>
@@ -1436,7 +1438,7 @@
           <a:p>
             <a:fld id="{E4E225A6-F9C6-4B3F-A3A1-E1FDB84ED865}" type="datetimeFigureOut">
               <a:rPr lang="de-DE" smtClean="0"/>
-              <a:t>11.07.2019</a:t>
+              <a:t>15.08.2019</a:t>
             </a:fld>
             <a:endParaRPr lang="de-DE"/>
           </a:p>
@@ -1701,7 +1703,7 @@
           <a:p>
             <a:fld id="{E4E225A6-F9C6-4B3F-A3A1-E1FDB84ED865}" type="datetimeFigureOut">
               <a:rPr lang="de-DE" smtClean="0"/>
-              <a:t>11.07.2019</a:t>
+              <a:t>15.08.2019</a:t>
             </a:fld>
             <a:endParaRPr lang="de-DE"/>
           </a:p>
@@ -2113,7 +2115,7 @@
           <a:p>
             <a:fld id="{E4E225A6-F9C6-4B3F-A3A1-E1FDB84ED865}" type="datetimeFigureOut">
               <a:rPr lang="de-DE" smtClean="0"/>
-              <a:t>11.07.2019</a:t>
+              <a:t>15.08.2019</a:t>
             </a:fld>
             <a:endParaRPr lang="de-DE"/>
           </a:p>
@@ -2254,7 +2256,7 @@
           <a:p>
             <a:fld id="{E4E225A6-F9C6-4B3F-A3A1-E1FDB84ED865}" type="datetimeFigureOut">
               <a:rPr lang="de-DE" smtClean="0"/>
-              <a:t>11.07.2019</a:t>
+              <a:t>15.08.2019</a:t>
             </a:fld>
             <a:endParaRPr lang="de-DE"/>
           </a:p>
@@ -2367,7 +2369,7 @@
           <a:p>
             <a:fld id="{E4E225A6-F9C6-4B3F-A3A1-E1FDB84ED865}" type="datetimeFigureOut">
               <a:rPr lang="de-DE" smtClean="0"/>
-              <a:t>11.07.2019</a:t>
+              <a:t>15.08.2019</a:t>
             </a:fld>
             <a:endParaRPr lang="de-DE"/>
           </a:p>
@@ -2814,7 +2816,7 @@
           <a:p>
             <a:fld id="{E4E225A6-F9C6-4B3F-A3A1-E1FDB84ED865}" type="datetimeFigureOut">
               <a:rPr lang="de-DE" smtClean="0"/>
-              <a:t>11.07.2019</a:t>
+              <a:t>15.08.2019</a:t>
             </a:fld>
             <a:endParaRPr lang="de-DE"/>
           </a:p>
@@ -3055,7 +3057,7 @@
           <a:p>
             <a:fld id="{E4E225A6-F9C6-4B3F-A3A1-E1FDB84ED865}" type="datetimeFigureOut">
               <a:rPr lang="de-DE" smtClean="0"/>
-              <a:t>11.07.2019</a:t>
+              <a:t>15.08.2019</a:t>
             </a:fld>
             <a:endParaRPr lang="de-DE"/>
           </a:p>
@@ -4404,6 +4406,2521 @@
 </file>
 
 <file path=ppt/slides/slide10.xml><?xml version="1.0" encoding="utf-8"?>
+<p:sld xmlns:a="http://schemas.openxmlformats.org/drawingml/2006/main" xmlns:r="http://schemas.openxmlformats.org/officeDocument/2006/relationships" xmlns:p="http://schemas.openxmlformats.org/presentationml/2006/main">
+  <p:cSld>
+    <p:spTree>
+      <p:nvGrpSpPr>
+        <p:cNvPr id="1" name=""/>
+        <p:cNvGrpSpPr/>
+        <p:nvPr/>
+      </p:nvGrpSpPr>
+      <p:grpSpPr>
+        <a:xfrm>
+          <a:off x="0" y="0"/>
+          <a:ext cx="0" cy="0"/>
+          <a:chOff x="0" y="0"/>
+          <a:chExt cx="0" cy="0"/>
+        </a:xfrm>
+      </p:grpSpPr>
+      <p:sp>
+        <p:nvSpPr>
+          <p:cNvPr id="3" name="Rechteck 2">
+            <a:extLst>
+              <a:ext uri="{FF2B5EF4-FFF2-40B4-BE49-F238E27FC236}">
+                <a16:creationId xmlns:a16="http://schemas.microsoft.com/office/drawing/2014/main" id="{04B5591F-5C9D-4870-8C8B-3D766540D435}"/>
+              </a:ext>
+            </a:extLst>
+          </p:cNvPr>
+          <p:cNvSpPr/>
+          <p:nvPr/>
+        </p:nvSpPr>
+        <p:spPr>
+          <a:xfrm>
+            <a:off x="4848225" y="907257"/>
+            <a:ext cx="2520000" cy="5044656"/>
+          </a:xfrm>
+          <a:prstGeom prst="rect">
+            <a:avLst/>
+          </a:prstGeom>
+          <a:solidFill>
+            <a:srgbClr val="ECE9FC"/>
+          </a:solidFill>
+          <a:ln>
+            <a:noFill/>
+          </a:ln>
+        </p:spPr>
+        <p:style>
+          <a:lnRef idx="2">
+            <a:schemeClr val="accent1">
+              <a:shade val="50000"/>
+            </a:schemeClr>
+          </a:lnRef>
+          <a:fillRef idx="1">
+            <a:schemeClr val="accent1"/>
+          </a:fillRef>
+          <a:effectRef idx="0">
+            <a:schemeClr val="accent1"/>
+          </a:effectRef>
+          <a:fontRef idx="minor">
+            <a:schemeClr val="lt1"/>
+          </a:fontRef>
+        </p:style>
+        <p:txBody>
+          <a:bodyPr rtlCol="0" anchor="ctr"/>
+          <a:lstStyle/>
+          <a:p>
+            <a:pPr algn="ctr"/>
+            <a:endParaRPr lang="de-DE" dirty="0"/>
+          </a:p>
+        </p:txBody>
+      </p:sp>
+      <p:sp>
+        <p:nvSpPr>
+          <p:cNvPr id="19" name="Rechteck 18">
+            <a:extLst>
+              <a:ext uri="{FF2B5EF4-FFF2-40B4-BE49-F238E27FC236}">
+                <a16:creationId xmlns:a16="http://schemas.microsoft.com/office/drawing/2014/main" id="{EE42C676-BC59-444A-9545-BE3962464E87}"/>
+              </a:ext>
+            </a:extLst>
+          </p:cNvPr>
+          <p:cNvSpPr/>
+          <p:nvPr/>
+        </p:nvSpPr>
+        <p:spPr>
+          <a:xfrm>
+            <a:off x="4765673" y="907257"/>
+            <a:ext cx="72000" cy="4953793"/>
+          </a:xfrm>
+          <a:prstGeom prst="rect">
+            <a:avLst/>
+          </a:prstGeom>
+          <a:ln w="9525">
+            <a:noFill/>
+          </a:ln>
+        </p:spPr>
+        <p:style>
+          <a:lnRef idx="2">
+            <a:schemeClr val="dk1">
+              <a:shade val="50000"/>
+            </a:schemeClr>
+          </a:lnRef>
+          <a:fillRef idx="1">
+            <a:schemeClr val="dk1"/>
+          </a:fillRef>
+          <a:effectRef idx="0">
+            <a:schemeClr val="dk1"/>
+          </a:effectRef>
+          <a:fontRef idx="minor">
+            <a:schemeClr val="lt1"/>
+          </a:fontRef>
+        </p:style>
+        <p:txBody>
+          <a:bodyPr rtlCol="0" anchor="ctr"/>
+          <a:lstStyle/>
+          <a:p>
+            <a:pPr algn="ctr"/>
+            <a:endParaRPr lang="de-DE"/>
+          </a:p>
+        </p:txBody>
+      </p:sp>
+      <p:sp>
+        <p:nvSpPr>
+          <p:cNvPr id="21" name="Textfeld 20">
+            <a:extLst>
+              <a:ext uri="{FF2B5EF4-FFF2-40B4-BE49-F238E27FC236}">
+                <a16:creationId xmlns:a16="http://schemas.microsoft.com/office/drawing/2014/main" id="{2F299FD6-9D17-4E28-A213-8A29F3F14238}"/>
+              </a:ext>
+            </a:extLst>
+          </p:cNvPr>
+          <p:cNvSpPr txBox="1"/>
+          <p:nvPr/>
+        </p:nvSpPr>
+        <p:spPr>
+          <a:xfrm>
+            <a:off x="4861527" y="2216737"/>
+            <a:ext cx="2468946" cy="553998"/>
+          </a:xfrm>
+          <a:prstGeom prst="rect">
+            <a:avLst/>
+          </a:prstGeom>
+          <a:noFill/>
+          <a:ln>
+            <a:noFill/>
+          </a:ln>
+        </p:spPr>
+        <p:txBody>
+          <a:bodyPr wrap="square" rtlCol="0">
+            <a:spAutoFit/>
+          </a:bodyPr>
+          <a:lstStyle/>
+          <a:p>
+            <a:pPr algn="ctr"/>
+            <a:r>
+              <a:rPr lang="de-DE" b="1" dirty="0">
+                <a:latin typeface="Roboto" panose="02000000000000000000" pitchFamily="2" charset="0"/>
+                <a:ea typeface="Roboto" panose="02000000000000000000" pitchFamily="2" charset="0"/>
+              </a:rPr>
+              <a:t>Montag, 1./2.</a:t>
+            </a:r>
+          </a:p>
+          <a:p>
+            <a:pPr algn="ctr"/>
+            <a:r>
+              <a:rPr lang="de-DE" sz="1200" dirty="0">
+                <a:latin typeface="Roboto Thin" panose="02000000000000000000" pitchFamily="2" charset="0"/>
+                <a:ea typeface="Roboto Thin" panose="02000000000000000000" pitchFamily="2" charset="0"/>
+              </a:rPr>
+              <a:t>Musik entfällt</a:t>
+            </a:r>
+          </a:p>
+        </p:txBody>
+      </p:sp>
+      <p:sp>
+        <p:nvSpPr>
+          <p:cNvPr id="6" name="Interaktive Schaltfläche: Leer 5">
+            <a:hlinkClick r:id="rId2" action="ppaction://hlinksldjump" highlightClick="1"/>
+            <a:extLst>
+              <a:ext uri="{FF2B5EF4-FFF2-40B4-BE49-F238E27FC236}">
+                <a16:creationId xmlns:a16="http://schemas.microsoft.com/office/drawing/2014/main" id="{3662B50A-95AF-44C8-9473-963260B379C7}"/>
+              </a:ext>
+            </a:extLst>
+          </p:cNvPr>
+          <p:cNvSpPr/>
+          <p:nvPr/>
+        </p:nvSpPr>
+        <p:spPr>
+          <a:xfrm>
+            <a:off x="4923400" y="996067"/>
+            <a:ext cx="360000" cy="360000"/>
+          </a:xfrm>
+          <a:prstGeom prst="actionButtonBlank">
+            <a:avLst/>
+          </a:prstGeom>
+          <a:blipFill dpi="0" rotWithShape="1">
+            <a:blip r:embed="rId3">
+              <a:extLst>
+                <a:ext uri="{28A0092B-C50C-407E-A947-70E740481C1C}">
+                  <a14:useLocalDpi xmlns:a14="http://schemas.microsoft.com/office/drawing/2010/main" val="0"/>
+                </a:ext>
+              </a:extLst>
+            </a:blip>
+            <a:srcRect/>
+            <a:stretch>
+              <a:fillRect/>
+            </a:stretch>
+          </a:blipFill>
+          <a:ln>
+            <a:noFill/>
+          </a:ln>
+        </p:spPr>
+        <p:style>
+          <a:lnRef idx="2">
+            <a:schemeClr val="accent1">
+              <a:shade val="50000"/>
+            </a:schemeClr>
+          </a:lnRef>
+          <a:fillRef idx="1">
+            <a:schemeClr val="accent1"/>
+          </a:fillRef>
+          <a:effectRef idx="0">
+            <a:schemeClr val="accent1"/>
+          </a:effectRef>
+          <a:fontRef idx="minor">
+            <a:schemeClr val="lt1"/>
+          </a:fontRef>
+        </p:style>
+        <p:txBody>
+          <a:bodyPr rtlCol="0" anchor="ctr"/>
+          <a:lstStyle/>
+          <a:p>
+            <a:pPr algn="ctr"/>
+            <a:endParaRPr lang="de-DE"/>
+          </a:p>
+        </p:txBody>
+      </p:sp>
+      <p:grpSp>
+        <p:nvGrpSpPr>
+          <p:cNvPr id="7" name="Gruppieren 6">
+            <a:extLst>
+              <a:ext uri="{FF2B5EF4-FFF2-40B4-BE49-F238E27FC236}">
+                <a16:creationId xmlns:a16="http://schemas.microsoft.com/office/drawing/2014/main" id="{B12105FB-DB5D-46E8-BD0E-AD84D49102E3}"/>
+              </a:ext>
+            </a:extLst>
+          </p:cNvPr>
+          <p:cNvGrpSpPr>
+            <a:grpSpLocks noChangeAspect="1"/>
+          </p:cNvGrpSpPr>
+          <p:nvPr/>
+        </p:nvGrpSpPr>
+        <p:grpSpPr>
+          <a:xfrm rot="477621">
+            <a:off x="4610193" y="3782306"/>
+            <a:ext cx="3289602" cy="2251646"/>
+            <a:chOff x="4162538" y="1754812"/>
+            <a:chExt cx="5208401" cy="3565012"/>
+          </a:xfrm>
+        </p:grpSpPr>
+        <p:sp>
+          <p:nvSpPr>
+            <p:cNvPr id="8" name="Rechteck: abgerundete Ecken 7">
+              <a:extLst>
+                <a:ext uri="{FF2B5EF4-FFF2-40B4-BE49-F238E27FC236}">
+                  <a16:creationId xmlns:a16="http://schemas.microsoft.com/office/drawing/2014/main" id="{49B38451-F86C-47B9-84DF-D1672673850F}"/>
+                </a:ext>
+              </a:extLst>
+            </p:cNvPr>
+            <p:cNvSpPr/>
+            <p:nvPr/>
+          </p:nvSpPr>
+          <p:spPr>
+            <a:xfrm rot="21113087">
+              <a:off x="4233616" y="1979945"/>
+              <a:ext cx="5046210" cy="3140403"/>
+            </a:xfrm>
+            <a:prstGeom prst="roundRect">
+              <a:avLst>
+                <a:gd name="adj" fmla="val 11051"/>
+              </a:avLst>
+            </a:prstGeom>
+            <a:solidFill>
+              <a:srgbClr val="ECE9FC"/>
+            </a:solidFill>
+            <a:ln w="76200" cap="rnd" cmpd="sng">
+              <a:solidFill>
+                <a:srgbClr val="D1DDF7"/>
+              </a:solidFill>
+              <a:round/>
+            </a:ln>
+          </p:spPr>
+          <p:style>
+            <a:lnRef idx="2">
+              <a:schemeClr val="accent1">
+                <a:shade val="50000"/>
+              </a:schemeClr>
+            </a:lnRef>
+            <a:fillRef idx="1">
+              <a:schemeClr val="accent1"/>
+            </a:fillRef>
+            <a:effectRef idx="0">
+              <a:schemeClr val="accent1"/>
+            </a:effectRef>
+            <a:fontRef idx="minor">
+              <a:schemeClr val="lt1"/>
+            </a:fontRef>
+          </p:style>
+          <p:txBody>
+            <a:bodyPr rtlCol="0" anchor="ctr"/>
+            <a:lstStyle/>
+            <a:p>
+              <a:pPr algn="ctr"/>
+              <a:endParaRPr lang="de-DE" dirty="0"/>
+            </a:p>
+          </p:txBody>
+        </p:sp>
+        <p:cxnSp>
+          <p:nvCxnSpPr>
+            <p:cNvPr id="9" name="Gerader Verbinder 8">
+              <a:extLst>
+                <a:ext uri="{FF2B5EF4-FFF2-40B4-BE49-F238E27FC236}">
+                  <a16:creationId xmlns:a16="http://schemas.microsoft.com/office/drawing/2014/main" id="{289E7F2E-5D03-433C-B606-2EB7ABAB13EA}"/>
+                </a:ext>
+              </a:extLst>
+            </p:cNvPr>
+            <p:cNvCxnSpPr>
+              <a:cxnSpLocks/>
+            </p:cNvCxnSpPr>
+            <p:nvPr/>
+          </p:nvCxnSpPr>
+          <p:spPr>
+            <a:xfrm>
+              <a:off x="5055783" y="2170954"/>
+              <a:ext cx="466437" cy="3148870"/>
+            </a:xfrm>
+            <a:prstGeom prst="line">
+              <a:avLst/>
+            </a:prstGeom>
+            <a:ln w="76200">
+              <a:solidFill>
+                <a:srgbClr val="D1DDF7"/>
+              </a:solidFill>
+            </a:ln>
+          </p:spPr>
+          <p:style>
+            <a:lnRef idx="1">
+              <a:schemeClr val="accent1"/>
+            </a:lnRef>
+            <a:fillRef idx="0">
+              <a:schemeClr val="accent1"/>
+            </a:fillRef>
+            <a:effectRef idx="0">
+              <a:schemeClr val="accent1"/>
+            </a:effectRef>
+            <a:fontRef idx="minor">
+              <a:schemeClr val="tx1"/>
+            </a:fontRef>
+          </p:style>
+        </p:cxnSp>
+        <p:grpSp>
+          <p:nvGrpSpPr>
+            <p:cNvPr id="10" name="Gruppieren 9">
+              <a:extLst>
+                <a:ext uri="{FF2B5EF4-FFF2-40B4-BE49-F238E27FC236}">
+                  <a16:creationId xmlns:a16="http://schemas.microsoft.com/office/drawing/2014/main" id="{555AC88B-9BD5-4ECD-8487-53C3065CA258}"/>
+                </a:ext>
+              </a:extLst>
+            </p:cNvPr>
+            <p:cNvGrpSpPr>
+              <a:grpSpLocks noChangeAspect="1"/>
+            </p:cNvGrpSpPr>
+            <p:nvPr/>
+          </p:nvGrpSpPr>
+          <p:grpSpPr>
+            <a:xfrm rot="21072129">
+              <a:off x="4687628" y="4597984"/>
+              <a:ext cx="539071" cy="557484"/>
+              <a:chOff x="2444024" y="1798320"/>
+              <a:chExt cx="626836" cy="648248"/>
+            </a:xfrm>
+          </p:grpSpPr>
+          <p:cxnSp>
+            <p:nvCxnSpPr>
+              <p:cNvPr id="28" name="Gerader Verbinder 27">
+                <a:extLst>
+                  <a:ext uri="{FF2B5EF4-FFF2-40B4-BE49-F238E27FC236}">
+                    <a16:creationId xmlns:a16="http://schemas.microsoft.com/office/drawing/2014/main" id="{AF9E1A41-B61E-4F00-8695-A32CF2239257}"/>
+                  </a:ext>
+                </a:extLst>
+              </p:cNvPr>
+              <p:cNvCxnSpPr>
+                <a:cxnSpLocks/>
+              </p:cNvCxnSpPr>
+              <p:nvPr/>
+            </p:nvCxnSpPr>
+            <p:spPr>
+              <a:xfrm flipV="1">
+                <a:off x="2444024" y="1798320"/>
+                <a:ext cx="626836" cy="648248"/>
+              </a:xfrm>
+              <a:prstGeom prst="line">
+                <a:avLst/>
+              </a:prstGeom>
+              <a:ln w="101600" cap="rnd">
+                <a:solidFill>
+                  <a:srgbClr val="CC3300"/>
+                </a:solidFill>
+                <a:bevel/>
+              </a:ln>
+            </p:spPr>
+            <p:style>
+              <a:lnRef idx="1">
+                <a:schemeClr val="dk1"/>
+              </a:lnRef>
+              <a:fillRef idx="0">
+                <a:schemeClr val="dk1"/>
+              </a:fillRef>
+              <a:effectRef idx="0">
+                <a:schemeClr val="dk1"/>
+              </a:effectRef>
+              <a:fontRef idx="minor">
+                <a:schemeClr val="tx1"/>
+              </a:fontRef>
+            </p:style>
+          </p:cxnSp>
+          <p:cxnSp>
+            <p:nvCxnSpPr>
+              <p:cNvPr id="29" name="Gerader Verbinder 28">
+                <a:extLst>
+                  <a:ext uri="{FF2B5EF4-FFF2-40B4-BE49-F238E27FC236}">
+                    <a16:creationId xmlns:a16="http://schemas.microsoft.com/office/drawing/2014/main" id="{0A24FB0E-98B8-49CA-BE64-DC5F60DEC3A9}"/>
+                  </a:ext>
+                </a:extLst>
+              </p:cNvPr>
+              <p:cNvCxnSpPr>
+                <a:cxnSpLocks/>
+              </p:cNvCxnSpPr>
+              <p:nvPr/>
+            </p:nvCxnSpPr>
+            <p:spPr>
+              <a:xfrm flipH="1" flipV="1">
+                <a:off x="2444024" y="1798320"/>
+                <a:ext cx="626836" cy="648248"/>
+              </a:xfrm>
+              <a:prstGeom prst="line">
+                <a:avLst/>
+              </a:prstGeom>
+              <a:ln w="101600" cap="rnd">
+                <a:solidFill>
+                  <a:srgbClr val="CC3300"/>
+                </a:solidFill>
+                <a:bevel/>
+              </a:ln>
+            </p:spPr>
+            <p:style>
+              <a:lnRef idx="1">
+                <a:schemeClr val="dk1"/>
+              </a:lnRef>
+              <a:fillRef idx="0">
+                <a:schemeClr val="dk1"/>
+              </a:fillRef>
+              <a:effectRef idx="0">
+                <a:schemeClr val="dk1"/>
+              </a:effectRef>
+              <a:fontRef idx="minor">
+                <a:schemeClr val="tx1"/>
+              </a:fontRef>
+            </p:style>
+          </p:cxnSp>
+        </p:grpSp>
+        <p:cxnSp>
+          <p:nvCxnSpPr>
+            <p:cNvPr id="11" name="Gerader Verbinder 10">
+              <a:extLst>
+                <a:ext uri="{FF2B5EF4-FFF2-40B4-BE49-F238E27FC236}">
+                  <a16:creationId xmlns:a16="http://schemas.microsoft.com/office/drawing/2014/main" id="{B103D0FC-111F-4168-A4CA-D754233ADA19}"/>
+                </a:ext>
+              </a:extLst>
+            </p:cNvPr>
+            <p:cNvCxnSpPr>
+              <a:cxnSpLocks/>
+            </p:cNvCxnSpPr>
+            <p:nvPr/>
+          </p:nvCxnSpPr>
+          <p:spPr>
+            <a:xfrm flipV="1">
+              <a:off x="4162538" y="2696959"/>
+              <a:ext cx="5020199" cy="757711"/>
+            </a:xfrm>
+            <a:prstGeom prst="line">
+              <a:avLst/>
+            </a:prstGeom>
+            <a:ln w="76200">
+              <a:solidFill>
+                <a:srgbClr val="D1DDF7"/>
+              </a:solidFill>
+            </a:ln>
+          </p:spPr>
+          <p:style>
+            <a:lnRef idx="1">
+              <a:schemeClr val="accent1"/>
+            </a:lnRef>
+            <a:fillRef idx="0">
+              <a:schemeClr val="accent1"/>
+            </a:fillRef>
+            <a:effectRef idx="0">
+              <a:schemeClr val="accent1"/>
+            </a:effectRef>
+            <a:fontRef idx="minor">
+              <a:schemeClr val="tx1"/>
+            </a:fontRef>
+          </p:style>
+        </p:cxnSp>
+        <p:cxnSp>
+          <p:nvCxnSpPr>
+            <p:cNvPr id="12" name="Gerader Verbinder 11">
+              <a:extLst>
+                <a:ext uri="{FF2B5EF4-FFF2-40B4-BE49-F238E27FC236}">
+                  <a16:creationId xmlns:a16="http://schemas.microsoft.com/office/drawing/2014/main" id="{35E76898-9553-4AA0-8FD8-11547D97BBB4}"/>
+                </a:ext>
+              </a:extLst>
+            </p:cNvPr>
+            <p:cNvCxnSpPr>
+              <a:cxnSpLocks/>
+            </p:cNvCxnSpPr>
+            <p:nvPr/>
+          </p:nvCxnSpPr>
+          <p:spPr>
+            <a:xfrm flipV="1">
+              <a:off x="4375261" y="3745389"/>
+              <a:ext cx="4995678" cy="712344"/>
+            </a:xfrm>
+            <a:prstGeom prst="line">
+              <a:avLst/>
+            </a:prstGeom>
+            <a:ln w="76200">
+              <a:solidFill>
+                <a:srgbClr val="D1DDF7"/>
+              </a:solidFill>
+            </a:ln>
+          </p:spPr>
+          <p:style>
+            <a:lnRef idx="1">
+              <a:schemeClr val="accent1"/>
+            </a:lnRef>
+            <a:fillRef idx="0">
+              <a:schemeClr val="accent1"/>
+            </a:fillRef>
+            <a:effectRef idx="0">
+              <a:schemeClr val="accent1"/>
+            </a:effectRef>
+            <a:fontRef idx="minor">
+              <a:schemeClr val="tx1"/>
+            </a:fontRef>
+          </p:style>
+        </p:cxnSp>
+        <p:cxnSp>
+          <p:nvCxnSpPr>
+            <p:cNvPr id="13" name="Gerader Verbinder 12">
+              <a:extLst>
+                <a:ext uri="{FF2B5EF4-FFF2-40B4-BE49-F238E27FC236}">
+                  <a16:creationId xmlns:a16="http://schemas.microsoft.com/office/drawing/2014/main" id="{9BB4B93B-5E88-4E60-9DAF-908393844C4E}"/>
+                </a:ext>
+              </a:extLst>
+            </p:cNvPr>
+            <p:cNvCxnSpPr>
+              <a:cxnSpLocks/>
+            </p:cNvCxnSpPr>
+            <p:nvPr/>
+          </p:nvCxnSpPr>
+          <p:spPr>
+            <a:xfrm>
+              <a:off x="6096000" y="1995668"/>
+              <a:ext cx="443312" cy="3108955"/>
+            </a:xfrm>
+            <a:prstGeom prst="line">
+              <a:avLst/>
+            </a:prstGeom>
+            <a:ln w="76200">
+              <a:solidFill>
+                <a:srgbClr val="D1DDF7"/>
+              </a:solidFill>
+            </a:ln>
+          </p:spPr>
+          <p:style>
+            <a:lnRef idx="1">
+              <a:schemeClr val="accent1"/>
+            </a:lnRef>
+            <a:fillRef idx="0">
+              <a:schemeClr val="accent1"/>
+            </a:fillRef>
+            <a:effectRef idx="0">
+              <a:schemeClr val="accent1"/>
+            </a:effectRef>
+            <a:fontRef idx="minor">
+              <a:schemeClr val="tx1"/>
+            </a:fontRef>
+          </p:style>
+        </p:cxnSp>
+        <p:cxnSp>
+          <p:nvCxnSpPr>
+            <p:cNvPr id="14" name="Gerader Verbinder 13">
+              <a:extLst>
+                <a:ext uri="{FF2B5EF4-FFF2-40B4-BE49-F238E27FC236}">
+                  <a16:creationId xmlns:a16="http://schemas.microsoft.com/office/drawing/2014/main" id="{786B4DFD-810C-4576-A57C-3D8271C77F55}"/>
+                </a:ext>
+              </a:extLst>
+            </p:cNvPr>
+            <p:cNvCxnSpPr>
+              <a:cxnSpLocks/>
+            </p:cNvCxnSpPr>
+            <p:nvPr/>
+          </p:nvCxnSpPr>
+          <p:spPr>
+            <a:xfrm>
+              <a:off x="8153309" y="1754812"/>
+              <a:ext cx="466437" cy="3148870"/>
+            </a:xfrm>
+            <a:prstGeom prst="line">
+              <a:avLst/>
+            </a:prstGeom>
+            <a:ln w="76200">
+              <a:solidFill>
+                <a:srgbClr val="D1DDF7"/>
+              </a:solidFill>
+            </a:ln>
+          </p:spPr>
+          <p:style>
+            <a:lnRef idx="1">
+              <a:schemeClr val="accent1"/>
+            </a:lnRef>
+            <a:fillRef idx="0">
+              <a:schemeClr val="accent1"/>
+            </a:fillRef>
+            <a:effectRef idx="0">
+              <a:schemeClr val="accent1"/>
+            </a:effectRef>
+            <a:fontRef idx="minor">
+              <a:schemeClr val="tx1"/>
+            </a:fontRef>
+          </p:style>
+        </p:cxnSp>
+        <p:cxnSp>
+          <p:nvCxnSpPr>
+            <p:cNvPr id="15" name="Gerader Verbinder 14">
+              <a:extLst>
+                <a:ext uri="{FF2B5EF4-FFF2-40B4-BE49-F238E27FC236}">
+                  <a16:creationId xmlns:a16="http://schemas.microsoft.com/office/drawing/2014/main" id="{A15D7ACF-5762-4C9B-B942-9C6D46095AF0}"/>
+                </a:ext>
+              </a:extLst>
+            </p:cNvPr>
+            <p:cNvCxnSpPr>
+              <a:cxnSpLocks/>
+            </p:cNvCxnSpPr>
+            <p:nvPr/>
+          </p:nvCxnSpPr>
+          <p:spPr>
+            <a:xfrm>
+              <a:off x="7113092" y="1930557"/>
+              <a:ext cx="466437" cy="3148870"/>
+            </a:xfrm>
+            <a:prstGeom prst="line">
+              <a:avLst/>
+            </a:prstGeom>
+            <a:ln w="76200">
+              <a:solidFill>
+                <a:srgbClr val="D1DDF7"/>
+              </a:solidFill>
+            </a:ln>
+          </p:spPr>
+          <p:style>
+            <a:lnRef idx="1">
+              <a:schemeClr val="accent1"/>
+            </a:lnRef>
+            <a:fillRef idx="0">
+              <a:schemeClr val="accent1"/>
+            </a:fillRef>
+            <a:effectRef idx="0">
+              <a:schemeClr val="accent1"/>
+            </a:effectRef>
+            <a:fontRef idx="minor">
+              <a:schemeClr val="tx1"/>
+            </a:fontRef>
+          </p:style>
+        </p:cxnSp>
+        <p:grpSp>
+          <p:nvGrpSpPr>
+            <p:cNvPr id="16" name="Gruppieren 15">
+              <a:extLst>
+                <a:ext uri="{FF2B5EF4-FFF2-40B4-BE49-F238E27FC236}">
+                  <a16:creationId xmlns:a16="http://schemas.microsoft.com/office/drawing/2014/main" id="{581F6313-8046-4F0F-92D3-FE436463C8DE}"/>
+                </a:ext>
+              </a:extLst>
+            </p:cNvPr>
+            <p:cNvGrpSpPr>
+              <a:grpSpLocks noChangeAspect="1"/>
+            </p:cNvGrpSpPr>
+            <p:nvPr/>
+          </p:nvGrpSpPr>
+          <p:grpSpPr>
+            <a:xfrm rot="21072129">
+              <a:off x="5391697" y="2389160"/>
+              <a:ext cx="539071" cy="557484"/>
+              <a:chOff x="2444024" y="1798320"/>
+              <a:chExt cx="626836" cy="648248"/>
+            </a:xfrm>
+          </p:grpSpPr>
+          <p:cxnSp>
+            <p:nvCxnSpPr>
+              <p:cNvPr id="26" name="Gerader Verbinder 25">
+                <a:extLst>
+                  <a:ext uri="{FF2B5EF4-FFF2-40B4-BE49-F238E27FC236}">
+                    <a16:creationId xmlns:a16="http://schemas.microsoft.com/office/drawing/2014/main" id="{F75A21BC-693A-4F4E-9495-1DD6A6C19025}"/>
+                  </a:ext>
+                </a:extLst>
+              </p:cNvPr>
+              <p:cNvCxnSpPr>
+                <a:cxnSpLocks/>
+              </p:cNvCxnSpPr>
+              <p:nvPr/>
+            </p:nvCxnSpPr>
+            <p:spPr>
+              <a:xfrm flipV="1">
+                <a:off x="2444024" y="1798320"/>
+                <a:ext cx="626836" cy="648248"/>
+              </a:xfrm>
+              <a:prstGeom prst="line">
+                <a:avLst/>
+              </a:prstGeom>
+              <a:ln w="101600" cap="rnd">
+                <a:solidFill>
+                  <a:srgbClr val="CC3300"/>
+                </a:solidFill>
+                <a:bevel/>
+              </a:ln>
+            </p:spPr>
+            <p:style>
+              <a:lnRef idx="1">
+                <a:schemeClr val="dk1"/>
+              </a:lnRef>
+              <a:fillRef idx="0">
+                <a:schemeClr val="dk1"/>
+              </a:fillRef>
+              <a:effectRef idx="0">
+                <a:schemeClr val="dk1"/>
+              </a:effectRef>
+              <a:fontRef idx="minor">
+                <a:schemeClr val="tx1"/>
+              </a:fontRef>
+            </p:style>
+          </p:cxnSp>
+          <p:cxnSp>
+            <p:nvCxnSpPr>
+              <p:cNvPr id="27" name="Gerader Verbinder 26">
+                <a:extLst>
+                  <a:ext uri="{FF2B5EF4-FFF2-40B4-BE49-F238E27FC236}">
+                    <a16:creationId xmlns:a16="http://schemas.microsoft.com/office/drawing/2014/main" id="{83EE3E92-8757-452D-8EEF-A727196F3E4B}"/>
+                  </a:ext>
+                </a:extLst>
+              </p:cNvPr>
+              <p:cNvCxnSpPr>
+                <a:cxnSpLocks/>
+              </p:cNvCxnSpPr>
+              <p:nvPr/>
+            </p:nvCxnSpPr>
+            <p:spPr>
+              <a:xfrm flipH="1" flipV="1">
+                <a:off x="2444024" y="1798320"/>
+                <a:ext cx="626836" cy="648248"/>
+              </a:xfrm>
+              <a:prstGeom prst="line">
+                <a:avLst/>
+              </a:prstGeom>
+              <a:ln w="101600" cap="rnd">
+                <a:solidFill>
+                  <a:srgbClr val="CC3300"/>
+                </a:solidFill>
+                <a:bevel/>
+              </a:ln>
+            </p:spPr>
+            <p:style>
+              <a:lnRef idx="1">
+                <a:schemeClr val="dk1"/>
+              </a:lnRef>
+              <a:fillRef idx="0">
+                <a:schemeClr val="dk1"/>
+              </a:fillRef>
+              <a:effectRef idx="0">
+                <a:schemeClr val="dk1"/>
+              </a:effectRef>
+              <a:fontRef idx="minor">
+                <a:schemeClr val="tx1"/>
+              </a:fontRef>
+            </p:style>
+          </p:cxnSp>
+        </p:grpSp>
+        <p:grpSp>
+          <p:nvGrpSpPr>
+            <p:cNvPr id="17" name="Gruppieren 16">
+              <a:extLst>
+                <a:ext uri="{FF2B5EF4-FFF2-40B4-BE49-F238E27FC236}">
+                  <a16:creationId xmlns:a16="http://schemas.microsoft.com/office/drawing/2014/main" id="{4131DFAD-045B-4974-84E2-F2D77A7F2650}"/>
+                </a:ext>
+              </a:extLst>
+            </p:cNvPr>
+            <p:cNvGrpSpPr>
+              <a:grpSpLocks noChangeAspect="1"/>
+            </p:cNvGrpSpPr>
+            <p:nvPr/>
+          </p:nvGrpSpPr>
+          <p:grpSpPr>
+            <a:xfrm rot="21072129">
+              <a:off x="7601109" y="3150557"/>
+              <a:ext cx="539071" cy="557484"/>
+              <a:chOff x="2444024" y="1798320"/>
+              <a:chExt cx="626836" cy="648248"/>
+            </a:xfrm>
+          </p:grpSpPr>
+          <p:cxnSp>
+            <p:nvCxnSpPr>
+              <p:cNvPr id="24" name="Gerader Verbinder 23">
+                <a:extLst>
+                  <a:ext uri="{FF2B5EF4-FFF2-40B4-BE49-F238E27FC236}">
+                    <a16:creationId xmlns:a16="http://schemas.microsoft.com/office/drawing/2014/main" id="{14BFBD2A-B849-4963-85C7-ED41374F37C6}"/>
+                  </a:ext>
+                </a:extLst>
+              </p:cNvPr>
+              <p:cNvCxnSpPr>
+                <a:cxnSpLocks/>
+              </p:cNvCxnSpPr>
+              <p:nvPr/>
+            </p:nvCxnSpPr>
+            <p:spPr>
+              <a:xfrm flipV="1">
+                <a:off x="2444024" y="1798320"/>
+                <a:ext cx="626836" cy="648248"/>
+              </a:xfrm>
+              <a:prstGeom prst="line">
+                <a:avLst/>
+              </a:prstGeom>
+              <a:ln w="101600" cap="rnd">
+                <a:solidFill>
+                  <a:srgbClr val="CC3300"/>
+                </a:solidFill>
+                <a:bevel/>
+              </a:ln>
+            </p:spPr>
+            <p:style>
+              <a:lnRef idx="1">
+                <a:schemeClr val="dk1"/>
+              </a:lnRef>
+              <a:fillRef idx="0">
+                <a:schemeClr val="dk1"/>
+              </a:fillRef>
+              <a:effectRef idx="0">
+                <a:schemeClr val="dk1"/>
+              </a:effectRef>
+              <a:fontRef idx="minor">
+                <a:schemeClr val="tx1"/>
+              </a:fontRef>
+            </p:style>
+          </p:cxnSp>
+          <p:cxnSp>
+            <p:nvCxnSpPr>
+              <p:cNvPr id="25" name="Gerader Verbinder 24">
+                <a:extLst>
+                  <a:ext uri="{FF2B5EF4-FFF2-40B4-BE49-F238E27FC236}">
+                    <a16:creationId xmlns:a16="http://schemas.microsoft.com/office/drawing/2014/main" id="{3A58C809-E6B7-484D-9822-118182210796}"/>
+                  </a:ext>
+                </a:extLst>
+              </p:cNvPr>
+              <p:cNvCxnSpPr>
+                <a:cxnSpLocks/>
+              </p:cNvCxnSpPr>
+              <p:nvPr/>
+            </p:nvCxnSpPr>
+            <p:spPr>
+              <a:xfrm flipH="1" flipV="1">
+                <a:off x="2444024" y="1798320"/>
+                <a:ext cx="626836" cy="648248"/>
+              </a:xfrm>
+              <a:prstGeom prst="line">
+                <a:avLst/>
+              </a:prstGeom>
+              <a:ln w="101600" cap="rnd">
+                <a:solidFill>
+                  <a:srgbClr val="CC3300"/>
+                </a:solidFill>
+                <a:bevel/>
+              </a:ln>
+            </p:spPr>
+            <p:style>
+              <a:lnRef idx="1">
+                <a:schemeClr val="dk1"/>
+              </a:lnRef>
+              <a:fillRef idx="0">
+                <a:schemeClr val="dk1"/>
+              </a:fillRef>
+              <a:effectRef idx="0">
+                <a:schemeClr val="dk1"/>
+              </a:effectRef>
+              <a:fontRef idx="minor">
+                <a:schemeClr val="tx1"/>
+              </a:fontRef>
+            </p:style>
+          </p:cxnSp>
+        </p:grpSp>
+        <p:grpSp>
+          <p:nvGrpSpPr>
+            <p:cNvPr id="20" name="Gruppieren 19">
+              <a:extLst>
+                <a:ext uri="{FF2B5EF4-FFF2-40B4-BE49-F238E27FC236}">
+                  <a16:creationId xmlns:a16="http://schemas.microsoft.com/office/drawing/2014/main" id="{5235C111-A2A8-4349-80F4-8C1B23AD0518}"/>
+                </a:ext>
+              </a:extLst>
+            </p:cNvPr>
+            <p:cNvGrpSpPr>
+              <a:grpSpLocks noChangeAspect="1"/>
+            </p:cNvGrpSpPr>
+            <p:nvPr/>
+          </p:nvGrpSpPr>
+          <p:grpSpPr>
+            <a:xfrm rot="21072129">
+              <a:off x="6718305" y="4312671"/>
+              <a:ext cx="539071" cy="557484"/>
+              <a:chOff x="2444024" y="1798320"/>
+              <a:chExt cx="626836" cy="648248"/>
+            </a:xfrm>
+          </p:grpSpPr>
+          <p:cxnSp>
+            <p:nvCxnSpPr>
+              <p:cNvPr id="22" name="Gerader Verbinder 21">
+                <a:extLst>
+                  <a:ext uri="{FF2B5EF4-FFF2-40B4-BE49-F238E27FC236}">
+                    <a16:creationId xmlns:a16="http://schemas.microsoft.com/office/drawing/2014/main" id="{2540610C-D886-4FDB-8F68-194E05D8CB74}"/>
+                  </a:ext>
+                </a:extLst>
+              </p:cNvPr>
+              <p:cNvCxnSpPr>
+                <a:cxnSpLocks/>
+              </p:cNvCxnSpPr>
+              <p:nvPr/>
+            </p:nvCxnSpPr>
+            <p:spPr>
+              <a:xfrm flipV="1">
+                <a:off x="2444024" y="1798320"/>
+                <a:ext cx="626836" cy="648248"/>
+              </a:xfrm>
+              <a:prstGeom prst="line">
+                <a:avLst/>
+              </a:prstGeom>
+              <a:ln w="101600" cap="rnd">
+                <a:solidFill>
+                  <a:srgbClr val="CC3300"/>
+                </a:solidFill>
+                <a:bevel/>
+              </a:ln>
+            </p:spPr>
+            <p:style>
+              <a:lnRef idx="1">
+                <a:schemeClr val="dk1"/>
+              </a:lnRef>
+              <a:fillRef idx="0">
+                <a:schemeClr val="dk1"/>
+              </a:fillRef>
+              <a:effectRef idx="0">
+                <a:schemeClr val="dk1"/>
+              </a:effectRef>
+              <a:fontRef idx="minor">
+                <a:schemeClr val="tx1"/>
+              </a:fontRef>
+            </p:style>
+          </p:cxnSp>
+          <p:cxnSp>
+            <p:nvCxnSpPr>
+              <p:cNvPr id="23" name="Gerader Verbinder 22">
+                <a:extLst>
+                  <a:ext uri="{FF2B5EF4-FFF2-40B4-BE49-F238E27FC236}">
+                    <a16:creationId xmlns:a16="http://schemas.microsoft.com/office/drawing/2014/main" id="{6A441C0C-1D5D-423C-BBEE-D6ADD1E93B6C}"/>
+                  </a:ext>
+                </a:extLst>
+              </p:cNvPr>
+              <p:cNvCxnSpPr>
+                <a:cxnSpLocks/>
+              </p:cNvCxnSpPr>
+              <p:nvPr/>
+            </p:nvCxnSpPr>
+            <p:spPr>
+              <a:xfrm flipH="1" flipV="1">
+                <a:off x="2444024" y="1798320"/>
+                <a:ext cx="626836" cy="648248"/>
+              </a:xfrm>
+              <a:prstGeom prst="line">
+                <a:avLst/>
+              </a:prstGeom>
+              <a:ln w="101600" cap="rnd">
+                <a:solidFill>
+                  <a:srgbClr val="CC3300"/>
+                </a:solidFill>
+                <a:bevel/>
+              </a:ln>
+            </p:spPr>
+            <p:style>
+              <a:lnRef idx="1">
+                <a:schemeClr val="dk1"/>
+              </a:lnRef>
+              <a:fillRef idx="0">
+                <a:schemeClr val="dk1"/>
+              </a:fillRef>
+              <a:effectRef idx="0">
+                <a:schemeClr val="dk1"/>
+              </a:effectRef>
+              <a:fontRef idx="minor">
+                <a:schemeClr val="tx1"/>
+              </a:fontRef>
+            </p:style>
+          </p:cxnSp>
+        </p:grpSp>
+      </p:grpSp>
+      <p:sp>
+        <p:nvSpPr>
+          <p:cNvPr id="2" name="Interaktive Schaltfläche: Leer 1">
+            <a:hlinkClick r:id="rId4" action="ppaction://hlinksldjump" highlightClick="1"/>
+            <a:extLst>
+              <a:ext uri="{FF2B5EF4-FFF2-40B4-BE49-F238E27FC236}">
+                <a16:creationId xmlns:a16="http://schemas.microsoft.com/office/drawing/2014/main" id="{FF27FA7E-769F-4452-B32E-8870699F8523}"/>
+              </a:ext>
+            </a:extLst>
+          </p:cNvPr>
+          <p:cNvSpPr>
+            <a:spLocks noChangeAspect="1"/>
+          </p:cNvSpPr>
+          <p:nvPr/>
+        </p:nvSpPr>
+        <p:spPr>
+          <a:xfrm>
+            <a:off x="6903785" y="996067"/>
+            <a:ext cx="360000" cy="360000"/>
+          </a:xfrm>
+          <a:prstGeom prst="actionButtonBlank">
+            <a:avLst/>
+          </a:prstGeom>
+          <a:blipFill dpi="0" rotWithShape="1">
+            <a:blip r:embed="rId5">
+              <a:extLst>
+                <a:ext uri="{28A0092B-C50C-407E-A947-70E740481C1C}">
+                  <a14:useLocalDpi xmlns:a14="http://schemas.microsoft.com/office/drawing/2010/main" val="0"/>
+                </a:ext>
+                <a:ext uri="{837473B0-CC2E-450A-ABE3-18F120FF3D39}">
+                  <a1611:picAttrSrcUrl xmlns:a1611="http://schemas.microsoft.com/office/drawing/2016/11/main" r:id="rId6"/>
+                </a:ext>
+              </a:extLst>
+            </a:blip>
+            <a:srcRect/>
+            <a:stretch>
+              <a:fillRect/>
+            </a:stretch>
+          </a:blipFill>
+          <a:ln>
+            <a:noFill/>
+          </a:ln>
+        </p:spPr>
+        <p:style>
+          <a:lnRef idx="2">
+            <a:schemeClr val="accent1">
+              <a:shade val="50000"/>
+            </a:schemeClr>
+          </a:lnRef>
+          <a:fillRef idx="1">
+            <a:schemeClr val="accent1"/>
+          </a:fillRef>
+          <a:effectRef idx="0">
+            <a:schemeClr val="accent1"/>
+          </a:effectRef>
+          <a:fontRef idx="minor">
+            <a:schemeClr val="lt1"/>
+          </a:fontRef>
+        </p:style>
+        <p:txBody>
+          <a:bodyPr rtlCol="0" anchor="ctr"/>
+          <a:lstStyle/>
+          <a:p>
+            <a:pPr algn="ctr"/>
+            <a:endParaRPr lang="de-DE"/>
+          </a:p>
+        </p:txBody>
+      </p:sp>
+      <p:sp>
+        <p:nvSpPr>
+          <p:cNvPr id="4" name="Rechteck 3">
+            <a:extLst>
+              <a:ext uri="{FF2B5EF4-FFF2-40B4-BE49-F238E27FC236}">
+                <a16:creationId xmlns:a16="http://schemas.microsoft.com/office/drawing/2014/main" id="{3A3AEFB1-BB9C-4D3F-8C2B-D2304B0393C4}"/>
+              </a:ext>
+            </a:extLst>
+          </p:cNvPr>
+          <p:cNvSpPr/>
+          <p:nvPr/>
+        </p:nvSpPr>
+        <p:spPr>
+          <a:xfrm>
+            <a:off x="3543309" y="317409"/>
+            <a:ext cx="1200702" cy="5633333"/>
+          </a:xfrm>
+          <a:prstGeom prst="rect">
+            <a:avLst/>
+          </a:prstGeom>
+          <a:solidFill>
+            <a:schemeClr val="bg1"/>
+          </a:solidFill>
+          <a:ln>
+            <a:noFill/>
+          </a:ln>
+        </p:spPr>
+        <p:style>
+          <a:lnRef idx="2">
+            <a:schemeClr val="accent1">
+              <a:shade val="50000"/>
+            </a:schemeClr>
+          </a:lnRef>
+          <a:fillRef idx="1">
+            <a:schemeClr val="accent1"/>
+          </a:fillRef>
+          <a:effectRef idx="0">
+            <a:schemeClr val="accent1"/>
+          </a:effectRef>
+          <a:fontRef idx="minor">
+            <a:schemeClr val="lt1"/>
+          </a:fontRef>
+        </p:style>
+        <p:txBody>
+          <a:bodyPr rtlCol="0" anchor="ctr"/>
+          <a:lstStyle/>
+          <a:p>
+            <a:pPr algn="ctr"/>
+            <a:endParaRPr lang="de-DE"/>
+          </a:p>
+        </p:txBody>
+      </p:sp>
+      <p:sp>
+        <p:nvSpPr>
+          <p:cNvPr id="32" name="Rechteck 31">
+            <a:extLst>
+              <a:ext uri="{FF2B5EF4-FFF2-40B4-BE49-F238E27FC236}">
+                <a16:creationId xmlns:a16="http://schemas.microsoft.com/office/drawing/2014/main" id="{F8C4B1B2-D92B-4258-AED7-FB3F9E62E991}"/>
+              </a:ext>
+            </a:extLst>
+          </p:cNvPr>
+          <p:cNvSpPr/>
+          <p:nvPr/>
+        </p:nvSpPr>
+        <p:spPr>
+          <a:xfrm>
+            <a:off x="7439507" y="723333"/>
+            <a:ext cx="1200702" cy="5633333"/>
+          </a:xfrm>
+          <a:prstGeom prst="rect">
+            <a:avLst/>
+          </a:prstGeom>
+          <a:solidFill>
+            <a:schemeClr val="bg1"/>
+          </a:solidFill>
+          <a:ln>
+            <a:noFill/>
+          </a:ln>
+        </p:spPr>
+        <p:style>
+          <a:lnRef idx="2">
+            <a:schemeClr val="accent1">
+              <a:shade val="50000"/>
+            </a:schemeClr>
+          </a:lnRef>
+          <a:fillRef idx="1">
+            <a:schemeClr val="accent1"/>
+          </a:fillRef>
+          <a:effectRef idx="0">
+            <a:schemeClr val="accent1"/>
+          </a:effectRef>
+          <a:fontRef idx="minor">
+            <a:schemeClr val="lt1"/>
+          </a:fontRef>
+        </p:style>
+        <p:txBody>
+          <a:bodyPr rtlCol="0" anchor="ctr"/>
+          <a:lstStyle/>
+          <a:p>
+            <a:pPr algn="ctr"/>
+            <a:endParaRPr lang="de-DE"/>
+          </a:p>
+        </p:txBody>
+      </p:sp>
+      <p:sp>
+        <p:nvSpPr>
+          <p:cNvPr id="5" name="Rechteck 4">
+            <a:extLst>
+              <a:ext uri="{FF2B5EF4-FFF2-40B4-BE49-F238E27FC236}">
+                <a16:creationId xmlns:a16="http://schemas.microsoft.com/office/drawing/2014/main" id="{9A40B1A2-15CF-487B-A563-285F13DDC0E3}"/>
+              </a:ext>
+            </a:extLst>
+          </p:cNvPr>
+          <p:cNvSpPr/>
+          <p:nvPr/>
+        </p:nvSpPr>
+        <p:spPr>
+          <a:xfrm>
+            <a:off x="4754875" y="2654299"/>
+            <a:ext cx="95731" cy="3296443"/>
+          </a:xfrm>
+          <a:prstGeom prst="rect">
+            <a:avLst/>
+          </a:prstGeom>
+          <a:solidFill>
+            <a:schemeClr val="tx1"/>
+          </a:solidFill>
+          <a:ln>
+            <a:noFill/>
+          </a:ln>
+        </p:spPr>
+        <p:style>
+          <a:lnRef idx="2">
+            <a:schemeClr val="accent1">
+              <a:shade val="50000"/>
+            </a:schemeClr>
+          </a:lnRef>
+          <a:fillRef idx="1">
+            <a:schemeClr val="accent1"/>
+          </a:fillRef>
+          <a:effectRef idx="0">
+            <a:schemeClr val="accent1"/>
+          </a:effectRef>
+          <a:fontRef idx="minor">
+            <a:schemeClr val="lt1"/>
+          </a:fontRef>
+        </p:style>
+        <p:txBody>
+          <a:bodyPr rtlCol="0" anchor="ctr"/>
+          <a:lstStyle/>
+          <a:p>
+            <a:pPr algn="ctr"/>
+            <a:endParaRPr lang="de-DE"/>
+          </a:p>
+        </p:txBody>
+      </p:sp>
+      <p:sp>
+        <p:nvSpPr>
+          <p:cNvPr id="33" name="Rechteck 32">
+            <a:extLst>
+              <a:ext uri="{FF2B5EF4-FFF2-40B4-BE49-F238E27FC236}">
+                <a16:creationId xmlns:a16="http://schemas.microsoft.com/office/drawing/2014/main" id="{4EB7B10F-210F-464C-8431-DB63B36D5E45}"/>
+              </a:ext>
+            </a:extLst>
+          </p:cNvPr>
+          <p:cNvSpPr/>
+          <p:nvPr/>
+        </p:nvSpPr>
+        <p:spPr>
+          <a:xfrm>
+            <a:off x="7366934" y="2645597"/>
+            <a:ext cx="72573" cy="3296443"/>
+          </a:xfrm>
+          <a:prstGeom prst="rect">
+            <a:avLst/>
+          </a:prstGeom>
+          <a:solidFill>
+            <a:schemeClr val="tx1"/>
+          </a:solidFill>
+          <a:ln>
+            <a:noFill/>
+          </a:ln>
+        </p:spPr>
+        <p:style>
+          <a:lnRef idx="2">
+            <a:schemeClr val="accent1">
+              <a:shade val="50000"/>
+            </a:schemeClr>
+          </a:lnRef>
+          <a:fillRef idx="1">
+            <a:schemeClr val="accent1"/>
+          </a:fillRef>
+          <a:effectRef idx="0">
+            <a:schemeClr val="accent1"/>
+          </a:effectRef>
+          <a:fontRef idx="minor">
+            <a:schemeClr val="lt1"/>
+          </a:fontRef>
+        </p:style>
+        <p:txBody>
+          <a:bodyPr rtlCol="0" anchor="ctr"/>
+          <a:lstStyle/>
+          <a:p>
+            <a:pPr algn="ctr"/>
+            <a:endParaRPr lang="de-DE"/>
+          </a:p>
+        </p:txBody>
+      </p:sp>
+      <p:cxnSp>
+        <p:nvCxnSpPr>
+          <p:cNvPr id="30" name="Gerader Verbinder 29">
+            <a:extLst>
+              <a:ext uri="{FF2B5EF4-FFF2-40B4-BE49-F238E27FC236}">
+                <a16:creationId xmlns:a16="http://schemas.microsoft.com/office/drawing/2014/main" id="{C782E794-B439-4152-AF69-BB0DF1D58107}"/>
+              </a:ext>
+            </a:extLst>
+          </p:cNvPr>
+          <p:cNvCxnSpPr>
+            <a:cxnSpLocks/>
+          </p:cNvCxnSpPr>
+          <p:nvPr/>
+        </p:nvCxnSpPr>
+        <p:spPr>
+          <a:xfrm>
+            <a:off x="5005932" y="2832238"/>
+            <a:ext cx="2215529" cy="0"/>
+          </a:xfrm>
+          <a:prstGeom prst="line">
+            <a:avLst/>
+          </a:prstGeom>
+        </p:spPr>
+        <p:style>
+          <a:lnRef idx="1">
+            <a:schemeClr val="dk1"/>
+          </a:lnRef>
+          <a:fillRef idx="0">
+            <a:schemeClr val="dk1"/>
+          </a:fillRef>
+          <a:effectRef idx="0">
+            <a:schemeClr val="dk1"/>
+          </a:effectRef>
+          <a:fontRef idx="minor">
+            <a:schemeClr val="tx1"/>
+          </a:fontRef>
+        </p:style>
+      </p:cxnSp>
+      <p:sp>
+        <p:nvSpPr>
+          <p:cNvPr id="34" name="Textfeld 33">
+            <a:extLst>
+              <a:ext uri="{FF2B5EF4-FFF2-40B4-BE49-F238E27FC236}">
+                <a16:creationId xmlns:a16="http://schemas.microsoft.com/office/drawing/2014/main" id="{FFBAF696-D3DE-40F7-ABD5-30DE26882D4E}"/>
+              </a:ext>
+            </a:extLst>
+          </p:cNvPr>
+          <p:cNvSpPr txBox="1"/>
+          <p:nvPr/>
+        </p:nvSpPr>
+        <p:spPr>
+          <a:xfrm>
+            <a:off x="4885055" y="2888460"/>
+            <a:ext cx="2468946" cy="553998"/>
+          </a:xfrm>
+          <a:prstGeom prst="rect">
+            <a:avLst/>
+          </a:prstGeom>
+          <a:noFill/>
+          <a:ln>
+            <a:noFill/>
+          </a:ln>
+        </p:spPr>
+        <p:txBody>
+          <a:bodyPr wrap="square" rtlCol="0">
+            <a:spAutoFit/>
+          </a:bodyPr>
+          <a:lstStyle/>
+          <a:p>
+            <a:pPr algn="ctr"/>
+            <a:r>
+              <a:rPr lang="de-DE" b="1" dirty="0">
+                <a:latin typeface="Roboto" panose="02000000000000000000" pitchFamily="2" charset="0"/>
+                <a:ea typeface="Roboto" panose="02000000000000000000" pitchFamily="2" charset="0"/>
+              </a:rPr>
+              <a:t>Mittwoch, 3./4.</a:t>
+            </a:r>
+          </a:p>
+          <a:p>
+            <a:pPr algn="ctr"/>
+            <a:r>
+              <a:rPr lang="de-DE" sz="1200" dirty="0">
+                <a:latin typeface="Roboto Thin" panose="02000000000000000000" pitchFamily="2" charset="0"/>
+                <a:ea typeface="Roboto Thin" panose="02000000000000000000" pitchFamily="2" charset="0"/>
+              </a:rPr>
+              <a:t>Physik bei DY statt Mathe</a:t>
+            </a:r>
+          </a:p>
+        </p:txBody>
+      </p:sp>
+    </p:spTree>
+    <p:extLst>
+      <p:ext uri="{BB962C8B-B14F-4D97-AF65-F5344CB8AC3E}">
+        <p14:creationId xmlns:p14="http://schemas.microsoft.com/office/powerpoint/2010/main" val="3462233811"/>
+      </p:ext>
+    </p:extLst>
+  </p:cSld>
+  <p:clrMapOvr>
+    <a:masterClrMapping/>
+  </p:clrMapOvr>
+</p:sld>
+</file>
+
+<file path=ppt/slides/slide11.xml><?xml version="1.0" encoding="utf-8"?>
+<p:sld xmlns:a="http://schemas.openxmlformats.org/drawingml/2006/main" xmlns:r="http://schemas.openxmlformats.org/officeDocument/2006/relationships" xmlns:p="http://schemas.openxmlformats.org/presentationml/2006/main">
+  <p:cSld>
+    <p:spTree>
+      <p:nvGrpSpPr>
+        <p:cNvPr id="1" name=""/>
+        <p:cNvGrpSpPr/>
+        <p:nvPr/>
+      </p:nvGrpSpPr>
+      <p:grpSpPr>
+        <a:xfrm>
+          <a:off x="0" y="0"/>
+          <a:ext cx="0" cy="0"/>
+          <a:chOff x="0" y="0"/>
+          <a:chExt cx="0" cy="0"/>
+        </a:xfrm>
+      </p:grpSpPr>
+      <p:sp>
+        <p:nvSpPr>
+          <p:cNvPr id="3" name="Rechteck 2">
+            <a:extLst>
+              <a:ext uri="{FF2B5EF4-FFF2-40B4-BE49-F238E27FC236}">
+                <a16:creationId xmlns:a16="http://schemas.microsoft.com/office/drawing/2014/main" id="{04B5591F-5C9D-4870-8C8B-3D766540D435}"/>
+              </a:ext>
+            </a:extLst>
+          </p:cNvPr>
+          <p:cNvSpPr/>
+          <p:nvPr/>
+        </p:nvSpPr>
+        <p:spPr>
+          <a:xfrm>
+            <a:off x="4848225" y="907257"/>
+            <a:ext cx="2520000" cy="5044656"/>
+          </a:xfrm>
+          <a:prstGeom prst="rect">
+            <a:avLst/>
+          </a:prstGeom>
+          <a:solidFill>
+            <a:srgbClr val="ECE9FC"/>
+          </a:solidFill>
+          <a:ln>
+            <a:noFill/>
+          </a:ln>
+        </p:spPr>
+        <p:style>
+          <a:lnRef idx="2">
+            <a:schemeClr val="accent1">
+              <a:shade val="50000"/>
+            </a:schemeClr>
+          </a:lnRef>
+          <a:fillRef idx="1">
+            <a:schemeClr val="accent1"/>
+          </a:fillRef>
+          <a:effectRef idx="0">
+            <a:schemeClr val="accent1"/>
+          </a:effectRef>
+          <a:fontRef idx="minor">
+            <a:schemeClr val="lt1"/>
+          </a:fontRef>
+        </p:style>
+        <p:txBody>
+          <a:bodyPr rtlCol="0" anchor="ctr"/>
+          <a:lstStyle/>
+          <a:p>
+            <a:pPr algn="ctr"/>
+            <a:endParaRPr lang="de-DE" dirty="0"/>
+          </a:p>
+        </p:txBody>
+      </p:sp>
+      <p:sp>
+        <p:nvSpPr>
+          <p:cNvPr id="19" name="Rechteck 18">
+            <a:extLst>
+              <a:ext uri="{FF2B5EF4-FFF2-40B4-BE49-F238E27FC236}">
+                <a16:creationId xmlns:a16="http://schemas.microsoft.com/office/drawing/2014/main" id="{EE42C676-BC59-444A-9545-BE3962464E87}"/>
+              </a:ext>
+            </a:extLst>
+          </p:cNvPr>
+          <p:cNvSpPr/>
+          <p:nvPr/>
+        </p:nvSpPr>
+        <p:spPr>
+          <a:xfrm>
+            <a:off x="4765673" y="907257"/>
+            <a:ext cx="72000" cy="4953793"/>
+          </a:xfrm>
+          <a:prstGeom prst="rect">
+            <a:avLst/>
+          </a:prstGeom>
+          <a:ln w="9525">
+            <a:noFill/>
+          </a:ln>
+        </p:spPr>
+        <p:style>
+          <a:lnRef idx="2">
+            <a:schemeClr val="dk1">
+              <a:shade val="50000"/>
+            </a:schemeClr>
+          </a:lnRef>
+          <a:fillRef idx="1">
+            <a:schemeClr val="dk1"/>
+          </a:fillRef>
+          <a:effectRef idx="0">
+            <a:schemeClr val="dk1"/>
+          </a:effectRef>
+          <a:fontRef idx="minor">
+            <a:schemeClr val="lt1"/>
+          </a:fontRef>
+        </p:style>
+        <p:txBody>
+          <a:bodyPr rtlCol="0" anchor="ctr"/>
+          <a:lstStyle/>
+          <a:p>
+            <a:pPr algn="ctr"/>
+            <a:endParaRPr lang="de-DE"/>
+          </a:p>
+        </p:txBody>
+      </p:sp>
+      <p:grpSp>
+        <p:nvGrpSpPr>
+          <p:cNvPr id="7" name="Gruppieren 6">
+            <a:extLst>
+              <a:ext uri="{FF2B5EF4-FFF2-40B4-BE49-F238E27FC236}">
+                <a16:creationId xmlns:a16="http://schemas.microsoft.com/office/drawing/2014/main" id="{B12105FB-DB5D-46E8-BD0E-AD84D49102E3}"/>
+              </a:ext>
+            </a:extLst>
+          </p:cNvPr>
+          <p:cNvGrpSpPr>
+            <a:grpSpLocks noChangeAspect="1"/>
+          </p:cNvGrpSpPr>
+          <p:nvPr/>
+        </p:nvGrpSpPr>
+        <p:grpSpPr>
+          <a:xfrm rot="477621">
+            <a:off x="4610193" y="3782306"/>
+            <a:ext cx="3289602" cy="2251646"/>
+            <a:chOff x="4162538" y="1754812"/>
+            <a:chExt cx="5208401" cy="3565012"/>
+          </a:xfrm>
+        </p:grpSpPr>
+        <p:sp>
+          <p:nvSpPr>
+            <p:cNvPr id="8" name="Rechteck: abgerundete Ecken 7">
+              <a:extLst>
+                <a:ext uri="{FF2B5EF4-FFF2-40B4-BE49-F238E27FC236}">
+                  <a16:creationId xmlns:a16="http://schemas.microsoft.com/office/drawing/2014/main" id="{49B38451-F86C-47B9-84DF-D1672673850F}"/>
+                </a:ext>
+              </a:extLst>
+            </p:cNvPr>
+            <p:cNvSpPr/>
+            <p:nvPr/>
+          </p:nvSpPr>
+          <p:spPr>
+            <a:xfrm rot="21113087">
+              <a:off x="4233616" y="1979945"/>
+              <a:ext cx="5046210" cy="3140403"/>
+            </a:xfrm>
+            <a:prstGeom prst="roundRect">
+              <a:avLst>
+                <a:gd name="adj" fmla="val 11051"/>
+              </a:avLst>
+            </a:prstGeom>
+            <a:solidFill>
+              <a:srgbClr val="ECE9FC"/>
+            </a:solidFill>
+            <a:ln w="76200" cap="rnd" cmpd="sng">
+              <a:solidFill>
+                <a:srgbClr val="D1DDF7"/>
+              </a:solidFill>
+              <a:round/>
+            </a:ln>
+          </p:spPr>
+          <p:style>
+            <a:lnRef idx="2">
+              <a:schemeClr val="accent1">
+                <a:shade val="50000"/>
+              </a:schemeClr>
+            </a:lnRef>
+            <a:fillRef idx="1">
+              <a:schemeClr val="accent1"/>
+            </a:fillRef>
+            <a:effectRef idx="0">
+              <a:schemeClr val="accent1"/>
+            </a:effectRef>
+            <a:fontRef idx="minor">
+              <a:schemeClr val="lt1"/>
+            </a:fontRef>
+          </p:style>
+          <p:txBody>
+            <a:bodyPr rtlCol="0" anchor="ctr"/>
+            <a:lstStyle/>
+            <a:p>
+              <a:pPr algn="ctr"/>
+              <a:endParaRPr lang="de-DE" dirty="0"/>
+            </a:p>
+          </p:txBody>
+        </p:sp>
+        <p:cxnSp>
+          <p:nvCxnSpPr>
+            <p:cNvPr id="9" name="Gerader Verbinder 8">
+              <a:extLst>
+                <a:ext uri="{FF2B5EF4-FFF2-40B4-BE49-F238E27FC236}">
+                  <a16:creationId xmlns:a16="http://schemas.microsoft.com/office/drawing/2014/main" id="{289E7F2E-5D03-433C-B606-2EB7ABAB13EA}"/>
+                </a:ext>
+              </a:extLst>
+            </p:cNvPr>
+            <p:cNvCxnSpPr>
+              <a:cxnSpLocks/>
+            </p:cNvCxnSpPr>
+            <p:nvPr/>
+          </p:nvCxnSpPr>
+          <p:spPr>
+            <a:xfrm>
+              <a:off x="5055783" y="2170954"/>
+              <a:ext cx="466437" cy="3148870"/>
+            </a:xfrm>
+            <a:prstGeom prst="line">
+              <a:avLst/>
+            </a:prstGeom>
+            <a:ln w="76200">
+              <a:solidFill>
+                <a:srgbClr val="D1DDF7"/>
+              </a:solidFill>
+            </a:ln>
+          </p:spPr>
+          <p:style>
+            <a:lnRef idx="1">
+              <a:schemeClr val="accent1"/>
+            </a:lnRef>
+            <a:fillRef idx="0">
+              <a:schemeClr val="accent1"/>
+            </a:fillRef>
+            <a:effectRef idx="0">
+              <a:schemeClr val="accent1"/>
+            </a:effectRef>
+            <a:fontRef idx="minor">
+              <a:schemeClr val="tx1"/>
+            </a:fontRef>
+          </p:style>
+        </p:cxnSp>
+        <p:grpSp>
+          <p:nvGrpSpPr>
+            <p:cNvPr id="10" name="Gruppieren 9">
+              <a:extLst>
+                <a:ext uri="{FF2B5EF4-FFF2-40B4-BE49-F238E27FC236}">
+                  <a16:creationId xmlns:a16="http://schemas.microsoft.com/office/drawing/2014/main" id="{555AC88B-9BD5-4ECD-8487-53C3065CA258}"/>
+                </a:ext>
+              </a:extLst>
+            </p:cNvPr>
+            <p:cNvGrpSpPr>
+              <a:grpSpLocks noChangeAspect="1"/>
+            </p:cNvGrpSpPr>
+            <p:nvPr/>
+          </p:nvGrpSpPr>
+          <p:grpSpPr>
+            <a:xfrm rot="21072129">
+              <a:off x="4687628" y="4597984"/>
+              <a:ext cx="539071" cy="557484"/>
+              <a:chOff x="2444024" y="1798320"/>
+              <a:chExt cx="626836" cy="648248"/>
+            </a:xfrm>
+          </p:grpSpPr>
+          <p:cxnSp>
+            <p:nvCxnSpPr>
+              <p:cNvPr id="28" name="Gerader Verbinder 27">
+                <a:extLst>
+                  <a:ext uri="{FF2B5EF4-FFF2-40B4-BE49-F238E27FC236}">
+                    <a16:creationId xmlns:a16="http://schemas.microsoft.com/office/drawing/2014/main" id="{AF9E1A41-B61E-4F00-8695-A32CF2239257}"/>
+                  </a:ext>
+                </a:extLst>
+              </p:cNvPr>
+              <p:cNvCxnSpPr>
+                <a:cxnSpLocks/>
+              </p:cNvCxnSpPr>
+              <p:nvPr/>
+            </p:nvCxnSpPr>
+            <p:spPr>
+              <a:xfrm flipV="1">
+                <a:off x="2444024" y="1798320"/>
+                <a:ext cx="626836" cy="648248"/>
+              </a:xfrm>
+              <a:prstGeom prst="line">
+                <a:avLst/>
+              </a:prstGeom>
+              <a:ln w="101600" cap="rnd">
+                <a:solidFill>
+                  <a:srgbClr val="CC3300"/>
+                </a:solidFill>
+                <a:bevel/>
+              </a:ln>
+            </p:spPr>
+            <p:style>
+              <a:lnRef idx="1">
+                <a:schemeClr val="dk1"/>
+              </a:lnRef>
+              <a:fillRef idx="0">
+                <a:schemeClr val="dk1"/>
+              </a:fillRef>
+              <a:effectRef idx="0">
+                <a:schemeClr val="dk1"/>
+              </a:effectRef>
+              <a:fontRef idx="minor">
+                <a:schemeClr val="tx1"/>
+              </a:fontRef>
+            </p:style>
+          </p:cxnSp>
+          <p:cxnSp>
+            <p:nvCxnSpPr>
+              <p:cNvPr id="29" name="Gerader Verbinder 28">
+                <a:extLst>
+                  <a:ext uri="{FF2B5EF4-FFF2-40B4-BE49-F238E27FC236}">
+                    <a16:creationId xmlns:a16="http://schemas.microsoft.com/office/drawing/2014/main" id="{0A24FB0E-98B8-49CA-BE64-DC5F60DEC3A9}"/>
+                  </a:ext>
+                </a:extLst>
+              </p:cNvPr>
+              <p:cNvCxnSpPr>
+                <a:cxnSpLocks/>
+              </p:cNvCxnSpPr>
+              <p:nvPr/>
+            </p:nvCxnSpPr>
+            <p:spPr>
+              <a:xfrm flipH="1" flipV="1">
+                <a:off x="2444024" y="1798320"/>
+                <a:ext cx="626836" cy="648248"/>
+              </a:xfrm>
+              <a:prstGeom prst="line">
+                <a:avLst/>
+              </a:prstGeom>
+              <a:ln w="101600" cap="rnd">
+                <a:solidFill>
+                  <a:srgbClr val="CC3300"/>
+                </a:solidFill>
+                <a:bevel/>
+              </a:ln>
+            </p:spPr>
+            <p:style>
+              <a:lnRef idx="1">
+                <a:schemeClr val="dk1"/>
+              </a:lnRef>
+              <a:fillRef idx="0">
+                <a:schemeClr val="dk1"/>
+              </a:fillRef>
+              <a:effectRef idx="0">
+                <a:schemeClr val="dk1"/>
+              </a:effectRef>
+              <a:fontRef idx="minor">
+                <a:schemeClr val="tx1"/>
+              </a:fontRef>
+            </p:style>
+          </p:cxnSp>
+        </p:grpSp>
+        <p:cxnSp>
+          <p:nvCxnSpPr>
+            <p:cNvPr id="11" name="Gerader Verbinder 10">
+              <a:extLst>
+                <a:ext uri="{FF2B5EF4-FFF2-40B4-BE49-F238E27FC236}">
+                  <a16:creationId xmlns:a16="http://schemas.microsoft.com/office/drawing/2014/main" id="{B103D0FC-111F-4168-A4CA-D754233ADA19}"/>
+                </a:ext>
+              </a:extLst>
+            </p:cNvPr>
+            <p:cNvCxnSpPr>
+              <a:cxnSpLocks/>
+            </p:cNvCxnSpPr>
+            <p:nvPr/>
+          </p:nvCxnSpPr>
+          <p:spPr>
+            <a:xfrm flipV="1">
+              <a:off x="4162538" y="2696959"/>
+              <a:ext cx="5020199" cy="757711"/>
+            </a:xfrm>
+            <a:prstGeom prst="line">
+              <a:avLst/>
+            </a:prstGeom>
+            <a:ln w="76200">
+              <a:solidFill>
+                <a:srgbClr val="D1DDF7"/>
+              </a:solidFill>
+            </a:ln>
+          </p:spPr>
+          <p:style>
+            <a:lnRef idx="1">
+              <a:schemeClr val="accent1"/>
+            </a:lnRef>
+            <a:fillRef idx="0">
+              <a:schemeClr val="accent1"/>
+            </a:fillRef>
+            <a:effectRef idx="0">
+              <a:schemeClr val="accent1"/>
+            </a:effectRef>
+            <a:fontRef idx="minor">
+              <a:schemeClr val="tx1"/>
+            </a:fontRef>
+          </p:style>
+        </p:cxnSp>
+        <p:cxnSp>
+          <p:nvCxnSpPr>
+            <p:cNvPr id="12" name="Gerader Verbinder 11">
+              <a:extLst>
+                <a:ext uri="{FF2B5EF4-FFF2-40B4-BE49-F238E27FC236}">
+                  <a16:creationId xmlns:a16="http://schemas.microsoft.com/office/drawing/2014/main" id="{35E76898-9553-4AA0-8FD8-11547D97BBB4}"/>
+                </a:ext>
+              </a:extLst>
+            </p:cNvPr>
+            <p:cNvCxnSpPr>
+              <a:cxnSpLocks/>
+            </p:cNvCxnSpPr>
+            <p:nvPr/>
+          </p:nvCxnSpPr>
+          <p:spPr>
+            <a:xfrm flipV="1">
+              <a:off x="4375261" y="3745389"/>
+              <a:ext cx="4995678" cy="712344"/>
+            </a:xfrm>
+            <a:prstGeom prst="line">
+              <a:avLst/>
+            </a:prstGeom>
+            <a:ln w="76200">
+              <a:solidFill>
+                <a:srgbClr val="D1DDF7"/>
+              </a:solidFill>
+            </a:ln>
+          </p:spPr>
+          <p:style>
+            <a:lnRef idx="1">
+              <a:schemeClr val="accent1"/>
+            </a:lnRef>
+            <a:fillRef idx="0">
+              <a:schemeClr val="accent1"/>
+            </a:fillRef>
+            <a:effectRef idx="0">
+              <a:schemeClr val="accent1"/>
+            </a:effectRef>
+            <a:fontRef idx="minor">
+              <a:schemeClr val="tx1"/>
+            </a:fontRef>
+          </p:style>
+        </p:cxnSp>
+        <p:cxnSp>
+          <p:nvCxnSpPr>
+            <p:cNvPr id="13" name="Gerader Verbinder 12">
+              <a:extLst>
+                <a:ext uri="{FF2B5EF4-FFF2-40B4-BE49-F238E27FC236}">
+                  <a16:creationId xmlns:a16="http://schemas.microsoft.com/office/drawing/2014/main" id="{9BB4B93B-5E88-4E60-9DAF-908393844C4E}"/>
+                </a:ext>
+              </a:extLst>
+            </p:cNvPr>
+            <p:cNvCxnSpPr>
+              <a:cxnSpLocks/>
+            </p:cNvCxnSpPr>
+            <p:nvPr/>
+          </p:nvCxnSpPr>
+          <p:spPr>
+            <a:xfrm>
+              <a:off x="6096000" y="1995668"/>
+              <a:ext cx="443312" cy="3108955"/>
+            </a:xfrm>
+            <a:prstGeom prst="line">
+              <a:avLst/>
+            </a:prstGeom>
+            <a:ln w="76200">
+              <a:solidFill>
+                <a:srgbClr val="D1DDF7"/>
+              </a:solidFill>
+            </a:ln>
+          </p:spPr>
+          <p:style>
+            <a:lnRef idx="1">
+              <a:schemeClr val="accent1"/>
+            </a:lnRef>
+            <a:fillRef idx="0">
+              <a:schemeClr val="accent1"/>
+            </a:fillRef>
+            <a:effectRef idx="0">
+              <a:schemeClr val="accent1"/>
+            </a:effectRef>
+            <a:fontRef idx="minor">
+              <a:schemeClr val="tx1"/>
+            </a:fontRef>
+          </p:style>
+        </p:cxnSp>
+        <p:cxnSp>
+          <p:nvCxnSpPr>
+            <p:cNvPr id="14" name="Gerader Verbinder 13">
+              <a:extLst>
+                <a:ext uri="{FF2B5EF4-FFF2-40B4-BE49-F238E27FC236}">
+                  <a16:creationId xmlns:a16="http://schemas.microsoft.com/office/drawing/2014/main" id="{786B4DFD-810C-4576-A57C-3D8271C77F55}"/>
+                </a:ext>
+              </a:extLst>
+            </p:cNvPr>
+            <p:cNvCxnSpPr>
+              <a:cxnSpLocks/>
+            </p:cNvCxnSpPr>
+            <p:nvPr/>
+          </p:nvCxnSpPr>
+          <p:spPr>
+            <a:xfrm>
+              <a:off x="8153309" y="1754812"/>
+              <a:ext cx="466437" cy="3148870"/>
+            </a:xfrm>
+            <a:prstGeom prst="line">
+              <a:avLst/>
+            </a:prstGeom>
+            <a:ln w="76200">
+              <a:solidFill>
+                <a:srgbClr val="D1DDF7"/>
+              </a:solidFill>
+            </a:ln>
+          </p:spPr>
+          <p:style>
+            <a:lnRef idx="1">
+              <a:schemeClr val="accent1"/>
+            </a:lnRef>
+            <a:fillRef idx="0">
+              <a:schemeClr val="accent1"/>
+            </a:fillRef>
+            <a:effectRef idx="0">
+              <a:schemeClr val="accent1"/>
+            </a:effectRef>
+            <a:fontRef idx="minor">
+              <a:schemeClr val="tx1"/>
+            </a:fontRef>
+          </p:style>
+        </p:cxnSp>
+        <p:cxnSp>
+          <p:nvCxnSpPr>
+            <p:cNvPr id="15" name="Gerader Verbinder 14">
+              <a:extLst>
+                <a:ext uri="{FF2B5EF4-FFF2-40B4-BE49-F238E27FC236}">
+                  <a16:creationId xmlns:a16="http://schemas.microsoft.com/office/drawing/2014/main" id="{A15D7ACF-5762-4C9B-B942-9C6D46095AF0}"/>
+                </a:ext>
+              </a:extLst>
+            </p:cNvPr>
+            <p:cNvCxnSpPr>
+              <a:cxnSpLocks/>
+            </p:cNvCxnSpPr>
+            <p:nvPr/>
+          </p:nvCxnSpPr>
+          <p:spPr>
+            <a:xfrm>
+              <a:off x="7113092" y="1930557"/>
+              <a:ext cx="466437" cy="3148870"/>
+            </a:xfrm>
+            <a:prstGeom prst="line">
+              <a:avLst/>
+            </a:prstGeom>
+            <a:ln w="76200">
+              <a:solidFill>
+                <a:srgbClr val="D1DDF7"/>
+              </a:solidFill>
+            </a:ln>
+          </p:spPr>
+          <p:style>
+            <a:lnRef idx="1">
+              <a:schemeClr val="accent1"/>
+            </a:lnRef>
+            <a:fillRef idx="0">
+              <a:schemeClr val="accent1"/>
+            </a:fillRef>
+            <a:effectRef idx="0">
+              <a:schemeClr val="accent1"/>
+            </a:effectRef>
+            <a:fontRef idx="minor">
+              <a:schemeClr val="tx1"/>
+            </a:fontRef>
+          </p:style>
+        </p:cxnSp>
+        <p:grpSp>
+          <p:nvGrpSpPr>
+            <p:cNvPr id="16" name="Gruppieren 15">
+              <a:extLst>
+                <a:ext uri="{FF2B5EF4-FFF2-40B4-BE49-F238E27FC236}">
+                  <a16:creationId xmlns:a16="http://schemas.microsoft.com/office/drawing/2014/main" id="{581F6313-8046-4F0F-92D3-FE436463C8DE}"/>
+                </a:ext>
+              </a:extLst>
+            </p:cNvPr>
+            <p:cNvGrpSpPr>
+              <a:grpSpLocks noChangeAspect="1"/>
+            </p:cNvGrpSpPr>
+            <p:nvPr/>
+          </p:nvGrpSpPr>
+          <p:grpSpPr>
+            <a:xfrm rot="21072129">
+              <a:off x="5391697" y="2389160"/>
+              <a:ext cx="539071" cy="557484"/>
+              <a:chOff x="2444024" y="1798320"/>
+              <a:chExt cx="626836" cy="648248"/>
+            </a:xfrm>
+          </p:grpSpPr>
+          <p:cxnSp>
+            <p:nvCxnSpPr>
+              <p:cNvPr id="26" name="Gerader Verbinder 25">
+                <a:extLst>
+                  <a:ext uri="{FF2B5EF4-FFF2-40B4-BE49-F238E27FC236}">
+                    <a16:creationId xmlns:a16="http://schemas.microsoft.com/office/drawing/2014/main" id="{F75A21BC-693A-4F4E-9495-1DD6A6C19025}"/>
+                  </a:ext>
+                </a:extLst>
+              </p:cNvPr>
+              <p:cNvCxnSpPr>
+                <a:cxnSpLocks/>
+              </p:cNvCxnSpPr>
+              <p:nvPr/>
+            </p:nvCxnSpPr>
+            <p:spPr>
+              <a:xfrm flipV="1">
+                <a:off x="2444024" y="1798320"/>
+                <a:ext cx="626836" cy="648248"/>
+              </a:xfrm>
+              <a:prstGeom prst="line">
+                <a:avLst/>
+              </a:prstGeom>
+              <a:ln w="101600" cap="rnd">
+                <a:solidFill>
+                  <a:srgbClr val="CC3300"/>
+                </a:solidFill>
+                <a:bevel/>
+              </a:ln>
+            </p:spPr>
+            <p:style>
+              <a:lnRef idx="1">
+                <a:schemeClr val="dk1"/>
+              </a:lnRef>
+              <a:fillRef idx="0">
+                <a:schemeClr val="dk1"/>
+              </a:fillRef>
+              <a:effectRef idx="0">
+                <a:schemeClr val="dk1"/>
+              </a:effectRef>
+              <a:fontRef idx="minor">
+                <a:schemeClr val="tx1"/>
+              </a:fontRef>
+            </p:style>
+          </p:cxnSp>
+          <p:cxnSp>
+            <p:nvCxnSpPr>
+              <p:cNvPr id="27" name="Gerader Verbinder 26">
+                <a:extLst>
+                  <a:ext uri="{FF2B5EF4-FFF2-40B4-BE49-F238E27FC236}">
+                    <a16:creationId xmlns:a16="http://schemas.microsoft.com/office/drawing/2014/main" id="{83EE3E92-8757-452D-8EEF-A727196F3E4B}"/>
+                  </a:ext>
+                </a:extLst>
+              </p:cNvPr>
+              <p:cNvCxnSpPr>
+                <a:cxnSpLocks/>
+              </p:cNvCxnSpPr>
+              <p:nvPr/>
+            </p:nvCxnSpPr>
+            <p:spPr>
+              <a:xfrm flipH="1" flipV="1">
+                <a:off x="2444024" y="1798320"/>
+                <a:ext cx="626836" cy="648248"/>
+              </a:xfrm>
+              <a:prstGeom prst="line">
+                <a:avLst/>
+              </a:prstGeom>
+              <a:ln w="101600" cap="rnd">
+                <a:solidFill>
+                  <a:srgbClr val="CC3300"/>
+                </a:solidFill>
+                <a:bevel/>
+              </a:ln>
+            </p:spPr>
+            <p:style>
+              <a:lnRef idx="1">
+                <a:schemeClr val="dk1"/>
+              </a:lnRef>
+              <a:fillRef idx="0">
+                <a:schemeClr val="dk1"/>
+              </a:fillRef>
+              <a:effectRef idx="0">
+                <a:schemeClr val="dk1"/>
+              </a:effectRef>
+              <a:fontRef idx="minor">
+                <a:schemeClr val="tx1"/>
+              </a:fontRef>
+            </p:style>
+          </p:cxnSp>
+        </p:grpSp>
+        <p:grpSp>
+          <p:nvGrpSpPr>
+            <p:cNvPr id="17" name="Gruppieren 16">
+              <a:extLst>
+                <a:ext uri="{FF2B5EF4-FFF2-40B4-BE49-F238E27FC236}">
+                  <a16:creationId xmlns:a16="http://schemas.microsoft.com/office/drawing/2014/main" id="{4131DFAD-045B-4974-84E2-F2D77A7F2650}"/>
+                </a:ext>
+              </a:extLst>
+            </p:cNvPr>
+            <p:cNvGrpSpPr>
+              <a:grpSpLocks noChangeAspect="1"/>
+            </p:cNvGrpSpPr>
+            <p:nvPr/>
+          </p:nvGrpSpPr>
+          <p:grpSpPr>
+            <a:xfrm rot="21072129">
+              <a:off x="7601109" y="3150557"/>
+              <a:ext cx="539071" cy="557484"/>
+              <a:chOff x="2444024" y="1798320"/>
+              <a:chExt cx="626836" cy="648248"/>
+            </a:xfrm>
+          </p:grpSpPr>
+          <p:cxnSp>
+            <p:nvCxnSpPr>
+              <p:cNvPr id="24" name="Gerader Verbinder 23">
+                <a:extLst>
+                  <a:ext uri="{FF2B5EF4-FFF2-40B4-BE49-F238E27FC236}">
+                    <a16:creationId xmlns:a16="http://schemas.microsoft.com/office/drawing/2014/main" id="{14BFBD2A-B849-4963-85C7-ED41374F37C6}"/>
+                  </a:ext>
+                </a:extLst>
+              </p:cNvPr>
+              <p:cNvCxnSpPr>
+                <a:cxnSpLocks/>
+              </p:cNvCxnSpPr>
+              <p:nvPr/>
+            </p:nvCxnSpPr>
+            <p:spPr>
+              <a:xfrm flipV="1">
+                <a:off x="2444024" y="1798320"/>
+                <a:ext cx="626836" cy="648248"/>
+              </a:xfrm>
+              <a:prstGeom prst="line">
+                <a:avLst/>
+              </a:prstGeom>
+              <a:ln w="101600" cap="rnd">
+                <a:solidFill>
+                  <a:srgbClr val="CC3300"/>
+                </a:solidFill>
+                <a:bevel/>
+              </a:ln>
+            </p:spPr>
+            <p:style>
+              <a:lnRef idx="1">
+                <a:schemeClr val="dk1"/>
+              </a:lnRef>
+              <a:fillRef idx="0">
+                <a:schemeClr val="dk1"/>
+              </a:fillRef>
+              <a:effectRef idx="0">
+                <a:schemeClr val="dk1"/>
+              </a:effectRef>
+              <a:fontRef idx="minor">
+                <a:schemeClr val="tx1"/>
+              </a:fontRef>
+            </p:style>
+          </p:cxnSp>
+          <p:cxnSp>
+            <p:nvCxnSpPr>
+              <p:cNvPr id="25" name="Gerader Verbinder 24">
+                <a:extLst>
+                  <a:ext uri="{FF2B5EF4-FFF2-40B4-BE49-F238E27FC236}">
+                    <a16:creationId xmlns:a16="http://schemas.microsoft.com/office/drawing/2014/main" id="{3A58C809-E6B7-484D-9822-118182210796}"/>
+                  </a:ext>
+                </a:extLst>
+              </p:cNvPr>
+              <p:cNvCxnSpPr>
+                <a:cxnSpLocks/>
+              </p:cNvCxnSpPr>
+              <p:nvPr/>
+            </p:nvCxnSpPr>
+            <p:spPr>
+              <a:xfrm flipH="1" flipV="1">
+                <a:off x="2444024" y="1798320"/>
+                <a:ext cx="626836" cy="648248"/>
+              </a:xfrm>
+              <a:prstGeom prst="line">
+                <a:avLst/>
+              </a:prstGeom>
+              <a:ln w="101600" cap="rnd">
+                <a:solidFill>
+                  <a:srgbClr val="CC3300"/>
+                </a:solidFill>
+                <a:bevel/>
+              </a:ln>
+            </p:spPr>
+            <p:style>
+              <a:lnRef idx="1">
+                <a:schemeClr val="dk1"/>
+              </a:lnRef>
+              <a:fillRef idx="0">
+                <a:schemeClr val="dk1"/>
+              </a:fillRef>
+              <a:effectRef idx="0">
+                <a:schemeClr val="dk1"/>
+              </a:effectRef>
+              <a:fontRef idx="minor">
+                <a:schemeClr val="tx1"/>
+              </a:fontRef>
+            </p:style>
+          </p:cxnSp>
+        </p:grpSp>
+        <p:grpSp>
+          <p:nvGrpSpPr>
+            <p:cNvPr id="20" name="Gruppieren 19">
+              <a:extLst>
+                <a:ext uri="{FF2B5EF4-FFF2-40B4-BE49-F238E27FC236}">
+                  <a16:creationId xmlns:a16="http://schemas.microsoft.com/office/drawing/2014/main" id="{5235C111-A2A8-4349-80F4-8C1B23AD0518}"/>
+                </a:ext>
+              </a:extLst>
+            </p:cNvPr>
+            <p:cNvGrpSpPr>
+              <a:grpSpLocks noChangeAspect="1"/>
+            </p:cNvGrpSpPr>
+            <p:nvPr/>
+          </p:nvGrpSpPr>
+          <p:grpSpPr>
+            <a:xfrm rot="21072129">
+              <a:off x="6718305" y="4312671"/>
+              <a:ext cx="539071" cy="557484"/>
+              <a:chOff x="2444024" y="1798320"/>
+              <a:chExt cx="626836" cy="648248"/>
+            </a:xfrm>
+          </p:grpSpPr>
+          <p:cxnSp>
+            <p:nvCxnSpPr>
+              <p:cNvPr id="22" name="Gerader Verbinder 21">
+                <a:extLst>
+                  <a:ext uri="{FF2B5EF4-FFF2-40B4-BE49-F238E27FC236}">
+                    <a16:creationId xmlns:a16="http://schemas.microsoft.com/office/drawing/2014/main" id="{2540610C-D886-4FDB-8F68-194E05D8CB74}"/>
+                  </a:ext>
+                </a:extLst>
+              </p:cNvPr>
+              <p:cNvCxnSpPr>
+                <a:cxnSpLocks/>
+              </p:cNvCxnSpPr>
+              <p:nvPr/>
+            </p:nvCxnSpPr>
+            <p:spPr>
+              <a:xfrm flipV="1">
+                <a:off x="2444024" y="1798320"/>
+                <a:ext cx="626836" cy="648248"/>
+              </a:xfrm>
+              <a:prstGeom prst="line">
+                <a:avLst/>
+              </a:prstGeom>
+              <a:ln w="101600" cap="rnd">
+                <a:solidFill>
+                  <a:srgbClr val="CC3300"/>
+                </a:solidFill>
+                <a:bevel/>
+              </a:ln>
+            </p:spPr>
+            <p:style>
+              <a:lnRef idx="1">
+                <a:schemeClr val="dk1"/>
+              </a:lnRef>
+              <a:fillRef idx="0">
+                <a:schemeClr val="dk1"/>
+              </a:fillRef>
+              <a:effectRef idx="0">
+                <a:schemeClr val="dk1"/>
+              </a:effectRef>
+              <a:fontRef idx="minor">
+                <a:schemeClr val="tx1"/>
+              </a:fontRef>
+            </p:style>
+          </p:cxnSp>
+          <p:cxnSp>
+            <p:nvCxnSpPr>
+              <p:cNvPr id="23" name="Gerader Verbinder 22">
+                <a:extLst>
+                  <a:ext uri="{FF2B5EF4-FFF2-40B4-BE49-F238E27FC236}">
+                    <a16:creationId xmlns:a16="http://schemas.microsoft.com/office/drawing/2014/main" id="{6A441C0C-1D5D-423C-BBEE-D6ADD1E93B6C}"/>
+                  </a:ext>
+                </a:extLst>
+              </p:cNvPr>
+              <p:cNvCxnSpPr>
+                <a:cxnSpLocks/>
+              </p:cNvCxnSpPr>
+              <p:nvPr/>
+            </p:nvCxnSpPr>
+            <p:spPr>
+              <a:xfrm flipH="1" flipV="1">
+                <a:off x="2444024" y="1798320"/>
+                <a:ext cx="626836" cy="648248"/>
+              </a:xfrm>
+              <a:prstGeom prst="line">
+                <a:avLst/>
+              </a:prstGeom>
+              <a:ln w="101600" cap="rnd">
+                <a:solidFill>
+                  <a:srgbClr val="CC3300"/>
+                </a:solidFill>
+                <a:bevel/>
+              </a:ln>
+            </p:spPr>
+            <p:style>
+              <a:lnRef idx="1">
+                <a:schemeClr val="dk1"/>
+              </a:lnRef>
+              <a:fillRef idx="0">
+                <a:schemeClr val="dk1"/>
+              </a:fillRef>
+              <a:effectRef idx="0">
+                <a:schemeClr val="dk1"/>
+              </a:effectRef>
+              <a:fontRef idx="minor">
+                <a:schemeClr val="tx1"/>
+              </a:fontRef>
+            </p:style>
+          </p:cxnSp>
+        </p:grpSp>
+      </p:grpSp>
+      <p:sp>
+        <p:nvSpPr>
+          <p:cNvPr id="4" name="Rechteck 3">
+            <a:extLst>
+              <a:ext uri="{FF2B5EF4-FFF2-40B4-BE49-F238E27FC236}">
+                <a16:creationId xmlns:a16="http://schemas.microsoft.com/office/drawing/2014/main" id="{3A3AEFB1-BB9C-4D3F-8C2B-D2304B0393C4}"/>
+              </a:ext>
+            </a:extLst>
+          </p:cNvPr>
+          <p:cNvSpPr/>
+          <p:nvPr/>
+        </p:nvSpPr>
+        <p:spPr>
+          <a:xfrm>
+            <a:off x="3543309" y="317409"/>
+            <a:ext cx="1200702" cy="5633333"/>
+          </a:xfrm>
+          <a:prstGeom prst="rect">
+            <a:avLst/>
+          </a:prstGeom>
+          <a:solidFill>
+            <a:schemeClr val="bg1"/>
+          </a:solidFill>
+          <a:ln>
+            <a:noFill/>
+          </a:ln>
+        </p:spPr>
+        <p:style>
+          <a:lnRef idx="2">
+            <a:schemeClr val="accent1">
+              <a:shade val="50000"/>
+            </a:schemeClr>
+          </a:lnRef>
+          <a:fillRef idx="1">
+            <a:schemeClr val="accent1"/>
+          </a:fillRef>
+          <a:effectRef idx="0">
+            <a:schemeClr val="accent1"/>
+          </a:effectRef>
+          <a:fontRef idx="minor">
+            <a:schemeClr val="lt1"/>
+          </a:fontRef>
+        </p:style>
+        <p:txBody>
+          <a:bodyPr rtlCol="0" anchor="ctr"/>
+          <a:lstStyle/>
+          <a:p>
+            <a:pPr algn="ctr"/>
+            <a:endParaRPr lang="de-DE"/>
+          </a:p>
+        </p:txBody>
+      </p:sp>
+      <p:sp>
+        <p:nvSpPr>
+          <p:cNvPr id="32" name="Rechteck 31">
+            <a:extLst>
+              <a:ext uri="{FF2B5EF4-FFF2-40B4-BE49-F238E27FC236}">
+                <a16:creationId xmlns:a16="http://schemas.microsoft.com/office/drawing/2014/main" id="{F8C4B1B2-D92B-4258-AED7-FB3F9E62E991}"/>
+              </a:ext>
+            </a:extLst>
+          </p:cNvPr>
+          <p:cNvSpPr/>
+          <p:nvPr/>
+        </p:nvSpPr>
+        <p:spPr>
+          <a:xfrm>
+            <a:off x="7439507" y="723333"/>
+            <a:ext cx="1200702" cy="5633333"/>
+          </a:xfrm>
+          <a:prstGeom prst="rect">
+            <a:avLst/>
+          </a:prstGeom>
+          <a:solidFill>
+            <a:schemeClr val="bg1"/>
+          </a:solidFill>
+          <a:ln>
+            <a:noFill/>
+          </a:ln>
+        </p:spPr>
+        <p:style>
+          <a:lnRef idx="2">
+            <a:schemeClr val="accent1">
+              <a:shade val="50000"/>
+            </a:schemeClr>
+          </a:lnRef>
+          <a:fillRef idx="1">
+            <a:schemeClr val="accent1"/>
+          </a:fillRef>
+          <a:effectRef idx="0">
+            <a:schemeClr val="accent1"/>
+          </a:effectRef>
+          <a:fontRef idx="minor">
+            <a:schemeClr val="lt1"/>
+          </a:fontRef>
+        </p:style>
+        <p:txBody>
+          <a:bodyPr rtlCol="0" anchor="ctr"/>
+          <a:lstStyle/>
+          <a:p>
+            <a:pPr algn="ctr"/>
+            <a:endParaRPr lang="de-DE"/>
+          </a:p>
+        </p:txBody>
+      </p:sp>
+      <p:sp>
+        <p:nvSpPr>
+          <p:cNvPr id="5" name="Rechteck 4">
+            <a:extLst>
+              <a:ext uri="{FF2B5EF4-FFF2-40B4-BE49-F238E27FC236}">
+                <a16:creationId xmlns:a16="http://schemas.microsoft.com/office/drawing/2014/main" id="{9A40B1A2-15CF-487B-A563-285F13DDC0E3}"/>
+              </a:ext>
+            </a:extLst>
+          </p:cNvPr>
+          <p:cNvSpPr/>
+          <p:nvPr/>
+        </p:nvSpPr>
+        <p:spPr>
+          <a:xfrm>
+            <a:off x="4754875" y="2654299"/>
+            <a:ext cx="95731" cy="3296443"/>
+          </a:xfrm>
+          <a:prstGeom prst="rect">
+            <a:avLst/>
+          </a:prstGeom>
+          <a:solidFill>
+            <a:schemeClr val="tx1"/>
+          </a:solidFill>
+          <a:ln>
+            <a:noFill/>
+          </a:ln>
+        </p:spPr>
+        <p:style>
+          <a:lnRef idx="2">
+            <a:schemeClr val="accent1">
+              <a:shade val="50000"/>
+            </a:schemeClr>
+          </a:lnRef>
+          <a:fillRef idx="1">
+            <a:schemeClr val="accent1"/>
+          </a:fillRef>
+          <a:effectRef idx="0">
+            <a:schemeClr val="accent1"/>
+          </a:effectRef>
+          <a:fontRef idx="minor">
+            <a:schemeClr val="lt1"/>
+          </a:fontRef>
+        </p:style>
+        <p:txBody>
+          <a:bodyPr rtlCol="0" anchor="ctr"/>
+          <a:lstStyle/>
+          <a:p>
+            <a:pPr algn="ctr"/>
+            <a:endParaRPr lang="de-DE"/>
+          </a:p>
+        </p:txBody>
+      </p:sp>
+      <p:sp>
+        <p:nvSpPr>
+          <p:cNvPr id="33" name="Rechteck 32">
+            <a:extLst>
+              <a:ext uri="{FF2B5EF4-FFF2-40B4-BE49-F238E27FC236}">
+                <a16:creationId xmlns:a16="http://schemas.microsoft.com/office/drawing/2014/main" id="{4EB7B10F-210F-464C-8431-DB63B36D5E45}"/>
+              </a:ext>
+            </a:extLst>
+          </p:cNvPr>
+          <p:cNvSpPr/>
+          <p:nvPr/>
+        </p:nvSpPr>
+        <p:spPr>
+          <a:xfrm>
+            <a:off x="7366934" y="2645597"/>
+            <a:ext cx="72573" cy="3296443"/>
+          </a:xfrm>
+          <a:prstGeom prst="rect">
+            <a:avLst/>
+          </a:prstGeom>
+          <a:solidFill>
+            <a:schemeClr val="tx1"/>
+          </a:solidFill>
+          <a:ln>
+            <a:noFill/>
+          </a:ln>
+        </p:spPr>
+        <p:style>
+          <a:lnRef idx="2">
+            <a:schemeClr val="accent1">
+              <a:shade val="50000"/>
+            </a:schemeClr>
+          </a:lnRef>
+          <a:fillRef idx="1">
+            <a:schemeClr val="accent1"/>
+          </a:fillRef>
+          <a:effectRef idx="0">
+            <a:schemeClr val="accent1"/>
+          </a:effectRef>
+          <a:fontRef idx="minor">
+            <a:schemeClr val="lt1"/>
+          </a:fontRef>
+        </p:style>
+        <p:txBody>
+          <a:bodyPr rtlCol="0" anchor="ctr"/>
+          <a:lstStyle/>
+          <a:p>
+            <a:pPr algn="ctr"/>
+            <a:endParaRPr lang="de-DE"/>
+          </a:p>
+        </p:txBody>
+      </p:sp>
+    </p:spTree>
+    <p:extLst>
+      <p:ext uri="{BB962C8B-B14F-4D97-AF65-F5344CB8AC3E}">
+        <p14:creationId xmlns:p14="http://schemas.microsoft.com/office/powerpoint/2010/main" val="3396583105"/>
+      </p:ext>
+    </p:extLst>
+  </p:cSld>
+  <p:clrMapOvr>
+    <a:masterClrMapping/>
+  </p:clrMapOvr>
+</p:sld>
+</file>
+
+<file path=ppt/slides/slide12.xml><?xml version="1.0" encoding="utf-8"?>
 <p:sld xmlns:a="http://schemas.openxmlformats.org/drawingml/2006/main" xmlns:r="http://schemas.openxmlformats.org/officeDocument/2006/relationships" xmlns:p="http://schemas.openxmlformats.org/presentationml/2006/main">
   <p:cSld>
     <p:spTree>
@@ -5481,7 +7998,7 @@
 </p:sld>
 </file>
 
-<file path=ppt/slides/slide11.xml><?xml version="1.0" encoding="utf-8"?>
+<file path=ppt/slides/slide13.xml><?xml version="1.0" encoding="utf-8"?>
 <p:sld xmlns:a="http://schemas.openxmlformats.org/drawingml/2006/main" xmlns:r="http://schemas.openxmlformats.org/officeDocument/2006/relationships" xmlns:p="http://schemas.openxmlformats.org/presentationml/2006/main">
   <p:cSld>
     <p:spTree>
@@ -5498,55 +8015,6 @@
           <a:chExt cx="0" cy="0"/>
         </a:xfrm>
       </p:grpSpPr>
-      <p:sp>
-        <p:nvSpPr>
-          <p:cNvPr id="3" name="Rechteck 2">
-            <a:extLst>
-              <a:ext uri="{FF2B5EF4-FFF2-40B4-BE49-F238E27FC236}">
-                <a16:creationId xmlns:a16="http://schemas.microsoft.com/office/drawing/2014/main" id="{81CD9DAE-9581-486E-9D0E-343710F85EEC}"/>
-              </a:ext>
-            </a:extLst>
-          </p:cNvPr>
-          <p:cNvSpPr/>
-          <p:nvPr/>
-        </p:nvSpPr>
-        <p:spPr>
-          <a:xfrm>
-            <a:off x="2637692" y="1441938"/>
-            <a:ext cx="773723" cy="1907931"/>
-          </a:xfrm>
-          <a:prstGeom prst="rect">
-            <a:avLst/>
-          </a:prstGeom>
-          <a:solidFill>
-            <a:srgbClr val="FF9900"/>
-          </a:solidFill>
-        </p:spPr>
-        <p:style>
-          <a:lnRef idx="2">
-            <a:schemeClr val="accent1">
-              <a:shade val="50000"/>
-            </a:schemeClr>
-          </a:lnRef>
-          <a:fillRef idx="1">
-            <a:schemeClr val="accent1"/>
-          </a:fillRef>
-          <a:effectRef idx="0">
-            <a:schemeClr val="accent1"/>
-          </a:effectRef>
-          <a:fontRef idx="minor">
-            <a:schemeClr val="lt1"/>
-          </a:fontRef>
-        </p:style>
-        <p:txBody>
-          <a:bodyPr rtlCol="0" anchor="ctr"/>
-          <a:lstStyle/>
-          <a:p>
-            <a:pPr algn="ctr"/>
-            <a:endParaRPr lang="de-DE"/>
-          </a:p>
-        </p:txBody>
-      </p:sp>
     </p:spTree>
     <p:extLst>
       <p:ext uri="{BB962C8B-B14F-4D97-AF65-F5344CB8AC3E}">
@@ -11256,249 +13724,32 @@
           </a:p>
         </p:txBody>
       </p:sp>
-      <p:sp>
-        <p:nvSpPr>
-          <p:cNvPr id="21" name="Textfeld 20">
+      <p:grpSp>
+        <p:nvGrpSpPr>
+          <p:cNvPr id="50" name="Gruppieren 49">
             <a:extLst>
               <a:ext uri="{FF2B5EF4-FFF2-40B4-BE49-F238E27FC236}">
-                <a16:creationId xmlns:a16="http://schemas.microsoft.com/office/drawing/2014/main" id="{2F299FD6-9D17-4E28-A213-8A29F3F14238}"/>
+                <a16:creationId xmlns:a16="http://schemas.microsoft.com/office/drawing/2014/main" id="{38E3DDDE-093D-4785-AB58-0997A1A2F6BE}"/>
               </a:ext>
             </a:extLst>
           </p:cNvPr>
-          <p:cNvSpPr txBox="1"/>
-          <p:nvPr/>
-        </p:nvSpPr>
-        <p:spPr>
-          <a:xfrm>
-            <a:off x="4861527" y="2216737"/>
-            <a:ext cx="2468946" cy="553998"/>
-          </a:xfrm>
-          <a:prstGeom prst="rect">
-            <a:avLst/>
-          </a:prstGeom>
-          <a:noFill/>
-          <a:ln>
-            <a:noFill/>
-          </a:ln>
-        </p:spPr>
-        <p:txBody>
-          <a:bodyPr wrap="square" rtlCol="0">
-            <a:spAutoFit/>
-          </a:bodyPr>
-          <a:lstStyle/>
-          <a:p>
-            <a:pPr algn="ctr"/>
-            <a:r>
-              <a:rPr lang="de-DE" b="1" dirty="0">
-                <a:latin typeface="Roboto" panose="02000000000000000000" pitchFamily="2" charset="0"/>
-                <a:ea typeface="Roboto" panose="02000000000000000000" pitchFamily="2" charset="0"/>
-              </a:rPr>
-              <a:t>Montag, 1./2.</a:t>
-            </a:r>
-          </a:p>
-          <a:p>
-            <a:pPr algn="ctr"/>
-            <a:r>
-              <a:rPr lang="de-DE" sz="1200" dirty="0">
-                <a:latin typeface="Roboto Thin" panose="02000000000000000000" pitchFamily="2" charset="0"/>
-                <a:ea typeface="Roboto Thin" panose="02000000000000000000" pitchFamily="2" charset="0"/>
-              </a:rPr>
-              <a:t>Musik entfällt</a:t>
-            </a:r>
-          </a:p>
-        </p:txBody>
-      </p:sp>
-      <p:sp>
-        <p:nvSpPr>
-          <p:cNvPr id="6" name="Interaktive Schaltfläche: Leer 5">
-            <a:hlinkClick r:id="rId2" action="ppaction://hlinksldjump" highlightClick="1"/>
-            <a:extLst>
-              <a:ext uri="{FF2B5EF4-FFF2-40B4-BE49-F238E27FC236}">
-                <a16:creationId xmlns:a16="http://schemas.microsoft.com/office/drawing/2014/main" id="{3662B50A-95AF-44C8-9473-963260B379C7}"/>
-              </a:ext>
-            </a:extLst>
-          </p:cNvPr>
-          <p:cNvSpPr/>
-          <p:nvPr/>
-        </p:nvSpPr>
-        <p:spPr>
-          <a:xfrm>
-            <a:off x="4923400" y="996067"/>
-            <a:ext cx="360000" cy="360000"/>
-          </a:xfrm>
-          <a:prstGeom prst="actionButtonBlank">
-            <a:avLst/>
-          </a:prstGeom>
-          <a:blipFill dpi="0" rotWithShape="1">
-            <a:blip r:embed="rId3">
-              <a:extLst>
-                <a:ext uri="{28A0092B-C50C-407E-A947-70E740481C1C}">
-                  <a14:useLocalDpi xmlns:a14="http://schemas.microsoft.com/office/drawing/2010/main" val="0"/>
-                </a:ext>
-              </a:extLst>
-            </a:blip>
-            <a:srcRect/>
-            <a:stretch>
-              <a:fillRect/>
-            </a:stretch>
-          </a:blipFill>
-          <a:ln>
-            <a:noFill/>
-          </a:ln>
-        </p:spPr>
-        <p:style>
-          <a:lnRef idx="2">
-            <a:schemeClr val="accent1">
-              <a:shade val="50000"/>
-            </a:schemeClr>
-          </a:lnRef>
-          <a:fillRef idx="1">
-            <a:schemeClr val="accent1"/>
-          </a:fillRef>
-          <a:effectRef idx="0">
-            <a:schemeClr val="accent1"/>
-          </a:effectRef>
-          <a:fontRef idx="minor">
-            <a:schemeClr val="lt1"/>
-          </a:fontRef>
-        </p:style>
-        <p:txBody>
-          <a:bodyPr rtlCol="0" anchor="ctr"/>
-          <a:lstStyle/>
-          <a:p>
-            <a:pPr algn="ctr"/>
-            <a:endParaRPr lang="de-DE"/>
-          </a:p>
-        </p:txBody>
-      </p:sp>
-      <p:grpSp>
-        <p:nvGrpSpPr>
-          <p:cNvPr id="7" name="Gruppieren 6">
-            <a:extLst>
-              <a:ext uri="{FF2B5EF4-FFF2-40B4-BE49-F238E27FC236}">
-                <a16:creationId xmlns:a16="http://schemas.microsoft.com/office/drawing/2014/main" id="{B12105FB-DB5D-46E8-BD0E-AD84D49102E3}"/>
-              </a:ext>
-            </a:extLst>
-          </p:cNvPr>
-          <p:cNvGrpSpPr>
-            <a:grpSpLocks noChangeAspect="1"/>
-          </p:cNvGrpSpPr>
+          <p:cNvGrpSpPr/>
           <p:nvPr/>
         </p:nvGrpSpPr>
         <p:grpSpPr>
-          <a:xfrm rot="477621">
-            <a:off x="4610193" y="3782306"/>
+          <a:xfrm>
+            <a:off x="4546600" y="3429000"/>
             <a:ext cx="3289602" cy="2251646"/>
-            <a:chOff x="4162538" y="1754812"/>
-            <a:chExt cx="5208401" cy="3565012"/>
+            <a:chOff x="4546600" y="3429000"/>
+            <a:chExt cx="3289602" cy="2251646"/>
           </a:xfrm>
         </p:grpSpPr>
-        <p:sp>
-          <p:nvSpPr>
-            <p:cNvPr id="8" name="Rechteck: abgerundete Ecken 7">
+        <p:grpSp>
+          <p:nvGrpSpPr>
+            <p:cNvPr id="7" name="Gruppieren 6">
               <a:extLst>
                 <a:ext uri="{FF2B5EF4-FFF2-40B4-BE49-F238E27FC236}">
-                  <a16:creationId xmlns:a16="http://schemas.microsoft.com/office/drawing/2014/main" id="{49B38451-F86C-47B9-84DF-D1672673850F}"/>
-                </a:ext>
-              </a:extLst>
-            </p:cNvPr>
-            <p:cNvSpPr/>
-            <p:nvPr/>
-          </p:nvSpPr>
-          <p:spPr>
-            <a:xfrm rot="21113087">
-              <a:off x="4233616" y="1979945"/>
-              <a:ext cx="5046210" cy="3140403"/>
-            </a:xfrm>
-            <a:prstGeom prst="roundRect">
-              <a:avLst>
-                <a:gd name="adj" fmla="val 11051"/>
-              </a:avLst>
-            </a:prstGeom>
-            <a:solidFill>
-              <a:srgbClr val="ECE9FC"/>
-            </a:solidFill>
-            <a:ln w="76200" cap="rnd" cmpd="sng">
-              <a:solidFill>
-                <a:srgbClr val="D1DDF7"/>
-              </a:solidFill>
-              <a:round/>
-            </a:ln>
-          </p:spPr>
-          <p:style>
-            <a:lnRef idx="2">
-              <a:schemeClr val="accent1">
-                <a:shade val="50000"/>
-              </a:schemeClr>
-            </a:lnRef>
-            <a:fillRef idx="1">
-              <a:schemeClr val="accent1"/>
-            </a:fillRef>
-            <a:effectRef idx="0">
-              <a:schemeClr val="accent1"/>
-            </a:effectRef>
-            <a:fontRef idx="minor">
-              <a:schemeClr val="lt1"/>
-            </a:fontRef>
-          </p:style>
-          <p:txBody>
-            <a:bodyPr rtlCol="0" anchor="ctr"/>
-            <a:lstStyle/>
-            <a:p>
-              <a:pPr algn="ctr"/>
-              <a:endParaRPr lang="de-DE" dirty="0"/>
-            </a:p>
-          </p:txBody>
-        </p:sp>
-        <p:cxnSp>
-          <p:nvCxnSpPr>
-            <p:cNvPr id="9" name="Gerader Verbinder 8">
-              <a:extLst>
-                <a:ext uri="{FF2B5EF4-FFF2-40B4-BE49-F238E27FC236}">
-                  <a16:creationId xmlns:a16="http://schemas.microsoft.com/office/drawing/2014/main" id="{289E7F2E-5D03-433C-B606-2EB7ABAB13EA}"/>
-                </a:ext>
-              </a:extLst>
-            </p:cNvPr>
-            <p:cNvCxnSpPr>
-              <a:cxnSpLocks/>
-            </p:cNvCxnSpPr>
-            <p:nvPr/>
-          </p:nvCxnSpPr>
-          <p:spPr>
-            <a:xfrm>
-              <a:off x="5055783" y="2170954"/>
-              <a:ext cx="466437" cy="3148870"/>
-            </a:xfrm>
-            <a:prstGeom prst="line">
-              <a:avLst/>
-            </a:prstGeom>
-            <a:ln w="76200">
-              <a:solidFill>
-                <a:srgbClr val="D1DDF7"/>
-              </a:solidFill>
-            </a:ln>
-          </p:spPr>
-          <p:style>
-            <a:lnRef idx="1">
-              <a:schemeClr val="accent1"/>
-            </a:lnRef>
-            <a:fillRef idx="0">
-              <a:schemeClr val="accent1"/>
-            </a:fillRef>
-            <a:effectRef idx="0">
-              <a:schemeClr val="accent1"/>
-            </a:effectRef>
-            <a:fontRef idx="minor">
-              <a:schemeClr val="tx1"/>
-            </a:fontRef>
-          </p:style>
-        </p:cxnSp>
-        <p:grpSp>
-          <p:nvGrpSpPr>
-            <p:cNvPr id="10" name="Gruppieren 9">
-              <a:extLst>
-                <a:ext uri="{FF2B5EF4-FFF2-40B4-BE49-F238E27FC236}">
-                  <a16:creationId xmlns:a16="http://schemas.microsoft.com/office/drawing/2014/main" id="{555AC88B-9BD5-4ECD-8487-53C3065CA258}"/>
+                  <a16:creationId xmlns:a16="http://schemas.microsoft.com/office/drawing/2014/main" id="{B12105FB-DB5D-46E8-BD0E-AD84D49102E3}"/>
                 </a:ext>
               </a:extLst>
             </p:cNvPr>
@@ -11508,19 +13759,119 @@
             <p:nvPr/>
           </p:nvGrpSpPr>
           <p:grpSpPr>
-            <a:xfrm rot="21072129">
-              <a:off x="4687628" y="4597984"/>
-              <a:ext cx="539071" cy="557484"/>
-              <a:chOff x="2444024" y="1798320"/>
-              <a:chExt cx="626836" cy="648248"/>
+            <a:xfrm>
+              <a:off x="4546600" y="3429000"/>
+              <a:ext cx="3289602" cy="2251646"/>
+              <a:chOff x="4162538" y="1754812"/>
+              <a:chExt cx="5208401" cy="3565012"/>
             </a:xfrm>
           </p:grpSpPr>
+          <p:sp>
+            <p:nvSpPr>
+              <p:cNvPr id="8" name="Rechteck: abgerundete Ecken 7">
+                <a:extLst>
+                  <a:ext uri="{FF2B5EF4-FFF2-40B4-BE49-F238E27FC236}">
+                    <a16:creationId xmlns:a16="http://schemas.microsoft.com/office/drawing/2014/main" id="{49B38451-F86C-47B9-84DF-D1672673850F}"/>
+                  </a:ext>
+                </a:extLst>
+              </p:cNvPr>
+              <p:cNvSpPr/>
+              <p:nvPr/>
+            </p:nvSpPr>
+            <p:spPr>
+              <a:xfrm rot="21113087">
+                <a:off x="4233616" y="1979945"/>
+                <a:ext cx="5046210" cy="3140403"/>
+              </a:xfrm>
+              <a:prstGeom prst="roundRect">
+                <a:avLst>
+                  <a:gd name="adj" fmla="val 11051"/>
+                </a:avLst>
+              </a:prstGeom>
+              <a:solidFill>
+                <a:srgbClr val="ECE9FC"/>
+              </a:solidFill>
+              <a:ln w="76200" cap="rnd" cmpd="sng">
+                <a:solidFill>
+                  <a:srgbClr val="D1DDF7"/>
+                </a:solidFill>
+                <a:round/>
+              </a:ln>
+            </p:spPr>
+            <p:style>
+              <a:lnRef idx="2">
+                <a:schemeClr val="accent1">
+                  <a:shade val="50000"/>
+                </a:schemeClr>
+              </a:lnRef>
+              <a:fillRef idx="1">
+                <a:schemeClr val="accent1"/>
+              </a:fillRef>
+              <a:effectRef idx="0">
+                <a:schemeClr val="accent1"/>
+              </a:effectRef>
+              <a:fontRef idx="minor">
+                <a:schemeClr val="lt1"/>
+              </a:fontRef>
+            </p:style>
+            <p:txBody>
+              <a:bodyPr rtlCol="0" anchor="ctr"/>
+              <a:lstStyle/>
+              <a:p>
+                <a:pPr algn="ctr"/>
+                <a:endParaRPr lang="de-DE" dirty="0"/>
+              </a:p>
+            </p:txBody>
+          </p:sp>
           <p:cxnSp>
             <p:nvCxnSpPr>
-              <p:cNvPr id="28" name="Gerader Verbinder 27">
+              <p:cNvPr id="9" name="Gerader Verbinder 8">
                 <a:extLst>
                   <a:ext uri="{FF2B5EF4-FFF2-40B4-BE49-F238E27FC236}">
-                    <a16:creationId xmlns:a16="http://schemas.microsoft.com/office/drawing/2014/main" id="{AF9E1A41-B61E-4F00-8695-A32CF2239257}"/>
+                    <a16:creationId xmlns:a16="http://schemas.microsoft.com/office/drawing/2014/main" id="{289E7F2E-5D03-433C-B606-2EB7ABAB13EA}"/>
+                  </a:ext>
+                </a:extLst>
+              </p:cNvPr>
+              <p:cNvCxnSpPr>
+                <a:cxnSpLocks/>
+              </p:cNvCxnSpPr>
+              <p:nvPr/>
+            </p:nvCxnSpPr>
+            <p:spPr>
+              <a:xfrm>
+                <a:off x="5055783" y="2170954"/>
+                <a:ext cx="466437" cy="3148870"/>
+              </a:xfrm>
+              <a:prstGeom prst="line">
+                <a:avLst/>
+              </a:prstGeom>
+              <a:ln w="76200">
+                <a:solidFill>
+                  <a:srgbClr val="D1DDF7"/>
+                </a:solidFill>
+              </a:ln>
+            </p:spPr>
+            <p:style>
+              <a:lnRef idx="1">
+                <a:schemeClr val="accent1"/>
+              </a:lnRef>
+              <a:fillRef idx="0">
+                <a:schemeClr val="accent1"/>
+              </a:fillRef>
+              <a:effectRef idx="0">
+                <a:schemeClr val="accent1"/>
+              </a:effectRef>
+              <a:fontRef idx="minor">
+                <a:schemeClr val="tx1"/>
+              </a:fontRef>
+            </p:style>
+          </p:cxnSp>
+          <p:cxnSp>
+            <p:nvCxnSpPr>
+              <p:cNvPr id="11" name="Gerader Verbinder 10">
+                <a:extLst>
+                  <a:ext uri="{FF2B5EF4-FFF2-40B4-BE49-F238E27FC236}">
+                    <a16:creationId xmlns:a16="http://schemas.microsoft.com/office/drawing/2014/main" id="{B103D0FC-111F-4168-A4CA-D754233ADA19}"/>
                   </a:ext>
                 </a:extLst>
               </p:cNvPr>
@@ -11531,28 +13882,27 @@
             </p:nvCxnSpPr>
             <p:spPr>
               <a:xfrm flipV="1">
-                <a:off x="2444024" y="1798320"/>
-                <a:ext cx="626836" cy="648248"/>
+                <a:off x="4162538" y="2696959"/>
+                <a:ext cx="5020199" cy="757711"/>
               </a:xfrm>
               <a:prstGeom prst="line">
                 <a:avLst/>
               </a:prstGeom>
-              <a:ln w="101600" cap="rnd">
+              <a:ln w="76200">
                 <a:solidFill>
-                  <a:srgbClr val="CC3300"/>
+                  <a:srgbClr val="D1DDF7"/>
                 </a:solidFill>
-                <a:bevel/>
               </a:ln>
             </p:spPr>
             <p:style>
               <a:lnRef idx="1">
-                <a:schemeClr val="dk1"/>
+                <a:schemeClr val="accent1"/>
               </a:lnRef>
               <a:fillRef idx="0">
-                <a:schemeClr val="dk1"/>
+                <a:schemeClr val="accent1"/>
               </a:fillRef>
               <a:effectRef idx="0">
-                <a:schemeClr val="dk1"/>
+                <a:schemeClr val="accent1"/>
               </a:effectRef>
               <a:fontRef idx="minor">
                 <a:schemeClr val="tx1"/>
@@ -11561,10 +13911,203 @@
           </p:cxnSp>
           <p:cxnSp>
             <p:nvCxnSpPr>
-              <p:cNvPr id="29" name="Gerader Verbinder 28">
+              <p:cNvPr id="12" name="Gerader Verbinder 11">
                 <a:extLst>
                   <a:ext uri="{FF2B5EF4-FFF2-40B4-BE49-F238E27FC236}">
-                    <a16:creationId xmlns:a16="http://schemas.microsoft.com/office/drawing/2014/main" id="{0A24FB0E-98B8-49CA-BE64-DC5F60DEC3A9}"/>
+                    <a16:creationId xmlns:a16="http://schemas.microsoft.com/office/drawing/2014/main" id="{35E76898-9553-4AA0-8FD8-11547D97BBB4}"/>
+                  </a:ext>
+                </a:extLst>
+              </p:cNvPr>
+              <p:cNvCxnSpPr>
+                <a:cxnSpLocks/>
+              </p:cNvCxnSpPr>
+              <p:nvPr/>
+            </p:nvCxnSpPr>
+            <p:spPr>
+              <a:xfrm flipV="1">
+                <a:off x="4375261" y="3745389"/>
+                <a:ext cx="4995678" cy="712344"/>
+              </a:xfrm>
+              <a:prstGeom prst="line">
+                <a:avLst/>
+              </a:prstGeom>
+              <a:ln w="76200">
+                <a:solidFill>
+                  <a:srgbClr val="D1DDF7"/>
+                </a:solidFill>
+              </a:ln>
+            </p:spPr>
+            <p:style>
+              <a:lnRef idx="1">
+                <a:schemeClr val="accent1"/>
+              </a:lnRef>
+              <a:fillRef idx="0">
+                <a:schemeClr val="accent1"/>
+              </a:fillRef>
+              <a:effectRef idx="0">
+                <a:schemeClr val="accent1"/>
+              </a:effectRef>
+              <a:fontRef idx="minor">
+                <a:schemeClr val="tx1"/>
+              </a:fontRef>
+            </p:style>
+          </p:cxnSp>
+          <p:cxnSp>
+            <p:nvCxnSpPr>
+              <p:cNvPr id="13" name="Gerader Verbinder 12">
+                <a:extLst>
+                  <a:ext uri="{FF2B5EF4-FFF2-40B4-BE49-F238E27FC236}">
+                    <a16:creationId xmlns:a16="http://schemas.microsoft.com/office/drawing/2014/main" id="{9BB4B93B-5E88-4E60-9DAF-908393844C4E}"/>
+                  </a:ext>
+                </a:extLst>
+              </p:cNvPr>
+              <p:cNvCxnSpPr>
+                <a:cxnSpLocks/>
+              </p:cNvCxnSpPr>
+              <p:nvPr/>
+            </p:nvCxnSpPr>
+            <p:spPr>
+              <a:xfrm>
+                <a:off x="6096000" y="1995668"/>
+                <a:ext cx="443312" cy="3108955"/>
+              </a:xfrm>
+              <a:prstGeom prst="line">
+                <a:avLst/>
+              </a:prstGeom>
+              <a:ln w="76200">
+                <a:solidFill>
+                  <a:srgbClr val="D1DDF7"/>
+                </a:solidFill>
+              </a:ln>
+            </p:spPr>
+            <p:style>
+              <a:lnRef idx="1">
+                <a:schemeClr val="accent1"/>
+              </a:lnRef>
+              <a:fillRef idx="0">
+                <a:schemeClr val="accent1"/>
+              </a:fillRef>
+              <a:effectRef idx="0">
+                <a:schemeClr val="accent1"/>
+              </a:effectRef>
+              <a:fontRef idx="minor">
+                <a:schemeClr val="tx1"/>
+              </a:fontRef>
+            </p:style>
+          </p:cxnSp>
+          <p:cxnSp>
+            <p:nvCxnSpPr>
+              <p:cNvPr id="14" name="Gerader Verbinder 13">
+                <a:extLst>
+                  <a:ext uri="{FF2B5EF4-FFF2-40B4-BE49-F238E27FC236}">
+                    <a16:creationId xmlns:a16="http://schemas.microsoft.com/office/drawing/2014/main" id="{786B4DFD-810C-4576-A57C-3D8271C77F55}"/>
+                  </a:ext>
+                </a:extLst>
+              </p:cNvPr>
+              <p:cNvCxnSpPr>
+                <a:cxnSpLocks/>
+              </p:cNvCxnSpPr>
+              <p:nvPr/>
+            </p:nvCxnSpPr>
+            <p:spPr>
+              <a:xfrm>
+                <a:off x="8153309" y="1754812"/>
+                <a:ext cx="466437" cy="3148870"/>
+              </a:xfrm>
+              <a:prstGeom prst="line">
+                <a:avLst/>
+              </a:prstGeom>
+              <a:ln w="76200">
+                <a:solidFill>
+                  <a:srgbClr val="D1DDF7"/>
+                </a:solidFill>
+              </a:ln>
+            </p:spPr>
+            <p:style>
+              <a:lnRef idx="1">
+                <a:schemeClr val="accent1"/>
+              </a:lnRef>
+              <a:fillRef idx="0">
+                <a:schemeClr val="accent1"/>
+              </a:fillRef>
+              <a:effectRef idx="0">
+                <a:schemeClr val="accent1"/>
+              </a:effectRef>
+              <a:fontRef idx="minor">
+                <a:schemeClr val="tx1"/>
+              </a:fontRef>
+            </p:style>
+          </p:cxnSp>
+          <p:cxnSp>
+            <p:nvCxnSpPr>
+              <p:cNvPr id="15" name="Gerader Verbinder 14">
+                <a:extLst>
+                  <a:ext uri="{FF2B5EF4-FFF2-40B4-BE49-F238E27FC236}">
+                    <a16:creationId xmlns:a16="http://schemas.microsoft.com/office/drawing/2014/main" id="{A15D7ACF-5762-4C9B-B942-9C6D46095AF0}"/>
+                  </a:ext>
+                </a:extLst>
+              </p:cNvPr>
+              <p:cNvCxnSpPr>
+                <a:cxnSpLocks/>
+              </p:cNvCxnSpPr>
+              <p:nvPr/>
+            </p:nvCxnSpPr>
+            <p:spPr>
+              <a:xfrm>
+                <a:off x="7113092" y="1930557"/>
+                <a:ext cx="466437" cy="3148870"/>
+              </a:xfrm>
+              <a:prstGeom prst="line">
+                <a:avLst/>
+              </a:prstGeom>
+              <a:ln w="76200">
+                <a:solidFill>
+                  <a:srgbClr val="D1DDF7"/>
+                </a:solidFill>
+              </a:ln>
+            </p:spPr>
+            <p:style>
+              <a:lnRef idx="1">
+                <a:schemeClr val="accent1"/>
+              </a:lnRef>
+              <a:fillRef idx="0">
+                <a:schemeClr val="accent1"/>
+              </a:fillRef>
+              <a:effectRef idx="0">
+                <a:schemeClr val="accent1"/>
+              </a:effectRef>
+              <a:fontRef idx="minor">
+                <a:schemeClr val="tx1"/>
+              </a:fontRef>
+            </p:style>
+          </p:cxnSp>
+        </p:grpSp>
+        <p:grpSp>
+          <p:nvGrpSpPr>
+            <p:cNvPr id="40" name="Gruppieren 39">
+              <a:extLst>
+                <a:ext uri="{FF2B5EF4-FFF2-40B4-BE49-F238E27FC236}">
+                  <a16:creationId xmlns:a16="http://schemas.microsoft.com/office/drawing/2014/main" id="{2CB34455-C29B-467A-8ED0-E1088916EA75}"/>
+                </a:ext>
+              </a:extLst>
+            </p:cNvPr>
+            <p:cNvGrpSpPr/>
+            <p:nvPr/>
+          </p:nvGrpSpPr>
+          <p:grpSpPr>
+            <a:xfrm rot="21051589">
+              <a:off x="5358382" y="3819596"/>
+              <a:ext cx="282204" cy="403213"/>
+              <a:chOff x="2585034" y="4020194"/>
+              <a:chExt cx="282204" cy="403213"/>
+            </a:xfrm>
+          </p:grpSpPr>
+          <p:cxnSp>
+            <p:nvCxnSpPr>
+              <p:cNvPr id="34" name="Gerader Verbinder 33">
+                <a:extLst>
+                  <a:ext uri="{FF2B5EF4-FFF2-40B4-BE49-F238E27FC236}">
+                    <a16:creationId xmlns:a16="http://schemas.microsoft.com/office/drawing/2014/main" id="{FED83892-2222-46CC-8BE5-731E606CADE3}"/>
                   </a:ext>
                 </a:extLst>
               </p:cNvPr>
@@ -11575,15 +14118,15 @@
             </p:nvCxnSpPr>
             <p:spPr>
               <a:xfrm flipH="1" flipV="1">
-                <a:off x="2444024" y="1798320"/>
-                <a:ext cx="626836" cy="648248"/>
+                <a:off x="2585034" y="4263338"/>
+                <a:ext cx="137897" cy="160069"/>
               </a:xfrm>
               <a:prstGeom prst="line">
                 <a:avLst/>
               </a:prstGeom>
               <a:ln w="101600" cap="rnd">
                 <a:solidFill>
-                  <a:srgbClr val="CC3300"/>
+                  <a:srgbClr val="AFE09C"/>
                 </a:solidFill>
                 <a:bevel/>
               </a:ln>
@@ -11603,250 +14146,12 @@
               </a:fontRef>
             </p:style>
           </p:cxnSp>
-        </p:grpSp>
-        <p:cxnSp>
-          <p:nvCxnSpPr>
-            <p:cNvPr id="11" name="Gerader Verbinder 10">
-              <a:extLst>
-                <a:ext uri="{FF2B5EF4-FFF2-40B4-BE49-F238E27FC236}">
-                  <a16:creationId xmlns:a16="http://schemas.microsoft.com/office/drawing/2014/main" id="{B103D0FC-111F-4168-A4CA-D754233ADA19}"/>
-                </a:ext>
-              </a:extLst>
-            </p:cNvPr>
-            <p:cNvCxnSpPr>
-              <a:cxnSpLocks/>
-            </p:cNvCxnSpPr>
-            <p:nvPr/>
-          </p:nvCxnSpPr>
-          <p:spPr>
-            <a:xfrm flipV="1">
-              <a:off x="4162538" y="2696959"/>
-              <a:ext cx="5020199" cy="757711"/>
-            </a:xfrm>
-            <a:prstGeom prst="line">
-              <a:avLst/>
-            </a:prstGeom>
-            <a:ln w="76200">
-              <a:solidFill>
-                <a:srgbClr val="D1DDF7"/>
-              </a:solidFill>
-            </a:ln>
-          </p:spPr>
-          <p:style>
-            <a:lnRef idx="1">
-              <a:schemeClr val="accent1"/>
-            </a:lnRef>
-            <a:fillRef idx="0">
-              <a:schemeClr val="accent1"/>
-            </a:fillRef>
-            <a:effectRef idx="0">
-              <a:schemeClr val="accent1"/>
-            </a:effectRef>
-            <a:fontRef idx="minor">
-              <a:schemeClr val="tx1"/>
-            </a:fontRef>
-          </p:style>
-        </p:cxnSp>
-        <p:cxnSp>
-          <p:nvCxnSpPr>
-            <p:cNvPr id="12" name="Gerader Verbinder 11">
-              <a:extLst>
-                <a:ext uri="{FF2B5EF4-FFF2-40B4-BE49-F238E27FC236}">
-                  <a16:creationId xmlns:a16="http://schemas.microsoft.com/office/drawing/2014/main" id="{35E76898-9553-4AA0-8FD8-11547D97BBB4}"/>
-                </a:ext>
-              </a:extLst>
-            </p:cNvPr>
-            <p:cNvCxnSpPr>
-              <a:cxnSpLocks/>
-            </p:cNvCxnSpPr>
-            <p:nvPr/>
-          </p:nvCxnSpPr>
-          <p:spPr>
-            <a:xfrm flipV="1">
-              <a:off x="4375261" y="3745389"/>
-              <a:ext cx="4995678" cy="712344"/>
-            </a:xfrm>
-            <a:prstGeom prst="line">
-              <a:avLst/>
-            </a:prstGeom>
-            <a:ln w="76200">
-              <a:solidFill>
-                <a:srgbClr val="D1DDF7"/>
-              </a:solidFill>
-            </a:ln>
-          </p:spPr>
-          <p:style>
-            <a:lnRef idx="1">
-              <a:schemeClr val="accent1"/>
-            </a:lnRef>
-            <a:fillRef idx="0">
-              <a:schemeClr val="accent1"/>
-            </a:fillRef>
-            <a:effectRef idx="0">
-              <a:schemeClr val="accent1"/>
-            </a:effectRef>
-            <a:fontRef idx="minor">
-              <a:schemeClr val="tx1"/>
-            </a:fontRef>
-          </p:style>
-        </p:cxnSp>
-        <p:cxnSp>
-          <p:nvCxnSpPr>
-            <p:cNvPr id="13" name="Gerader Verbinder 12">
-              <a:extLst>
-                <a:ext uri="{FF2B5EF4-FFF2-40B4-BE49-F238E27FC236}">
-                  <a16:creationId xmlns:a16="http://schemas.microsoft.com/office/drawing/2014/main" id="{9BB4B93B-5E88-4E60-9DAF-908393844C4E}"/>
-                </a:ext>
-              </a:extLst>
-            </p:cNvPr>
-            <p:cNvCxnSpPr>
-              <a:cxnSpLocks/>
-            </p:cNvCxnSpPr>
-            <p:nvPr/>
-          </p:nvCxnSpPr>
-          <p:spPr>
-            <a:xfrm>
-              <a:off x="6096000" y="1995668"/>
-              <a:ext cx="443312" cy="3108955"/>
-            </a:xfrm>
-            <a:prstGeom prst="line">
-              <a:avLst/>
-            </a:prstGeom>
-            <a:ln w="76200">
-              <a:solidFill>
-                <a:srgbClr val="D1DDF7"/>
-              </a:solidFill>
-            </a:ln>
-          </p:spPr>
-          <p:style>
-            <a:lnRef idx="1">
-              <a:schemeClr val="accent1"/>
-            </a:lnRef>
-            <a:fillRef idx="0">
-              <a:schemeClr val="accent1"/>
-            </a:fillRef>
-            <a:effectRef idx="0">
-              <a:schemeClr val="accent1"/>
-            </a:effectRef>
-            <a:fontRef idx="minor">
-              <a:schemeClr val="tx1"/>
-            </a:fontRef>
-          </p:style>
-        </p:cxnSp>
-        <p:cxnSp>
-          <p:nvCxnSpPr>
-            <p:cNvPr id="14" name="Gerader Verbinder 13">
-              <a:extLst>
-                <a:ext uri="{FF2B5EF4-FFF2-40B4-BE49-F238E27FC236}">
-                  <a16:creationId xmlns:a16="http://schemas.microsoft.com/office/drawing/2014/main" id="{786B4DFD-810C-4576-A57C-3D8271C77F55}"/>
-                </a:ext>
-              </a:extLst>
-            </p:cNvPr>
-            <p:cNvCxnSpPr>
-              <a:cxnSpLocks/>
-            </p:cNvCxnSpPr>
-            <p:nvPr/>
-          </p:nvCxnSpPr>
-          <p:spPr>
-            <a:xfrm>
-              <a:off x="8153309" y="1754812"/>
-              <a:ext cx="466437" cy="3148870"/>
-            </a:xfrm>
-            <a:prstGeom prst="line">
-              <a:avLst/>
-            </a:prstGeom>
-            <a:ln w="76200">
-              <a:solidFill>
-                <a:srgbClr val="D1DDF7"/>
-              </a:solidFill>
-            </a:ln>
-          </p:spPr>
-          <p:style>
-            <a:lnRef idx="1">
-              <a:schemeClr val="accent1"/>
-            </a:lnRef>
-            <a:fillRef idx="0">
-              <a:schemeClr val="accent1"/>
-            </a:fillRef>
-            <a:effectRef idx="0">
-              <a:schemeClr val="accent1"/>
-            </a:effectRef>
-            <a:fontRef idx="minor">
-              <a:schemeClr val="tx1"/>
-            </a:fontRef>
-          </p:style>
-        </p:cxnSp>
-        <p:cxnSp>
-          <p:nvCxnSpPr>
-            <p:cNvPr id="15" name="Gerader Verbinder 14">
-              <a:extLst>
-                <a:ext uri="{FF2B5EF4-FFF2-40B4-BE49-F238E27FC236}">
-                  <a16:creationId xmlns:a16="http://schemas.microsoft.com/office/drawing/2014/main" id="{A15D7ACF-5762-4C9B-B942-9C6D46095AF0}"/>
-                </a:ext>
-              </a:extLst>
-            </p:cNvPr>
-            <p:cNvCxnSpPr>
-              <a:cxnSpLocks/>
-            </p:cNvCxnSpPr>
-            <p:nvPr/>
-          </p:nvCxnSpPr>
-          <p:spPr>
-            <a:xfrm>
-              <a:off x="7113092" y="1930557"/>
-              <a:ext cx="466437" cy="3148870"/>
-            </a:xfrm>
-            <a:prstGeom prst="line">
-              <a:avLst/>
-            </a:prstGeom>
-            <a:ln w="76200">
-              <a:solidFill>
-                <a:srgbClr val="D1DDF7"/>
-              </a:solidFill>
-            </a:ln>
-          </p:spPr>
-          <p:style>
-            <a:lnRef idx="1">
-              <a:schemeClr val="accent1"/>
-            </a:lnRef>
-            <a:fillRef idx="0">
-              <a:schemeClr val="accent1"/>
-            </a:fillRef>
-            <a:effectRef idx="0">
-              <a:schemeClr val="accent1"/>
-            </a:effectRef>
-            <a:fontRef idx="minor">
-              <a:schemeClr val="tx1"/>
-            </a:fontRef>
-          </p:style>
-        </p:cxnSp>
-        <p:grpSp>
-          <p:nvGrpSpPr>
-            <p:cNvPr id="16" name="Gruppieren 15">
-              <a:extLst>
-                <a:ext uri="{FF2B5EF4-FFF2-40B4-BE49-F238E27FC236}">
-                  <a16:creationId xmlns:a16="http://schemas.microsoft.com/office/drawing/2014/main" id="{581F6313-8046-4F0F-92D3-FE436463C8DE}"/>
-                </a:ext>
-              </a:extLst>
-            </p:cNvPr>
-            <p:cNvGrpSpPr>
-              <a:grpSpLocks noChangeAspect="1"/>
-            </p:cNvGrpSpPr>
-            <p:nvPr/>
-          </p:nvGrpSpPr>
-          <p:grpSpPr>
-            <a:xfrm rot="21072129">
-              <a:off x="5391697" y="2389160"/>
-              <a:ext cx="539071" cy="557484"/>
-              <a:chOff x="2444024" y="1798320"/>
-              <a:chExt cx="626836" cy="648248"/>
-            </a:xfrm>
-          </p:grpSpPr>
           <p:cxnSp>
             <p:nvCxnSpPr>
-              <p:cNvPr id="26" name="Gerader Verbinder 25">
+              <p:cNvPr id="36" name="Gerader Verbinder 35">
                 <a:extLst>
                   <a:ext uri="{FF2B5EF4-FFF2-40B4-BE49-F238E27FC236}">
-                    <a16:creationId xmlns:a16="http://schemas.microsoft.com/office/drawing/2014/main" id="{F75A21BC-693A-4F4E-9495-1DD6A6C19025}"/>
+                    <a16:creationId xmlns:a16="http://schemas.microsoft.com/office/drawing/2014/main" id="{F93D4496-9693-4625-A371-9913B7DAFC72}"/>
                   </a:ext>
                 </a:extLst>
               </p:cNvPr>
@@ -11857,15 +14162,15 @@
             </p:nvCxnSpPr>
             <p:spPr>
               <a:xfrm flipV="1">
-                <a:off x="2444024" y="1798320"/>
-                <a:ext cx="626836" cy="648248"/>
+                <a:off x="2740975" y="4020194"/>
+                <a:ext cx="126263" cy="394012"/>
               </a:xfrm>
               <a:prstGeom prst="line">
                 <a:avLst/>
               </a:prstGeom>
               <a:ln w="101600" cap="rnd">
                 <a:solidFill>
-                  <a:srgbClr val="CC3300"/>
+                  <a:srgbClr val="AFE09C"/>
                 </a:solidFill>
                 <a:bevel/>
               </a:ln>
@@ -11885,12 +14190,33 @@
               </a:fontRef>
             </p:style>
           </p:cxnSp>
+        </p:grpSp>
+        <p:grpSp>
+          <p:nvGrpSpPr>
+            <p:cNvPr id="41" name="Gruppieren 40">
+              <a:extLst>
+                <a:ext uri="{FF2B5EF4-FFF2-40B4-BE49-F238E27FC236}">
+                  <a16:creationId xmlns:a16="http://schemas.microsoft.com/office/drawing/2014/main" id="{3C60AA83-CE84-46F8-B9FB-438C9C2E858A}"/>
+                </a:ext>
+              </a:extLst>
+            </p:cNvPr>
+            <p:cNvGrpSpPr/>
+            <p:nvPr/>
+          </p:nvGrpSpPr>
+          <p:grpSpPr>
+            <a:xfrm rot="21051589">
+              <a:off x="6187080" y="5019165"/>
+              <a:ext cx="282204" cy="403213"/>
+              <a:chOff x="2585034" y="4020194"/>
+              <a:chExt cx="282204" cy="403213"/>
+            </a:xfrm>
+          </p:grpSpPr>
           <p:cxnSp>
             <p:nvCxnSpPr>
-              <p:cNvPr id="27" name="Gerader Verbinder 26">
+              <p:cNvPr id="42" name="Gerader Verbinder 41">
                 <a:extLst>
                   <a:ext uri="{FF2B5EF4-FFF2-40B4-BE49-F238E27FC236}">
-                    <a16:creationId xmlns:a16="http://schemas.microsoft.com/office/drawing/2014/main" id="{83EE3E92-8757-452D-8EEF-A727196F3E4B}"/>
+                    <a16:creationId xmlns:a16="http://schemas.microsoft.com/office/drawing/2014/main" id="{B6D677EB-9AEC-4080-8A39-7EEC0A145D31}"/>
                   </a:ext>
                 </a:extLst>
               </p:cNvPr>
@@ -11901,15 +14227,15 @@
             </p:nvCxnSpPr>
             <p:spPr>
               <a:xfrm flipH="1" flipV="1">
-                <a:off x="2444024" y="1798320"/>
-                <a:ext cx="626836" cy="648248"/>
+                <a:off x="2585034" y="4263338"/>
+                <a:ext cx="137897" cy="160069"/>
               </a:xfrm>
               <a:prstGeom prst="line">
                 <a:avLst/>
               </a:prstGeom>
               <a:ln w="101600" cap="rnd">
                 <a:solidFill>
-                  <a:srgbClr val="CC3300"/>
+                  <a:srgbClr val="AFE09C"/>
                 </a:solidFill>
                 <a:bevel/>
               </a:ln>
@@ -11929,35 +14255,12 @@
               </a:fontRef>
             </p:style>
           </p:cxnSp>
-        </p:grpSp>
-        <p:grpSp>
-          <p:nvGrpSpPr>
-            <p:cNvPr id="17" name="Gruppieren 16">
-              <a:extLst>
-                <a:ext uri="{FF2B5EF4-FFF2-40B4-BE49-F238E27FC236}">
-                  <a16:creationId xmlns:a16="http://schemas.microsoft.com/office/drawing/2014/main" id="{4131DFAD-045B-4974-84E2-F2D77A7F2650}"/>
-                </a:ext>
-              </a:extLst>
-            </p:cNvPr>
-            <p:cNvGrpSpPr>
-              <a:grpSpLocks noChangeAspect="1"/>
-            </p:cNvGrpSpPr>
-            <p:nvPr/>
-          </p:nvGrpSpPr>
-          <p:grpSpPr>
-            <a:xfrm rot="21072129">
-              <a:off x="7601109" y="3150557"/>
-              <a:ext cx="539071" cy="557484"/>
-              <a:chOff x="2444024" y="1798320"/>
-              <a:chExt cx="626836" cy="648248"/>
-            </a:xfrm>
-          </p:grpSpPr>
           <p:cxnSp>
             <p:nvCxnSpPr>
-              <p:cNvPr id="24" name="Gerader Verbinder 23">
+              <p:cNvPr id="43" name="Gerader Verbinder 42">
                 <a:extLst>
                   <a:ext uri="{FF2B5EF4-FFF2-40B4-BE49-F238E27FC236}">
-                    <a16:creationId xmlns:a16="http://schemas.microsoft.com/office/drawing/2014/main" id="{14BFBD2A-B849-4963-85C7-ED41374F37C6}"/>
+                    <a16:creationId xmlns:a16="http://schemas.microsoft.com/office/drawing/2014/main" id="{CEDCFEA2-8278-41AA-800A-DAB2527D42B1}"/>
                   </a:ext>
                 </a:extLst>
               </p:cNvPr>
@@ -11968,15 +14271,15 @@
             </p:nvCxnSpPr>
             <p:spPr>
               <a:xfrm flipV="1">
-                <a:off x="2444024" y="1798320"/>
-                <a:ext cx="626836" cy="648248"/>
+                <a:off x="2740975" y="4020194"/>
+                <a:ext cx="126263" cy="394012"/>
               </a:xfrm>
               <a:prstGeom prst="line">
                 <a:avLst/>
               </a:prstGeom>
               <a:ln w="101600" cap="rnd">
                 <a:solidFill>
-                  <a:srgbClr val="CC3300"/>
+                  <a:srgbClr val="AFE09C"/>
                 </a:solidFill>
                 <a:bevel/>
               </a:ln>
@@ -11996,12 +14299,33 @@
               </a:fontRef>
             </p:style>
           </p:cxnSp>
+        </p:grpSp>
+        <p:grpSp>
+          <p:nvGrpSpPr>
+            <p:cNvPr id="44" name="Gruppieren 43">
+              <a:extLst>
+                <a:ext uri="{FF2B5EF4-FFF2-40B4-BE49-F238E27FC236}">
+                  <a16:creationId xmlns:a16="http://schemas.microsoft.com/office/drawing/2014/main" id="{B7412787-9D3C-4BC6-91D7-56C42F80004C}"/>
+                </a:ext>
+              </a:extLst>
+            </p:cNvPr>
+            <p:cNvGrpSpPr/>
+            <p:nvPr/>
+          </p:nvGrpSpPr>
+          <p:grpSpPr>
+            <a:xfrm rot="21051589">
+              <a:off x="6732228" y="4285672"/>
+              <a:ext cx="282204" cy="403213"/>
+              <a:chOff x="2585034" y="4020194"/>
+              <a:chExt cx="282204" cy="403213"/>
+            </a:xfrm>
+          </p:grpSpPr>
           <p:cxnSp>
             <p:nvCxnSpPr>
-              <p:cNvPr id="25" name="Gerader Verbinder 24">
+              <p:cNvPr id="45" name="Gerader Verbinder 44">
                 <a:extLst>
                   <a:ext uri="{FF2B5EF4-FFF2-40B4-BE49-F238E27FC236}">
-                    <a16:creationId xmlns:a16="http://schemas.microsoft.com/office/drawing/2014/main" id="{3A58C809-E6B7-484D-9822-118182210796}"/>
+                    <a16:creationId xmlns:a16="http://schemas.microsoft.com/office/drawing/2014/main" id="{84FACAAD-BD60-49A3-B805-569EB95D7674}"/>
                   </a:ext>
                 </a:extLst>
               </p:cNvPr>
@@ -12012,15 +14336,15 @@
             </p:nvCxnSpPr>
             <p:spPr>
               <a:xfrm flipH="1" flipV="1">
-                <a:off x="2444024" y="1798320"/>
-                <a:ext cx="626836" cy="648248"/>
+                <a:off x="2585034" y="4263338"/>
+                <a:ext cx="137897" cy="160069"/>
               </a:xfrm>
               <a:prstGeom prst="line">
                 <a:avLst/>
               </a:prstGeom>
               <a:ln w="101600" cap="rnd">
                 <a:solidFill>
-                  <a:srgbClr val="CC3300"/>
+                  <a:srgbClr val="AFE09C"/>
                 </a:solidFill>
                 <a:bevel/>
               </a:ln>
@@ -12040,35 +14364,12 @@
               </a:fontRef>
             </p:style>
           </p:cxnSp>
-        </p:grpSp>
-        <p:grpSp>
-          <p:nvGrpSpPr>
-            <p:cNvPr id="20" name="Gruppieren 19">
-              <a:extLst>
-                <a:ext uri="{FF2B5EF4-FFF2-40B4-BE49-F238E27FC236}">
-                  <a16:creationId xmlns:a16="http://schemas.microsoft.com/office/drawing/2014/main" id="{5235C111-A2A8-4349-80F4-8C1B23AD0518}"/>
-                </a:ext>
-              </a:extLst>
-            </p:cNvPr>
-            <p:cNvGrpSpPr>
-              <a:grpSpLocks noChangeAspect="1"/>
-            </p:cNvGrpSpPr>
-            <p:nvPr/>
-          </p:nvGrpSpPr>
-          <p:grpSpPr>
-            <a:xfrm rot="21072129">
-              <a:off x="6718305" y="4312671"/>
-              <a:ext cx="539071" cy="557484"/>
-              <a:chOff x="2444024" y="1798320"/>
-              <a:chExt cx="626836" cy="648248"/>
-            </a:xfrm>
-          </p:grpSpPr>
           <p:cxnSp>
             <p:nvCxnSpPr>
-              <p:cNvPr id="22" name="Gerader Verbinder 21">
+              <p:cNvPr id="46" name="Gerader Verbinder 45">
                 <a:extLst>
                   <a:ext uri="{FF2B5EF4-FFF2-40B4-BE49-F238E27FC236}">
-                    <a16:creationId xmlns:a16="http://schemas.microsoft.com/office/drawing/2014/main" id="{2540610C-D886-4FDB-8F68-194E05D8CB74}"/>
+                    <a16:creationId xmlns:a16="http://schemas.microsoft.com/office/drawing/2014/main" id="{5BC0E967-D306-46E2-BE2D-4AD59C148F83}"/>
                   </a:ext>
                 </a:extLst>
               </p:cNvPr>
@@ -12079,15 +14380,15 @@
             </p:nvCxnSpPr>
             <p:spPr>
               <a:xfrm flipV="1">
-                <a:off x="2444024" y="1798320"/>
-                <a:ext cx="626836" cy="648248"/>
+                <a:off x="2740975" y="4020194"/>
+                <a:ext cx="126263" cy="394012"/>
               </a:xfrm>
               <a:prstGeom prst="line">
                 <a:avLst/>
               </a:prstGeom>
               <a:ln w="101600" cap="rnd">
                 <a:solidFill>
-                  <a:srgbClr val="CC3300"/>
+                  <a:srgbClr val="AFE09C"/>
                 </a:solidFill>
                 <a:bevel/>
               </a:ln>
@@ -12107,12 +14408,33 @@
               </a:fontRef>
             </p:style>
           </p:cxnSp>
+        </p:grpSp>
+        <p:grpSp>
+          <p:nvGrpSpPr>
+            <p:cNvPr id="47" name="Gruppieren 46">
+              <a:extLst>
+                <a:ext uri="{FF2B5EF4-FFF2-40B4-BE49-F238E27FC236}">
+                  <a16:creationId xmlns:a16="http://schemas.microsoft.com/office/drawing/2014/main" id="{80A9686D-6229-43B3-92B3-A068AAD07628}"/>
+                </a:ext>
+              </a:extLst>
+            </p:cNvPr>
+            <p:cNvGrpSpPr/>
+            <p:nvPr/>
+          </p:nvGrpSpPr>
+          <p:grpSpPr>
+            <a:xfrm rot="21051589">
+              <a:off x="4897588" y="5206792"/>
+              <a:ext cx="282204" cy="403213"/>
+              <a:chOff x="2585034" y="4020194"/>
+              <a:chExt cx="282204" cy="403213"/>
+            </a:xfrm>
+          </p:grpSpPr>
           <p:cxnSp>
             <p:nvCxnSpPr>
-              <p:cNvPr id="23" name="Gerader Verbinder 22">
+              <p:cNvPr id="48" name="Gerader Verbinder 47">
                 <a:extLst>
                   <a:ext uri="{FF2B5EF4-FFF2-40B4-BE49-F238E27FC236}">
-                    <a16:creationId xmlns:a16="http://schemas.microsoft.com/office/drawing/2014/main" id="{6A441C0C-1D5D-423C-BBEE-D6ADD1E93B6C}"/>
+                    <a16:creationId xmlns:a16="http://schemas.microsoft.com/office/drawing/2014/main" id="{3DA35493-CE92-4522-9F66-19EF48C07EBF}"/>
                   </a:ext>
                 </a:extLst>
               </p:cNvPr>
@@ -12123,15 +14445,59 @@
             </p:nvCxnSpPr>
             <p:spPr>
               <a:xfrm flipH="1" flipV="1">
-                <a:off x="2444024" y="1798320"/>
-                <a:ext cx="626836" cy="648248"/>
+                <a:off x="2585034" y="4263338"/>
+                <a:ext cx="137897" cy="160069"/>
               </a:xfrm>
               <a:prstGeom prst="line">
                 <a:avLst/>
               </a:prstGeom>
               <a:ln w="101600" cap="rnd">
                 <a:solidFill>
-                  <a:srgbClr val="CC3300"/>
+                  <a:srgbClr val="AFE09C"/>
+                </a:solidFill>
+                <a:bevel/>
+              </a:ln>
+            </p:spPr>
+            <p:style>
+              <a:lnRef idx="1">
+                <a:schemeClr val="dk1"/>
+              </a:lnRef>
+              <a:fillRef idx="0">
+                <a:schemeClr val="dk1"/>
+              </a:fillRef>
+              <a:effectRef idx="0">
+                <a:schemeClr val="dk1"/>
+              </a:effectRef>
+              <a:fontRef idx="minor">
+                <a:schemeClr val="tx1"/>
+              </a:fontRef>
+            </p:style>
+          </p:cxnSp>
+          <p:cxnSp>
+            <p:nvCxnSpPr>
+              <p:cNvPr id="49" name="Gerader Verbinder 48">
+                <a:extLst>
+                  <a:ext uri="{FF2B5EF4-FFF2-40B4-BE49-F238E27FC236}">
+                    <a16:creationId xmlns:a16="http://schemas.microsoft.com/office/drawing/2014/main" id="{91957CA5-6F4E-4E45-B2E7-DE0BAED3FCDD}"/>
+                  </a:ext>
+                </a:extLst>
+              </p:cNvPr>
+              <p:cNvCxnSpPr>
+                <a:cxnSpLocks/>
+              </p:cNvCxnSpPr>
+              <p:nvPr/>
+            </p:nvCxnSpPr>
+            <p:spPr>
+              <a:xfrm flipV="1">
+                <a:off x="2740975" y="4020194"/>
+                <a:ext cx="126263" cy="394012"/>
+              </a:xfrm>
+              <a:prstGeom prst="line">
+                <a:avLst/>
+              </a:prstGeom>
+              <a:ln w="101600" cap="rnd">
+                <a:solidFill>
+                  <a:srgbClr val="AFE09C"/>
                 </a:solidFill>
                 <a:bevel/>
               </a:ln>
@@ -12153,74 +14519,6 @@
           </p:cxnSp>
         </p:grpSp>
       </p:grpSp>
-      <p:sp>
-        <p:nvSpPr>
-          <p:cNvPr id="2" name="Interaktive Schaltfläche: Leer 1">
-            <a:hlinkClick r:id="rId4" action="ppaction://hlinksldjump" highlightClick="1"/>
-            <a:extLst>
-              <a:ext uri="{FF2B5EF4-FFF2-40B4-BE49-F238E27FC236}">
-                <a16:creationId xmlns:a16="http://schemas.microsoft.com/office/drawing/2014/main" id="{FF27FA7E-769F-4452-B32E-8870699F8523}"/>
-              </a:ext>
-            </a:extLst>
-          </p:cNvPr>
-          <p:cNvSpPr>
-            <a:spLocks noChangeAspect="1"/>
-          </p:cNvSpPr>
-          <p:nvPr/>
-        </p:nvSpPr>
-        <p:spPr>
-          <a:xfrm>
-            <a:off x="6903785" y="996067"/>
-            <a:ext cx="360000" cy="360000"/>
-          </a:xfrm>
-          <a:prstGeom prst="actionButtonBlank">
-            <a:avLst/>
-          </a:prstGeom>
-          <a:blipFill dpi="0" rotWithShape="1">
-            <a:blip r:embed="rId5">
-              <a:extLst>
-                <a:ext uri="{28A0092B-C50C-407E-A947-70E740481C1C}">
-                  <a14:useLocalDpi xmlns:a14="http://schemas.microsoft.com/office/drawing/2010/main" val="0"/>
-                </a:ext>
-                <a:ext uri="{837473B0-CC2E-450A-ABE3-18F120FF3D39}">
-                  <a1611:picAttrSrcUrl xmlns:a1611="http://schemas.microsoft.com/office/drawing/2016/11/main" r:id="rId6"/>
-                </a:ext>
-              </a:extLst>
-            </a:blip>
-            <a:srcRect/>
-            <a:stretch>
-              <a:fillRect/>
-            </a:stretch>
-          </a:blipFill>
-          <a:ln>
-            <a:noFill/>
-          </a:ln>
-        </p:spPr>
-        <p:style>
-          <a:lnRef idx="2">
-            <a:schemeClr val="accent1">
-              <a:shade val="50000"/>
-            </a:schemeClr>
-          </a:lnRef>
-          <a:fillRef idx="1">
-            <a:schemeClr val="accent1"/>
-          </a:fillRef>
-          <a:effectRef idx="0">
-            <a:schemeClr val="accent1"/>
-          </a:effectRef>
-          <a:fontRef idx="minor">
-            <a:schemeClr val="lt1"/>
-          </a:fontRef>
-        </p:style>
-        <p:txBody>
-          <a:bodyPr rtlCol="0" anchor="ctr"/>
-          <a:lstStyle/>
-          <a:p>
-            <a:pPr algn="ctr"/>
-            <a:endParaRPr lang="de-DE"/>
-          </a:p>
-        </p:txBody>
-      </p:sp>
       <p:sp>
         <p:nvSpPr>
           <p:cNvPr id="4" name="Rechteck 3">
@@ -12235,7 +14533,7 @@
         </p:nvSpPr>
         <p:spPr>
           <a:xfrm>
-            <a:off x="3543309" y="317409"/>
+            <a:off x="3555206" y="996067"/>
             <a:ext cx="1200702" cy="5633333"/>
           </a:xfrm>
           <a:prstGeom prst="rect">
@@ -12391,7 +14689,7 @@
         </p:nvSpPr>
         <p:spPr>
           <a:xfrm>
-            <a:off x="7366934" y="2645597"/>
+            <a:off x="7366934" y="2615117"/>
             <a:ext cx="72573" cy="3296443"/>
           </a:xfrm>
           <a:prstGeom prst="rect">
@@ -12429,100 +14727,10 @@
           </a:p>
         </p:txBody>
       </p:sp>
-      <p:cxnSp>
-        <p:nvCxnSpPr>
-          <p:cNvPr id="30" name="Gerader Verbinder 29">
-            <a:extLst>
-              <a:ext uri="{FF2B5EF4-FFF2-40B4-BE49-F238E27FC236}">
-                <a16:creationId xmlns:a16="http://schemas.microsoft.com/office/drawing/2014/main" id="{C782E794-B439-4152-AF69-BB0DF1D58107}"/>
-              </a:ext>
-            </a:extLst>
-          </p:cNvPr>
-          <p:cNvCxnSpPr>
-            <a:cxnSpLocks/>
-          </p:cNvCxnSpPr>
-          <p:nvPr/>
-        </p:nvCxnSpPr>
-        <p:spPr>
-          <a:xfrm>
-            <a:off x="5005932" y="2832238"/>
-            <a:ext cx="2215529" cy="0"/>
-          </a:xfrm>
-          <a:prstGeom prst="line">
-            <a:avLst/>
-          </a:prstGeom>
-        </p:spPr>
-        <p:style>
-          <a:lnRef idx="1">
-            <a:schemeClr val="dk1"/>
-          </a:lnRef>
-          <a:fillRef idx="0">
-            <a:schemeClr val="dk1"/>
-          </a:fillRef>
-          <a:effectRef idx="0">
-            <a:schemeClr val="dk1"/>
-          </a:effectRef>
-          <a:fontRef idx="minor">
-            <a:schemeClr val="tx1"/>
-          </a:fontRef>
-        </p:style>
-      </p:cxnSp>
-      <p:sp>
-        <p:nvSpPr>
-          <p:cNvPr id="34" name="Textfeld 33">
-            <a:extLst>
-              <a:ext uri="{FF2B5EF4-FFF2-40B4-BE49-F238E27FC236}">
-                <a16:creationId xmlns:a16="http://schemas.microsoft.com/office/drawing/2014/main" id="{FFBAF696-D3DE-40F7-ABD5-30DE26882D4E}"/>
-              </a:ext>
-            </a:extLst>
-          </p:cNvPr>
-          <p:cNvSpPr txBox="1"/>
-          <p:nvPr/>
-        </p:nvSpPr>
-        <p:spPr>
-          <a:xfrm>
-            <a:off x="4885055" y="2888460"/>
-            <a:ext cx="2468946" cy="553998"/>
-          </a:xfrm>
-          <a:prstGeom prst="rect">
-            <a:avLst/>
-          </a:prstGeom>
-          <a:noFill/>
-          <a:ln>
-            <a:noFill/>
-          </a:ln>
-        </p:spPr>
-        <p:txBody>
-          <a:bodyPr wrap="square" rtlCol="0">
-            <a:spAutoFit/>
-          </a:bodyPr>
-          <a:lstStyle/>
-          <a:p>
-            <a:pPr algn="ctr"/>
-            <a:r>
-              <a:rPr lang="de-DE" b="1" dirty="0">
-                <a:latin typeface="Roboto" panose="02000000000000000000" pitchFamily="2" charset="0"/>
-                <a:ea typeface="Roboto" panose="02000000000000000000" pitchFamily="2" charset="0"/>
-              </a:rPr>
-              <a:t>Mittwoch, 3./4.</a:t>
-            </a:r>
-          </a:p>
-          <a:p>
-            <a:pPr algn="ctr"/>
-            <a:r>
-              <a:rPr lang="de-DE" sz="1200" dirty="0">
-                <a:latin typeface="Roboto Thin" panose="02000000000000000000" pitchFamily="2" charset="0"/>
-                <a:ea typeface="Roboto Thin" panose="02000000000000000000" pitchFamily="2" charset="0"/>
-              </a:rPr>
-              <a:t>Physik bei DY statt Mathe</a:t>
-            </a:r>
-          </a:p>
-        </p:txBody>
-      </p:sp>
     </p:spTree>
     <p:extLst>
       <p:ext uri="{BB962C8B-B14F-4D97-AF65-F5344CB8AC3E}">
-        <p14:creationId xmlns:p14="http://schemas.microsoft.com/office/powerpoint/2010/main" val="3462233811"/>
+        <p14:creationId xmlns:p14="http://schemas.microsoft.com/office/powerpoint/2010/main" val="3359478284"/>
       </p:ext>
     </p:extLst>
   </p:cSld>

</xml_diff>

<commit_message>
Events werden ausgelesen und angezeigt; Momentan werden Events vom aktuellen Datum und den 2 folgenden Tagen ausgelesen
</commit_message>
<xml_diff>
--- a/doc/vertretungsalarm.pptx
+++ b/doc/vertretungsalarm.pptx
@@ -271,7 +271,7 @@
           <a:p>
             <a:fld id="{E4E225A6-F9C6-4B3F-A3A1-E1FDB84ED865}" type="datetimeFigureOut">
               <a:rPr lang="de-DE" smtClean="0"/>
-              <a:t>15.08.2019</a:t>
+              <a:t>18.08.2019</a:t>
             </a:fld>
             <a:endParaRPr lang="de-DE"/>
           </a:p>
@@ -559,7 +559,7 @@
           <a:p>
             <a:fld id="{E4E225A6-F9C6-4B3F-A3A1-E1FDB84ED865}" type="datetimeFigureOut">
               <a:rPr lang="de-DE" smtClean="0"/>
-              <a:t>15.08.2019</a:t>
+              <a:t>18.08.2019</a:t>
             </a:fld>
             <a:endParaRPr lang="de-DE"/>
           </a:p>
@@ -757,7 +757,7 @@
           <a:p>
             <a:fld id="{E4E225A6-F9C6-4B3F-A3A1-E1FDB84ED865}" type="datetimeFigureOut">
               <a:rPr lang="de-DE" smtClean="0"/>
-              <a:t>15.08.2019</a:t>
+              <a:t>18.08.2019</a:t>
             </a:fld>
             <a:endParaRPr lang="de-DE"/>
           </a:p>
@@ -965,7 +965,7 @@
           <a:p>
             <a:fld id="{E4E225A6-F9C6-4B3F-A3A1-E1FDB84ED865}" type="datetimeFigureOut">
               <a:rPr lang="de-DE" smtClean="0"/>
-              <a:t>15.08.2019</a:t>
+              <a:t>18.08.2019</a:t>
             </a:fld>
             <a:endParaRPr lang="de-DE"/>
           </a:p>
@@ -1163,7 +1163,7 @@
           <a:p>
             <a:fld id="{E4E225A6-F9C6-4B3F-A3A1-E1FDB84ED865}" type="datetimeFigureOut">
               <a:rPr lang="de-DE" smtClean="0"/>
-              <a:t>15.08.2019</a:t>
+              <a:t>18.08.2019</a:t>
             </a:fld>
             <a:endParaRPr lang="de-DE"/>
           </a:p>
@@ -1438,7 +1438,7 @@
           <a:p>
             <a:fld id="{E4E225A6-F9C6-4B3F-A3A1-E1FDB84ED865}" type="datetimeFigureOut">
               <a:rPr lang="de-DE" smtClean="0"/>
-              <a:t>15.08.2019</a:t>
+              <a:t>18.08.2019</a:t>
             </a:fld>
             <a:endParaRPr lang="de-DE"/>
           </a:p>
@@ -1703,7 +1703,7 @@
           <a:p>
             <a:fld id="{E4E225A6-F9C6-4B3F-A3A1-E1FDB84ED865}" type="datetimeFigureOut">
               <a:rPr lang="de-DE" smtClean="0"/>
-              <a:t>15.08.2019</a:t>
+              <a:t>18.08.2019</a:t>
             </a:fld>
             <a:endParaRPr lang="de-DE"/>
           </a:p>
@@ -2115,7 +2115,7 @@
           <a:p>
             <a:fld id="{E4E225A6-F9C6-4B3F-A3A1-E1FDB84ED865}" type="datetimeFigureOut">
               <a:rPr lang="de-DE" smtClean="0"/>
-              <a:t>15.08.2019</a:t>
+              <a:t>18.08.2019</a:t>
             </a:fld>
             <a:endParaRPr lang="de-DE"/>
           </a:p>
@@ -2256,7 +2256,7 @@
           <a:p>
             <a:fld id="{E4E225A6-F9C6-4B3F-A3A1-E1FDB84ED865}" type="datetimeFigureOut">
               <a:rPr lang="de-DE" smtClean="0"/>
-              <a:t>15.08.2019</a:t>
+              <a:t>18.08.2019</a:t>
             </a:fld>
             <a:endParaRPr lang="de-DE"/>
           </a:p>
@@ -2369,7 +2369,7 @@
           <a:p>
             <a:fld id="{E4E225A6-F9C6-4B3F-A3A1-E1FDB84ED865}" type="datetimeFigureOut">
               <a:rPr lang="de-DE" smtClean="0"/>
-              <a:t>15.08.2019</a:t>
+              <a:t>18.08.2019</a:t>
             </a:fld>
             <a:endParaRPr lang="de-DE"/>
           </a:p>
@@ -2816,7 +2816,7 @@
           <a:p>
             <a:fld id="{E4E225A6-F9C6-4B3F-A3A1-E1FDB84ED865}" type="datetimeFigureOut">
               <a:rPr lang="de-DE" smtClean="0"/>
-              <a:t>15.08.2019</a:t>
+              <a:t>18.08.2019</a:t>
             </a:fld>
             <a:endParaRPr lang="de-DE"/>
           </a:p>
@@ -3057,7 +3057,7 @@
           <a:p>
             <a:fld id="{E4E225A6-F9C6-4B3F-A3A1-E1FDB84ED865}" type="datetimeFigureOut">
               <a:rPr lang="de-DE" smtClean="0"/>
-              <a:t>15.08.2019</a:t>
+              <a:t>18.08.2019</a:t>
             </a:fld>
             <a:endParaRPr lang="de-DE"/>
           </a:p>
@@ -12416,8 +12416,8 @@
           <p:nvPr/>
         </p:nvSpPr>
         <p:spPr>
-          <a:xfrm rot="21108025">
-            <a:off x="5017669" y="2628507"/>
+          <a:xfrm>
+            <a:off x="4940820" y="1857477"/>
             <a:ext cx="2334809" cy="923330"/>
           </a:xfrm>
           <a:prstGeom prst="rect">

</xml_diff>

<commit_message>
Kleine Änderungen am Design; MessageBox eingebunden; Refresh Funktion im VertretungsScreen; Anzeige für einen leeren Vertretungsplan hinzugefügt
</commit_message>
<xml_diff>
--- a/doc/vertretungsalarm.pptx
+++ b/doc/vertretungsalarm.pptx
@@ -7,17 +7,18 @@
   <p:sldIdLst>
     <p:sldId id="256" r:id="rId2"/>
     <p:sldId id="258" r:id="rId3"/>
-    <p:sldId id="265" r:id="rId4"/>
-    <p:sldId id="259" r:id="rId5"/>
-    <p:sldId id="263" r:id="rId6"/>
-    <p:sldId id="257" r:id="rId7"/>
-    <p:sldId id="262" r:id="rId8"/>
-    <p:sldId id="261" r:id="rId9"/>
-    <p:sldId id="268" r:id="rId10"/>
-    <p:sldId id="264" r:id="rId11"/>
-    <p:sldId id="269" r:id="rId12"/>
-    <p:sldId id="266" r:id="rId13"/>
-    <p:sldId id="267" r:id="rId14"/>
+    <p:sldId id="270" r:id="rId4"/>
+    <p:sldId id="265" r:id="rId5"/>
+    <p:sldId id="259" r:id="rId6"/>
+    <p:sldId id="263" r:id="rId7"/>
+    <p:sldId id="257" r:id="rId8"/>
+    <p:sldId id="262" r:id="rId9"/>
+    <p:sldId id="261" r:id="rId10"/>
+    <p:sldId id="268" r:id="rId11"/>
+    <p:sldId id="264" r:id="rId12"/>
+    <p:sldId id="269" r:id="rId13"/>
+    <p:sldId id="266" r:id="rId14"/>
+    <p:sldId id="267" r:id="rId15"/>
   </p:sldIdLst>
   <p:sldSz cx="12192000" cy="6858000"/>
   <p:notesSz cx="6858000" cy="9144000"/>
@@ -271,7 +272,7 @@
           <a:p>
             <a:fld id="{E4E225A6-F9C6-4B3F-A3A1-E1FDB84ED865}" type="datetimeFigureOut">
               <a:rPr lang="de-DE" smtClean="0"/>
-              <a:t>18.08.2019</a:t>
+              <a:t>06.01.2020</a:t>
             </a:fld>
             <a:endParaRPr lang="de-DE"/>
           </a:p>
@@ -559,7 +560,7 @@
           <a:p>
             <a:fld id="{E4E225A6-F9C6-4B3F-A3A1-E1FDB84ED865}" type="datetimeFigureOut">
               <a:rPr lang="de-DE" smtClean="0"/>
-              <a:t>18.08.2019</a:t>
+              <a:t>06.01.2020</a:t>
             </a:fld>
             <a:endParaRPr lang="de-DE"/>
           </a:p>
@@ -757,7 +758,7 @@
           <a:p>
             <a:fld id="{E4E225A6-F9C6-4B3F-A3A1-E1FDB84ED865}" type="datetimeFigureOut">
               <a:rPr lang="de-DE" smtClean="0"/>
-              <a:t>18.08.2019</a:t>
+              <a:t>06.01.2020</a:t>
             </a:fld>
             <a:endParaRPr lang="de-DE"/>
           </a:p>
@@ -965,7 +966,7 @@
           <a:p>
             <a:fld id="{E4E225A6-F9C6-4B3F-A3A1-E1FDB84ED865}" type="datetimeFigureOut">
               <a:rPr lang="de-DE" smtClean="0"/>
-              <a:t>18.08.2019</a:t>
+              <a:t>06.01.2020</a:t>
             </a:fld>
             <a:endParaRPr lang="de-DE"/>
           </a:p>
@@ -1163,7 +1164,7 @@
           <a:p>
             <a:fld id="{E4E225A6-F9C6-4B3F-A3A1-E1FDB84ED865}" type="datetimeFigureOut">
               <a:rPr lang="de-DE" smtClean="0"/>
-              <a:t>18.08.2019</a:t>
+              <a:t>06.01.2020</a:t>
             </a:fld>
             <a:endParaRPr lang="de-DE"/>
           </a:p>
@@ -1438,7 +1439,7 @@
           <a:p>
             <a:fld id="{E4E225A6-F9C6-4B3F-A3A1-E1FDB84ED865}" type="datetimeFigureOut">
               <a:rPr lang="de-DE" smtClean="0"/>
-              <a:t>18.08.2019</a:t>
+              <a:t>06.01.2020</a:t>
             </a:fld>
             <a:endParaRPr lang="de-DE"/>
           </a:p>
@@ -1703,7 +1704,7 @@
           <a:p>
             <a:fld id="{E4E225A6-F9C6-4B3F-A3A1-E1FDB84ED865}" type="datetimeFigureOut">
               <a:rPr lang="de-DE" smtClean="0"/>
-              <a:t>18.08.2019</a:t>
+              <a:t>06.01.2020</a:t>
             </a:fld>
             <a:endParaRPr lang="de-DE"/>
           </a:p>
@@ -2115,7 +2116,7 @@
           <a:p>
             <a:fld id="{E4E225A6-F9C6-4B3F-A3A1-E1FDB84ED865}" type="datetimeFigureOut">
               <a:rPr lang="de-DE" smtClean="0"/>
-              <a:t>18.08.2019</a:t>
+              <a:t>06.01.2020</a:t>
             </a:fld>
             <a:endParaRPr lang="de-DE"/>
           </a:p>
@@ -2256,7 +2257,7 @@
           <a:p>
             <a:fld id="{E4E225A6-F9C6-4B3F-A3A1-E1FDB84ED865}" type="datetimeFigureOut">
               <a:rPr lang="de-DE" smtClean="0"/>
-              <a:t>18.08.2019</a:t>
+              <a:t>06.01.2020</a:t>
             </a:fld>
             <a:endParaRPr lang="de-DE"/>
           </a:p>
@@ -2369,7 +2370,7 @@
           <a:p>
             <a:fld id="{E4E225A6-F9C6-4B3F-A3A1-E1FDB84ED865}" type="datetimeFigureOut">
               <a:rPr lang="de-DE" smtClean="0"/>
-              <a:t>18.08.2019</a:t>
+              <a:t>06.01.2020</a:t>
             </a:fld>
             <a:endParaRPr lang="de-DE"/>
           </a:p>
@@ -2816,7 +2817,7 @@
           <a:p>
             <a:fld id="{E4E225A6-F9C6-4B3F-A3A1-E1FDB84ED865}" type="datetimeFigureOut">
               <a:rPr lang="de-DE" smtClean="0"/>
-              <a:t>18.08.2019</a:t>
+              <a:t>06.01.2020</a:t>
             </a:fld>
             <a:endParaRPr lang="de-DE"/>
           </a:p>
@@ -3057,7 +3058,7 @@
           <a:p>
             <a:fld id="{E4E225A6-F9C6-4B3F-A3A1-E1FDB84ED865}" type="datetimeFigureOut">
               <a:rPr lang="de-DE" smtClean="0"/>
-              <a:t>18.08.2019</a:t>
+              <a:t>06.01.2020</a:t>
             </a:fld>
             <a:endParaRPr lang="de-DE"/>
           </a:p>
@@ -4523,6 +4524,1140 @@
           </a:p>
         </p:txBody>
       </p:sp>
+      <p:grpSp>
+        <p:nvGrpSpPr>
+          <p:cNvPr id="50" name="Gruppieren 49">
+            <a:extLst>
+              <a:ext uri="{FF2B5EF4-FFF2-40B4-BE49-F238E27FC236}">
+                <a16:creationId xmlns:a16="http://schemas.microsoft.com/office/drawing/2014/main" id="{38E3DDDE-093D-4785-AB58-0997A1A2F6BE}"/>
+              </a:ext>
+            </a:extLst>
+          </p:cNvPr>
+          <p:cNvGrpSpPr/>
+          <p:nvPr/>
+        </p:nvGrpSpPr>
+        <p:grpSpPr>
+          <a:xfrm>
+            <a:off x="4546600" y="3429000"/>
+            <a:ext cx="3289602" cy="2251646"/>
+            <a:chOff x="4546600" y="3429000"/>
+            <a:chExt cx="3289602" cy="2251646"/>
+          </a:xfrm>
+        </p:grpSpPr>
+        <p:grpSp>
+          <p:nvGrpSpPr>
+            <p:cNvPr id="7" name="Gruppieren 6">
+              <a:extLst>
+                <a:ext uri="{FF2B5EF4-FFF2-40B4-BE49-F238E27FC236}">
+                  <a16:creationId xmlns:a16="http://schemas.microsoft.com/office/drawing/2014/main" id="{B12105FB-DB5D-46E8-BD0E-AD84D49102E3}"/>
+                </a:ext>
+              </a:extLst>
+            </p:cNvPr>
+            <p:cNvGrpSpPr>
+              <a:grpSpLocks noChangeAspect="1"/>
+            </p:cNvGrpSpPr>
+            <p:nvPr/>
+          </p:nvGrpSpPr>
+          <p:grpSpPr>
+            <a:xfrm>
+              <a:off x="4546600" y="3429000"/>
+              <a:ext cx="3289602" cy="2251646"/>
+              <a:chOff x="4162538" y="1754812"/>
+              <a:chExt cx="5208401" cy="3565012"/>
+            </a:xfrm>
+          </p:grpSpPr>
+          <p:sp>
+            <p:nvSpPr>
+              <p:cNvPr id="8" name="Rechteck: abgerundete Ecken 7">
+                <a:extLst>
+                  <a:ext uri="{FF2B5EF4-FFF2-40B4-BE49-F238E27FC236}">
+                    <a16:creationId xmlns:a16="http://schemas.microsoft.com/office/drawing/2014/main" id="{49B38451-F86C-47B9-84DF-D1672673850F}"/>
+                  </a:ext>
+                </a:extLst>
+              </p:cNvPr>
+              <p:cNvSpPr/>
+              <p:nvPr/>
+            </p:nvSpPr>
+            <p:spPr>
+              <a:xfrm rot="21113087">
+                <a:off x="4233616" y="1979945"/>
+                <a:ext cx="5046210" cy="3140403"/>
+              </a:xfrm>
+              <a:prstGeom prst="roundRect">
+                <a:avLst>
+                  <a:gd name="adj" fmla="val 11051"/>
+                </a:avLst>
+              </a:prstGeom>
+              <a:solidFill>
+                <a:srgbClr val="ECE9FC"/>
+              </a:solidFill>
+              <a:ln w="76200" cap="rnd" cmpd="sng">
+                <a:solidFill>
+                  <a:srgbClr val="D1DDF7"/>
+                </a:solidFill>
+                <a:round/>
+              </a:ln>
+            </p:spPr>
+            <p:style>
+              <a:lnRef idx="2">
+                <a:schemeClr val="accent1">
+                  <a:shade val="50000"/>
+                </a:schemeClr>
+              </a:lnRef>
+              <a:fillRef idx="1">
+                <a:schemeClr val="accent1"/>
+              </a:fillRef>
+              <a:effectRef idx="0">
+                <a:schemeClr val="accent1"/>
+              </a:effectRef>
+              <a:fontRef idx="minor">
+                <a:schemeClr val="lt1"/>
+              </a:fontRef>
+            </p:style>
+            <p:txBody>
+              <a:bodyPr rtlCol="0" anchor="ctr"/>
+              <a:lstStyle/>
+              <a:p>
+                <a:pPr algn="ctr"/>
+                <a:endParaRPr lang="de-DE" dirty="0"/>
+              </a:p>
+            </p:txBody>
+          </p:sp>
+          <p:cxnSp>
+            <p:nvCxnSpPr>
+              <p:cNvPr id="9" name="Gerader Verbinder 8">
+                <a:extLst>
+                  <a:ext uri="{FF2B5EF4-FFF2-40B4-BE49-F238E27FC236}">
+                    <a16:creationId xmlns:a16="http://schemas.microsoft.com/office/drawing/2014/main" id="{289E7F2E-5D03-433C-B606-2EB7ABAB13EA}"/>
+                  </a:ext>
+                </a:extLst>
+              </p:cNvPr>
+              <p:cNvCxnSpPr>
+                <a:cxnSpLocks/>
+              </p:cNvCxnSpPr>
+              <p:nvPr/>
+            </p:nvCxnSpPr>
+            <p:spPr>
+              <a:xfrm>
+                <a:off x="5055783" y="2170954"/>
+                <a:ext cx="466437" cy="3148870"/>
+              </a:xfrm>
+              <a:prstGeom prst="line">
+                <a:avLst/>
+              </a:prstGeom>
+              <a:ln w="76200">
+                <a:solidFill>
+                  <a:srgbClr val="D1DDF7"/>
+                </a:solidFill>
+              </a:ln>
+            </p:spPr>
+            <p:style>
+              <a:lnRef idx="1">
+                <a:schemeClr val="accent1"/>
+              </a:lnRef>
+              <a:fillRef idx="0">
+                <a:schemeClr val="accent1"/>
+              </a:fillRef>
+              <a:effectRef idx="0">
+                <a:schemeClr val="accent1"/>
+              </a:effectRef>
+              <a:fontRef idx="minor">
+                <a:schemeClr val="tx1"/>
+              </a:fontRef>
+            </p:style>
+          </p:cxnSp>
+          <p:cxnSp>
+            <p:nvCxnSpPr>
+              <p:cNvPr id="11" name="Gerader Verbinder 10">
+                <a:extLst>
+                  <a:ext uri="{FF2B5EF4-FFF2-40B4-BE49-F238E27FC236}">
+                    <a16:creationId xmlns:a16="http://schemas.microsoft.com/office/drawing/2014/main" id="{B103D0FC-111F-4168-A4CA-D754233ADA19}"/>
+                  </a:ext>
+                </a:extLst>
+              </p:cNvPr>
+              <p:cNvCxnSpPr>
+                <a:cxnSpLocks/>
+              </p:cNvCxnSpPr>
+              <p:nvPr/>
+            </p:nvCxnSpPr>
+            <p:spPr>
+              <a:xfrm flipV="1">
+                <a:off x="4162538" y="2696959"/>
+                <a:ext cx="5020199" cy="757711"/>
+              </a:xfrm>
+              <a:prstGeom prst="line">
+                <a:avLst/>
+              </a:prstGeom>
+              <a:ln w="76200">
+                <a:solidFill>
+                  <a:srgbClr val="D1DDF7"/>
+                </a:solidFill>
+              </a:ln>
+            </p:spPr>
+            <p:style>
+              <a:lnRef idx="1">
+                <a:schemeClr val="accent1"/>
+              </a:lnRef>
+              <a:fillRef idx="0">
+                <a:schemeClr val="accent1"/>
+              </a:fillRef>
+              <a:effectRef idx="0">
+                <a:schemeClr val="accent1"/>
+              </a:effectRef>
+              <a:fontRef idx="minor">
+                <a:schemeClr val="tx1"/>
+              </a:fontRef>
+            </p:style>
+          </p:cxnSp>
+          <p:cxnSp>
+            <p:nvCxnSpPr>
+              <p:cNvPr id="12" name="Gerader Verbinder 11">
+                <a:extLst>
+                  <a:ext uri="{FF2B5EF4-FFF2-40B4-BE49-F238E27FC236}">
+                    <a16:creationId xmlns:a16="http://schemas.microsoft.com/office/drawing/2014/main" id="{35E76898-9553-4AA0-8FD8-11547D97BBB4}"/>
+                  </a:ext>
+                </a:extLst>
+              </p:cNvPr>
+              <p:cNvCxnSpPr>
+                <a:cxnSpLocks/>
+              </p:cNvCxnSpPr>
+              <p:nvPr/>
+            </p:nvCxnSpPr>
+            <p:spPr>
+              <a:xfrm flipV="1">
+                <a:off x="4375261" y="3745389"/>
+                <a:ext cx="4995678" cy="712344"/>
+              </a:xfrm>
+              <a:prstGeom prst="line">
+                <a:avLst/>
+              </a:prstGeom>
+              <a:ln w="76200">
+                <a:solidFill>
+                  <a:srgbClr val="D1DDF7"/>
+                </a:solidFill>
+              </a:ln>
+            </p:spPr>
+            <p:style>
+              <a:lnRef idx="1">
+                <a:schemeClr val="accent1"/>
+              </a:lnRef>
+              <a:fillRef idx="0">
+                <a:schemeClr val="accent1"/>
+              </a:fillRef>
+              <a:effectRef idx="0">
+                <a:schemeClr val="accent1"/>
+              </a:effectRef>
+              <a:fontRef idx="minor">
+                <a:schemeClr val="tx1"/>
+              </a:fontRef>
+            </p:style>
+          </p:cxnSp>
+          <p:cxnSp>
+            <p:nvCxnSpPr>
+              <p:cNvPr id="13" name="Gerader Verbinder 12">
+                <a:extLst>
+                  <a:ext uri="{FF2B5EF4-FFF2-40B4-BE49-F238E27FC236}">
+                    <a16:creationId xmlns:a16="http://schemas.microsoft.com/office/drawing/2014/main" id="{9BB4B93B-5E88-4E60-9DAF-908393844C4E}"/>
+                  </a:ext>
+                </a:extLst>
+              </p:cNvPr>
+              <p:cNvCxnSpPr>
+                <a:cxnSpLocks/>
+              </p:cNvCxnSpPr>
+              <p:nvPr/>
+            </p:nvCxnSpPr>
+            <p:spPr>
+              <a:xfrm>
+                <a:off x="6096000" y="1995668"/>
+                <a:ext cx="443312" cy="3108955"/>
+              </a:xfrm>
+              <a:prstGeom prst="line">
+                <a:avLst/>
+              </a:prstGeom>
+              <a:ln w="76200">
+                <a:solidFill>
+                  <a:srgbClr val="D1DDF7"/>
+                </a:solidFill>
+              </a:ln>
+            </p:spPr>
+            <p:style>
+              <a:lnRef idx="1">
+                <a:schemeClr val="accent1"/>
+              </a:lnRef>
+              <a:fillRef idx="0">
+                <a:schemeClr val="accent1"/>
+              </a:fillRef>
+              <a:effectRef idx="0">
+                <a:schemeClr val="accent1"/>
+              </a:effectRef>
+              <a:fontRef idx="minor">
+                <a:schemeClr val="tx1"/>
+              </a:fontRef>
+            </p:style>
+          </p:cxnSp>
+          <p:cxnSp>
+            <p:nvCxnSpPr>
+              <p:cNvPr id="14" name="Gerader Verbinder 13">
+                <a:extLst>
+                  <a:ext uri="{FF2B5EF4-FFF2-40B4-BE49-F238E27FC236}">
+                    <a16:creationId xmlns:a16="http://schemas.microsoft.com/office/drawing/2014/main" id="{786B4DFD-810C-4576-A57C-3D8271C77F55}"/>
+                  </a:ext>
+                </a:extLst>
+              </p:cNvPr>
+              <p:cNvCxnSpPr>
+                <a:cxnSpLocks/>
+              </p:cNvCxnSpPr>
+              <p:nvPr/>
+            </p:nvCxnSpPr>
+            <p:spPr>
+              <a:xfrm>
+                <a:off x="8153309" y="1754812"/>
+                <a:ext cx="466437" cy="3148870"/>
+              </a:xfrm>
+              <a:prstGeom prst="line">
+                <a:avLst/>
+              </a:prstGeom>
+              <a:ln w="76200">
+                <a:solidFill>
+                  <a:srgbClr val="D1DDF7"/>
+                </a:solidFill>
+              </a:ln>
+            </p:spPr>
+            <p:style>
+              <a:lnRef idx="1">
+                <a:schemeClr val="accent1"/>
+              </a:lnRef>
+              <a:fillRef idx="0">
+                <a:schemeClr val="accent1"/>
+              </a:fillRef>
+              <a:effectRef idx="0">
+                <a:schemeClr val="accent1"/>
+              </a:effectRef>
+              <a:fontRef idx="minor">
+                <a:schemeClr val="tx1"/>
+              </a:fontRef>
+            </p:style>
+          </p:cxnSp>
+          <p:cxnSp>
+            <p:nvCxnSpPr>
+              <p:cNvPr id="15" name="Gerader Verbinder 14">
+                <a:extLst>
+                  <a:ext uri="{FF2B5EF4-FFF2-40B4-BE49-F238E27FC236}">
+                    <a16:creationId xmlns:a16="http://schemas.microsoft.com/office/drawing/2014/main" id="{A15D7ACF-5762-4C9B-B942-9C6D46095AF0}"/>
+                  </a:ext>
+                </a:extLst>
+              </p:cNvPr>
+              <p:cNvCxnSpPr>
+                <a:cxnSpLocks/>
+              </p:cNvCxnSpPr>
+              <p:nvPr/>
+            </p:nvCxnSpPr>
+            <p:spPr>
+              <a:xfrm>
+                <a:off x="7113092" y="1930557"/>
+                <a:ext cx="466437" cy="3148870"/>
+              </a:xfrm>
+              <a:prstGeom prst="line">
+                <a:avLst/>
+              </a:prstGeom>
+              <a:ln w="76200">
+                <a:solidFill>
+                  <a:srgbClr val="D1DDF7"/>
+                </a:solidFill>
+              </a:ln>
+            </p:spPr>
+            <p:style>
+              <a:lnRef idx="1">
+                <a:schemeClr val="accent1"/>
+              </a:lnRef>
+              <a:fillRef idx="0">
+                <a:schemeClr val="accent1"/>
+              </a:fillRef>
+              <a:effectRef idx="0">
+                <a:schemeClr val="accent1"/>
+              </a:effectRef>
+              <a:fontRef idx="minor">
+                <a:schemeClr val="tx1"/>
+              </a:fontRef>
+            </p:style>
+          </p:cxnSp>
+        </p:grpSp>
+        <p:grpSp>
+          <p:nvGrpSpPr>
+            <p:cNvPr id="40" name="Gruppieren 39">
+              <a:extLst>
+                <a:ext uri="{FF2B5EF4-FFF2-40B4-BE49-F238E27FC236}">
+                  <a16:creationId xmlns:a16="http://schemas.microsoft.com/office/drawing/2014/main" id="{2CB34455-C29B-467A-8ED0-E1088916EA75}"/>
+                </a:ext>
+              </a:extLst>
+            </p:cNvPr>
+            <p:cNvGrpSpPr/>
+            <p:nvPr/>
+          </p:nvGrpSpPr>
+          <p:grpSpPr>
+            <a:xfrm rot="21051589">
+              <a:off x="5358382" y="3819596"/>
+              <a:ext cx="282204" cy="403213"/>
+              <a:chOff x="2585034" y="4020194"/>
+              <a:chExt cx="282204" cy="403213"/>
+            </a:xfrm>
+          </p:grpSpPr>
+          <p:cxnSp>
+            <p:nvCxnSpPr>
+              <p:cNvPr id="34" name="Gerader Verbinder 33">
+                <a:extLst>
+                  <a:ext uri="{FF2B5EF4-FFF2-40B4-BE49-F238E27FC236}">
+                    <a16:creationId xmlns:a16="http://schemas.microsoft.com/office/drawing/2014/main" id="{FED83892-2222-46CC-8BE5-731E606CADE3}"/>
+                  </a:ext>
+                </a:extLst>
+              </p:cNvPr>
+              <p:cNvCxnSpPr>
+                <a:cxnSpLocks/>
+              </p:cNvCxnSpPr>
+              <p:nvPr/>
+            </p:nvCxnSpPr>
+            <p:spPr>
+              <a:xfrm flipH="1" flipV="1">
+                <a:off x="2585034" y="4263338"/>
+                <a:ext cx="137897" cy="160069"/>
+              </a:xfrm>
+              <a:prstGeom prst="line">
+                <a:avLst/>
+              </a:prstGeom>
+              <a:ln w="101600" cap="rnd">
+                <a:solidFill>
+                  <a:srgbClr val="AFE09C"/>
+                </a:solidFill>
+                <a:bevel/>
+              </a:ln>
+            </p:spPr>
+            <p:style>
+              <a:lnRef idx="1">
+                <a:schemeClr val="dk1"/>
+              </a:lnRef>
+              <a:fillRef idx="0">
+                <a:schemeClr val="dk1"/>
+              </a:fillRef>
+              <a:effectRef idx="0">
+                <a:schemeClr val="dk1"/>
+              </a:effectRef>
+              <a:fontRef idx="minor">
+                <a:schemeClr val="tx1"/>
+              </a:fontRef>
+            </p:style>
+          </p:cxnSp>
+          <p:cxnSp>
+            <p:nvCxnSpPr>
+              <p:cNvPr id="36" name="Gerader Verbinder 35">
+                <a:extLst>
+                  <a:ext uri="{FF2B5EF4-FFF2-40B4-BE49-F238E27FC236}">
+                    <a16:creationId xmlns:a16="http://schemas.microsoft.com/office/drawing/2014/main" id="{F93D4496-9693-4625-A371-9913B7DAFC72}"/>
+                  </a:ext>
+                </a:extLst>
+              </p:cNvPr>
+              <p:cNvCxnSpPr>
+                <a:cxnSpLocks/>
+              </p:cNvCxnSpPr>
+              <p:nvPr/>
+            </p:nvCxnSpPr>
+            <p:spPr>
+              <a:xfrm flipV="1">
+                <a:off x="2740975" y="4020194"/>
+                <a:ext cx="126263" cy="394012"/>
+              </a:xfrm>
+              <a:prstGeom prst="line">
+                <a:avLst/>
+              </a:prstGeom>
+              <a:ln w="101600" cap="rnd">
+                <a:solidFill>
+                  <a:srgbClr val="AFE09C"/>
+                </a:solidFill>
+                <a:bevel/>
+              </a:ln>
+            </p:spPr>
+            <p:style>
+              <a:lnRef idx="1">
+                <a:schemeClr val="dk1"/>
+              </a:lnRef>
+              <a:fillRef idx="0">
+                <a:schemeClr val="dk1"/>
+              </a:fillRef>
+              <a:effectRef idx="0">
+                <a:schemeClr val="dk1"/>
+              </a:effectRef>
+              <a:fontRef idx="minor">
+                <a:schemeClr val="tx1"/>
+              </a:fontRef>
+            </p:style>
+          </p:cxnSp>
+        </p:grpSp>
+        <p:grpSp>
+          <p:nvGrpSpPr>
+            <p:cNvPr id="41" name="Gruppieren 40">
+              <a:extLst>
+                <a:ext uri="{FF2B5EF4-FFF2-40B4-BE49-F238E27FC236}">
+                  <a16:creationId xmlns:a16="http://schemas.microsoft.com/office/drawing/2014/main" id="{3C60AA83-CE84-46F8-B9FB-438C9C2E858A}"/>
+                </a:ext>
+              </a:extLst>
+            </p:cNvPr>
+            <p:cNvGrpSpPr/>
+            <p:nvPr/>
+          </p:nvGrpSpPr>
+          <p:grpSpPr>
+            <a:xfrm rot="21051589">
+              <a:off x="6187080" y="5019165"/>
+              <a:ext cx="282204" cy="403213"/>
+              <a:chOff x="2585034" y="4020194"/>
+              <a:chExt cx="282204" cy="403213"/>
+            </a:xfrm>
+          </p:grpSpPr>
+          <p:cxnSp>
+            <p:nvCxnSpPr>
+              <p:cNvPr id="42" name="Gerader Verbinder 41">
+                <a:extLst>
+                  <a:ext uri="{FF2B5EF4-FFF2-40B4-BE49-F238E27FC236}">
+                    <a16:creationId xmlns:a16="http://schemas.microsoft.com/office/drawing/2014/main" id="{B6D677EB-9AEC-4080-8A39-7EEC0A145D31}"/>
+                  </a:ext>
+                </a:extLst>
+              </p:cNvPr>
+              <p:cNvCxnSpPr>
+                <a:cxnSpLocks/>
+              </p:cNvCxnSpPr>
+              <p:nvPr/>
+            </p:nvCxnSpPr>
+            <p:spPr>
+              <a:xfrm flipH="1" flipV="1">
+                <a:off x="2585034" y="4263338"/>
+                <a:ext cx="137897" cy="160069"/>
+              </a:xfrm>
+              <a:prstGeom prst="line">
+                <a:avLst/>
+              </a:prstGeom>
+              <a:ln w="101600" cap="rnd">
+                <a:solidFill>
+                  <a:srgbClr val="AFE09C"/>
+                </a:solidFill>
+                <a:bevel/>
+              </a:ln>
+            </p:spPr>
+            <p:style>
+              <a:lnRef idx="1">
+                <a:schemeClr val="dk1"/>
+              </a:lnRef>
+              <a:fillRef idx="0">
+                <a:schemeClr val="dk1"/>
+              </a:fillRef>
+              <a:effectRef idx="0">
+                <a:schemeClr val="dk1"/>
+              </a:effectRef>
+              <a:fontRef idx="minor">
+                <a:schemeClr val="tx1"/>
+              </a:fontRef>
+            </p:style>
+          </p:cxnSp>
+          <p:cxnSp>
+            <p:nvCxnSpPr>
+              <p:cNvPr id="43" name="Gerader Verbinder 42">
+                <a:extLst>
+                  <a:ext uri="{FF2B5EF4-FFF2-40B4-BE49-F238E27FC236}">
+                    <a16:creationId xmlns:a16="http://schemas.microsoft.com/office/drawing/2014/main" id="{CEDCFEA2-8278-41AA-800A-DAB2527D42B1}"/>
+                  </a:ext>
+                </a:extLst>
+              </p:cNvPr>
+              <p:cNvCxnSpPr>
+                <a:cxnSpLocks/>
+              </p:cNvCxnSpPr>
+              <p:nvPr/>
+            </p:nvCxnSpPr>
+            <p:spPr>
+              <a:xfrm flipV="1">
+                <a:off x="2740975" y="4020194"/>
+                <a:ext cx="126263" cy="394012"/>
+              </a:xfrm>
+              <a:prstGeom prst="line">
+                <a:avLst/>
+              </a:prstGeom>
+              <a:ln w="101600" cap="rnd">
+                <a:solidFill>
+                  <a:srgbClr val="AFE09C"/>
+                </a:solidFill>
+                <a:bevel/>
+              </a:ln>
+            </p:spPr>
+            <p:style>
+              <a:lnRef idx="1">
+                <a:schemeClr val="dk1"/>
+              </a:lnRef>
+              <a:fillRef idx="0">
+                <a:schemeClr val="dk1"/>
+              </a:fillRef>
+              <a:effectRef idx="0">
+                <a:schemeClr val="dk1"/>
+              </a:effectRef>
+              <a:fontRef idx="minor">
+                <a:schemeClr val="tx1"/>
+              </a:fontRef>
+            </p:style>
+          </p:cxnSp>
+        </p:grpSp>
+        <p:grpSp>
+          <p:nvGrpSpPr>
+            <p:cNvPr id="44" name="Gruppieren 43">
+              <a:extLst>
+                <a:ext uri="{FF2B5EF4-FFF2-40B4-BE49-F238E27FC236}">
+                  <a16:creationId xmlns:a16="http://schemas.microsoft.com/office/drawing/2014/main" id="{B7412787-9D3C-4BC6-91D7-56C42F80004C}"/>
+                </a:ext>
+              </a:extLst>
+            </p:cNvPr>
+            <p:cNvGrpSpPr/>
+            <p:nvPr/>
+          </p:nvGrpSpPr>
+          <p:grpSpPr>
+            <a:xfrm rot="21051589">
+              <a:off x="6732228" y="4285672"/>
+              <a:ext cx="282204" cy="403213"/>
+              <a:chOff x="2585034" y="4020194"/>
+              <a:chExt cx="282204" cy="403213"/>
+            </a:xfrm>
+          </p:grpSpPr>
+          <p:cxnSp>
+            <p:nvCxnSpPr>
+              <p:cNvPr id="45" name="Gerader Verbinder 44">
+                <a:extLst>
+                  <a:ext uri="{FF2B5EF4-FFF2-40B4-BE49-F238E27FC236}">
+                    <a16:creationId xmlns:a16="http://schemas.microsoft.com/office/drawing/2014/main" id="{84FACAAD-BD60-49A3-B805-569EB95D7674}"/>
+                  </a:ext>
+                </a:extLst>
+              </p:cNvPr>
+              <p:cNvCxnSpPr>
+                <a:cxnSpLocks/>
+              </p:cNvCxnSpPr>
+              <p:nvPr/>
+            </p:nvCxnSpPr>
+            <p:spPr>
+              <a:xfrm flipH="1" flipV="1">
+                <a:off x="2585034" y="4263338"/>
+                <a:ext cx="137897" cy="160069"/>
+              </a:xfrm>
+              <a:prstGeom prst="line">
+                <a:avLst/>
+              </a:prstGeom>
+              <a:ln w="101600" cap="rnd">
+                <a:solidFill>
+                  <a:srgbClr val="AFE09C"/>
+                </a:solidFill>
+                <a:bevel/>
+              </a:ln>
+            </p:spPr>
+            <p:style>
+              <a:lnRef idx="1">
+                <a:schemeClr val="dk1"/>
+              </a:lnRef>
+              <a:fillRef idx="0">
+                <a:schemeClr val="dk1"/>
+              </a:fillRef>
+              <a:effectRef idx="0">
+                <a:schemeClr val="dk1"/>
+              </a:effectRef>
+              <a:fontRef idx="minor">
+                <a:schemeClr val="tx1"/>
+              </a:fontRef>
+            </p:style>
+          </p:cxnSp>
+          <p:cxnSp>
+            <p:nvCxnSpPr>
+              <p:cNvPr id="46" name="Gerader Verbinder 45">
+                <a:extLst>
+                  <a:ext uri="{FF2B5EF4-FFF2-40B4-BE49-F238E27FC236}">
+                    <a16:creationId xmlns:a16="http://schemas.microsoft.com/office/drawing/2014/main" id="{5BC0E967-D306-46E2-BE2D-4AD59C148F83}"/>
+                  </a:ext>
+                </a:extLst>
+              </p:cNvPr>
+              <p:cNvCxnSpPr>
+                <a:cxnSpLocks/>
+              </p:cNvCxnSpPr>
+              <p:nvPr/>
+            </p:nvCxnSpPr>
+            <p:spPr>
+              <a:xfrm flipV="1">
+                <a:off x="2740975" y="4020194"/>
+                <a:ext cx="126263" cy="394012"/>
+              </a:xfrm>
+              <a:prstGeom prst="line">
+                <a:avLst/>
+              </a:prstGeom>
+              <a:ln w="101600" cap="rnd">
+                <a:solidFill>
+                  <a:srgbClr val="AFE09C"/>
+                </a:solidFill>
+                <a:bevel/>
+              </a:ln>
+            </p:spPr>
+            <p:style>
+              <a:lnRef idx="1">
+                <a:schemeClr val="dk1"/>
+              </a:lnRef>
+              <a:fillRef idx="0">
+                <a:schemeClr val="dk1"/>
+              </a:fillRef>
+              <a:effectRef idx="0">
+                <a:schemeClr val="dk1"/>
+              </a:effectRef>
+              <a:fontRef idx="minor">
+                <a:schemeClr val="tx1"/>
+              </a:fontRef>
+            </p:style>
+          </p:cxnSp>
+        </p:grpSp>
+        <p:grpSp>
+          <p:nvGrpSpPr>
+            <p:cNvPr id="47" name="Gruppieren 46">
+              <a:extLst>
+                <a:ext uri="{FF2B5EF4-FFF2-40B4-BE49-F238E27FC236}">
+                  <a16:creationId xmlns:a16="http://schemas.microsoft.com/office/drawing/2014/main" id="{80A9686D-6229-43B3-92B3-A068AAD07628}"/>
+                </a:ext>
+              </a:extLst>
+            </p:cNvPr>
+            <p:cNvGrpSpPr/>
+            <p:nvPr/>
+          </p:nvGrpSpPr>
+          <p:grpSpPr>
+            <a:xfrm rot="21051589">
+              <a:off x="4897588" y="5206792"/>
+              <a:ext cx="282204" cy="403213"/>
+              <a:chOff x="2585034" y="4020194"/>
+              <a:chExt cx="282204" cy="403213"/>
+            </a:xfrm>
+          </p:grpSpPr>
+          <p:cxnSp>
+            <p:nvCxnSpPr>
+              <p:cNvPr id="48" name="Gerader Verbinder 47">
+                <a:extLst>
+                  <a:ext uri="{FF2B5EF4-FFF2-40B4-BE49-F238E27FC236}">
+                    <a16:creationId xmlns:a16="http://schemas.microsoft.com/office/drawing/2014/main" id="{3DA35493-CE92-4522-9F66-19EF48C07EBF}"/>
+                  </a:ext>
+                </a:extLst>
+              </p:cNvPr>
+              <p:cNvCxnSpPr>
+                <a:cxnSpLocks/>
+              </p:cNvCxnSpPr>
+              <p:nvPr/>
+            </p:nvCxnSpPr>
+            <p:spPr>
+              <a:xfrm flipH="1" flipV="1">
+                <a:off x="2585034" y="4263338"/>
+                <a:ext cx="137897" cy="160069"/>
+              </a:xfrm>
+              <a:prstGeom prst="line">
+                <a:avLst/>
+              </a:prstGeom>
+              <a:ln w="101600" cap="rnd">
+                <a:solidFill>
+                  <a:srgbClr val="AFE09C"/>
+                </a:solidFill>
+                <a:bevel/>
+              </a:ln>
+            </p:spPr>
+            <p:style>
+              <a:lnRef idx="1">
+                <a:schemeClr val="dk1"/>
+              </a:lnRef>
+              <a:fillRef idx="0">
+                <a:schemeClr val="dk1"/>
+              </a:fillRef>
+              <a:effectRef idx="0">
+                <a:schemeClr val="dk1"/>
+              </a:effectRef>
+              <a:fontRef idx="minor">
+                <a:schemeClr val="tx1"/>
+              </a:fontRef>
+            </p:style>
+          </p:cxnSp>
+          <p:cxnSp>
+            <p:nvCxnSpPr>
+              <p:cNvPr id="49" name="Gerader Verbinder 48">
+                <a:extLst>
+                  <a:ext uri="{FF2B5EF4-FFF2-40B4-BE49-F238E27FC236}">
+                    <a16:creationId xmlns:a16="http://schemas.microsoft.com/office/drawing/2014/main" id="{91957CA5-6F4E-4E45-B2E7-DE0BAED3FCDD}"/>
+                  </a:ext>
+                </a:extLst>
+              </p:cNvPr>
+              <p:cNvCxnSpPr>
+                <a:cxnSpLocks/>
+              </p:cNvCxnSpPr>
+              <p:nvPr/>
+            </p:nvCxnSpPr>
+            <p:spPr>
+              <a:xfrm flipV="1">
+                <a:off x="2740975" y="4020194"/>
+                <a:ext cx="126263" cy="394012"/>
+              </a:xfrm>
+              <a:prstGeom prst="line">
+                <a:avLst/>
+              </a:prstGeom>
+              <a:ln w="101600" cap="rnd">
+                <a:solidFill>
+                  <a:srgbClr val="AFE09C"/>
+                </a:solidFill>
+                <a:bevel/>
+              </a:ln>
+            </p:spPr>
+            <p:style>
+              <a:lnRef idx="1">
+                <a:schemeClr val="dk1"/>
+              </a:lnRef>
+              <a:fillRef idx="0">
+                <a:schemeClr val="dk1"/>
+              </a:fillRef>
+              <a:effectRef idx="0">
+                <a:schemeClr val="dk1"/>
+              </a:effectRef>
+              <a:fontRef idx="minor">
+                <a:schemeClr val="tx1"/>
+              </a:fontRef>
+            </p:style>
+          </p:cxnSp>
+        </p:grpSp>
+      </p:grpSp>
+      <p:sp>
+        <p:nvSpPr>
+          <p:cNvPr id="4" name="Rechteck 3">
+            <a:extLst>
+              <a:ext uri="{FF2B5EF4-FFF2-40B4-BE49-F238E27FC236}">
+                <a16:creationId xmlns:a16="http://schemas.microsoft.com/office/drawing/2014/main" id="{3A3AEFB1-BB9C-4D3F-8C2B-D2304B0393C4}"/>
+              </a:ext>
+            </a:extLst>
+          </p:cNvPr>
+          <p:cNvSpPr/>
+          <p:nvPr/>
+        </p:nvSpPr>
+        <p:spPr>
+          <a:xfrm>
+            <a:off x="3555206" y="996067"/>
+            <a:ext cx="1200702" cy="5633333"/>
+          </a:xfrm>
+          <a:prstGeom prst="rect">
+            <a:avLst/>
+          </a:prstGeom>
+          <a:solidFill>
+            <a:schemeClr val="bg1"/>
+          </a:solidFill>
+          <a:ln>
+            <a:noFill/>
+          </a:ln>
+        </p:spPr>
+        <p:style>
+          <a:lnRef idx="2">
+            <a:schemeClr val="accent1">
+              <a:shade val="50000"/>
+            </a:schemeClr>
+          </a:lnRef>
+          <a:fillRef idx="1">
+            <a:schemeClr val="accent1"/>
+          </a:fillRef>
+          <a:effectRef idx="0">
+            <a:schemeClr val="accent1"/>
+          </a:effectRef>
+          <a:fontRef idx="minor">
+            <a:schemeClr val="lt1"/>
+          </a:fontRef>
+        </p:style>
+        <p:txBody>
+          <a:bodyPr rtlCol="0" anchor="ctr"/>
+          <a:lstStyle/>
+          <a:p>
+            <a:pPr algn="ctr"/>
+            <a:endParaRPr lang="de-DE"/>
+          </a:p>
+        </p:txBody>
+      </p:sp>
+      <p:sp>
+        <p:nvSpPr>
+          <p:cNvPr id="32" name="Rechteck 31">
+            <a:extLst>
+              <a:ext uri="{FF2B5EF4-FFF2-40B4-BE49-F238E27FC236}">
+                <a16:creationId xmlns:a16="http://schemas.microsoft.com/office/drawing/2014/main" id="{F8C4B1B2-D92B-4258-AED7-FB3F9E62E991}"/>
+              </a:ext>
+            </a:extLst>
+          </p:cNvPr>
+          <p:cNvSpPr/>
+          <p:nvPr/>
+        </p:nvSpPr>
+        <p:spPr>
+          <a:xfrm>
+            <a:off x="7439507" y="723333"/>
+            <a:ext cx="1200702" cy="5633333"/>
+          </a:xfrm>
+          <a:prstGeom prst="rect">
+            <a:avLst/>
+          </a:prstGeom>
+          <a:solidFill>
+            <a:schemeClr val="bg1"/>
+          </a:solidFill>
+          <a:ln>
+            <a:noFill/>
+          </a:ln>
+        </p:spPr>
+        <p:style>
+          <a:lnRef idx="2">
+            <a:schemeClr val="accent1">
+              <a:shade val="50000"/>
+            </a:schemeClr>
+          </a:lnRef>
+          <a:fillRef idx="1">
+            <a:schemeClr val="accent1"/>
+          </a:fillRef>
+          <a:effectRef idx="0">
+            <a:schemeClr val="accent1"/>
+          </a:effectRef>
+          <a:fontRef idx="minor">
+            <a:schemeClr val="lt1"/>
+          </a:fontRef>
+        </p:style>
+        <p:txBody>
+          <a:bodyPr rtlCol="0" anchor="ctr"/>
+          <a:lstStyle/>
+          <a:p>
+            <a:pPr algn="ctr"/>
+            <a:endParaRPr lang="de-DE"/>
+          </a:p>
+        </p:txBody>
+      </p:sp>
+      <p:sp>
+        <p:nvSpPr>
+          <p:cNvPr id="5" name="Rechteck 4">
+            <a:extLst>
+              <a:ext uri="{FF2B5EF4-FFF2-40B4-BE49-F238E27FC236}">
+                <a16:creationId xmlns:a16="http://schemas.microsoft.com/office/drawing/2014/main" id="{9A40B1A2-15CF-487B-A563-285F13DDC0E3}"/>
+              </a:ext>
+            </a:extLst>
+          </p:cNvPr>
+          <p:cNvSpPr/>
+          <p:nvPr/>
+        </p:nvSpPr>
+        <p:spPr>
+          <a:xfrm>
+            <a:off x="4754875" y="2654299"/>
+            <a:ext cx="95731" cy="3296443"/>
+          </a:xfrm>
+          <a:prstGeom prst="rect">
+            <a:avLst/>
+          </a:prstGeom>
+          <a:solidFill>
+            <a:schemeClr val="tx1"/>
+          </a:solidFill>
+          <a:ln>
+            <a:noFill/>
+          </a:ln>
+        </p:spPr>
+        <p:style>
+          <a:lnRef idx="2">
+            <a:schemeClr val="accent1">
+              <a:shade val="50000"/>
+            </a:schemeClr>
+          </a:lnRef>
+          <a:fillRef idx="1">
+            <a:schemeClr val="accent1"/>
+          </a:fillRef>
+          <a:effectRef idx="0">
+            <a:schemeClr val="accent1"/>
+          </a:effectRef>
+          <a:fontRef idx="minor">
+            <a:schemeClr val="lt1"/>
+          </a:fontRef>
+        </p:style>
+        <p:txBody>
+          <a:bodyPr rtlCol="0" anchor="ctr"/>
+          <a:lstStyle/>
+          <a:p>
+            <a:pPr algn="ctr"/>
+            <a:endParaRPr lang="de-DE"/>
+          </a:p>
+        </p:txBody>
+      </p:sp>
+      <p:sp>
+        <p:nvSpPr>
+          <p:cNvPr id="33" name="Rechteck 32">
+            <a:extLst>
+              <a:ext uri="{FF2B5EF4-FFF2-40B4-BE49-F238E27FC236}">
+                <a16:creationId xmlns:a16="http://schemas.microsoft.com/office/drawing/2014/main" id="{4EB7B10F-210F-464C-8431-DB63B36D5E45}"/>
+              </a:ext>
+            </a:extLst>
+          </p:cNvPr>
+          <p:cNvSpPr/>
+          <p:nvPr/>
+        </p:nvSpPr>
+        <p:spPr>
+          <a:xfrm>
+            <a:off x="7366934" y="2615117"/>
+            <a:ext cx="72573" cy="3296443"/>
+          </a:xfrm>
+          <a:prstGeom prst="rect">
+            <a:avLst/>
+          </a:prstGeom>
+          <a:solidFill>
+            <a:schemeClr val="tx1"/>
+          </a:solidFill>
+          <a:ln>
+            <a:noFill/>
+          </a:ln>
+        </p:spPr>
+        <p:style>
+          <a:lnRef idx="2">
+            <a:schemeClr val="accent1">
+              <a:shade val="50000"/>
+            </a:schemeClr>
+          </a:lnRef>
+          <a:fillRef idx="1">
+            <a:schemeClr val="accent1"/>
+          </a:fillRef>
+          <a:effectRef idx="0">
+            <a:schemeClr val="accent1"/>
+          </a:effectRef>
+          <a:fontRef idx="minor">
+            <a:schemeClr val="lt1"/>
+          </a:fontRef>
+        </p:style>
+        <p:txBody>
+          <a:bodyPr rtlCol="0" anchor="ctr"/>
+          <a:lstStyle/>
+          <a:p>
+            <a:pPr algn="ctr"/>
+            <a:endParaRPr lang="de-DE"/>
+          </a:p>
+        </p:txBody>
+      </p:sp>
+    </p:spTree>
+    <p:extLst>
+      <p:ext uri="{BB962C8B-B14F-4D97-AF65-F5344CB8AC3E}">
+        <p14:creationId xmlns:p14="http://schemas.microsoft.com/office/powerpoint/2010/main" val="3359478284"/>
+      </p:ext>
+    </p:extLst>
+  </p:cSld>
+  <p:clrMapOvr>
+    <a:masterClrMapping/>
+  </p:clrMapOvr>
+</p:sld>
+</file>
+
+<file path=ppt/slides/slide11.xml><?xml version="1.0" encoding="utf-8"?>
+<p:sld xmlns:a="http://schemas.openxmlformats.org/drawingml/2006/main" xmlns:r="http://schemas.openxmlformats.org/officeDocument/2006/relationships" xmlns:p="http://schemas.openxmlformats.org/presentationml/2006/main">
+  <p:cSld>
+    <p:spTree>
+      <p:nvGrpSpPr>
+        <p:cNvPr id="1" name=""/>
+        <p:cNvGrpSpPr/>
+        <p:nvPr/>
+      </p:nvGrpSpPr>
+      <p:grpSpPr>
+        <a:xfrm>
+          <a:off x="0" y="0"/>
+          <a:ext cx="0" cy="0"/>
+          <a:chOff x="0" y="0"/>
+          <a:chExt cx="0" cy="0"/>
+        </a:xfrm>
+      </p:grpSpPr>
+      <p:sp>
+        <p:nvSpPr>
+          <p:cNvPr id="3" name="Rechteck 2">
+            <a:extLst>
+              <a:ext uri="{FF2B5EF4-FFF2-40B4-BE49-F238E27FC236}">
+                <a16:creationId xmlns:a16="http://schemas.microsoft.com/office/drawing/2014/main" id="{04B5591F-5C9D-4870-8C8B-3D766540D435}"/>
+              </a:ext>
+            </a:extLst>
+          </p:cNvPr>
+          <p:cNvSpPr/>
+          <p:nvPr/>
+        </p:nvSpPr>
+        <p:spPr>
+          <a:xfrm>
+            <a:off x="4848225" y="907257"/>
+            <a:ext cx="2520000" cy="5044656"/>
+          </a:xfrm>
+          <a:prstGeom prst="rect">
+            <a:avLst/>
+          </a:prstGeom>
+          <a:solidFill>
+            <a:srgbClr val="ECE9FC"/>
+          </a:solidFill>
+          <a:ln>
+            <a:noFill/>
+          </a:ln>
+        </p:spPr>
+        <p:style>
+          <a:lnRef idx="2">
+            <a:schemeClr val="accent1">
+              <a:shade val="50000"/>
+            </a:schemeClr>
+          </a:lnRef>
+          <a:fillRef idx="1">
+            <a:schemeClr val="accent1"/>
+          </a:fillRef>
+          <a:effectRef idx="0">
+            <a:schemeClr val="accent1"/>
+          </a:effectRef>
+          <a:fontRef idx="minor">
+            <a:schemeClr val="lt1"/>
+          </a:fontRef>
+        </p:style>
+        <p:txBody>
+          <a:bodyPr rtlCol="0" anchor="ctr"/>
+          <a:lstStyle/>
+          <a:p>
+            <a:pPr algn="ctr"/>
+            <a:endParaRPr lang="de-DE" dirty="0"/>
+          </a:p>
+        </p:txBody>
+      </p:sp>
+      <p:sp>
+        <p:nvSpPr>
+          <p:cNvPr id="19" name="Rechteck 18">
+            <a:extLst>
+              <a:ext uri="{FF2B5EF4-FFF2-40B4-BE49-F238E27FC236}">
+                <a16:creationId xmlns:a16="http://schemas.microsoft.com/office/drawing/2014/main" id="{EE42C676-BC59-444A-9545-BE3962464E87}"/>
+              </a:ext>
+            </a:extLst>
+          </p:cNvPr>
+          <p:cNvSpPr/>
+          <p:nvPr/>
+        </p:nvSpPr>
+        <p:spPr>
+          <a:xfrm>
+            <a:off x="4765673" y="907257"/>
+            <a:ext cx="72000" cy="4953793"/>
+          </a:xfrm>
+          <a:prstGeom prst="rect">
+            <a:avLst/>
+          </a:prstGeom>
+          <a:ln w="9525">
+            <a:noFill/>
+          </a:ln>
+        </p:spPr>
+        <p:style>
+          <a:lnRef idx="2">
+            <a:schemeClr val="dk1">
+              <a:shade val="50000"/>
+            </a:schemeClr>
+          </a:lnRef>
+          <a:fillRef idx="1">
+            <a:schemeClr val="dk1"/>
+          </a:fillRef>
+          <a:effectRef idx="0">
+            <a:schemeClr val="dk1"/>
+          </a:effectRef>
+          <a:fontRef idx="minor">
+            <a:schemeClr val="lt1"/>
+          </a:fontRef>
+        </p:style>
+        <p:txBody>
+          <a:bodyPr rtlCol="0" anchor="ctr"/>
+          <a:lstStyle/>
+          <a:p>
+            <a:pPr algn="ctr"/>
+            <a:endParaRPr lang="de-DE"/>
+          </a:p>
+        </p:txBody>
+      </p:sp>
       <p:sp>
         <p:nvSpPr>
           <p:cNvPr id="21" name="Textfeld 20">
@@ -5799,7 +6934,7 @@
 </p:sld>
 </file>
 
-<file path=ppt/slides/slide11.xml><?xml version="1.0" encoding="utf-8"?>
+<file path=ppt/slides/slide12.xml><?xml version="1.0" encoding="utf-8"?>
 <p:sld xmlns:a="http://schemas.openxmlformats.org/drawingml/2006/main" xmlns:r="http://schemas.openxmlformats.org/officeDocument/2006/relationships" xmlns:p="http://schemas.openxmlformats.org/presentationml/2006/main">
   <p:cSld>
     <p:spTree>
@@ -6920,7 +8055,7 @@
 </p:sld>
 </file>
 
-<file path=ppt/slides/slide12.xml><?xml version="1.0" encoding="utf-8"?>
+<file path=ppt/slides/slide13.xml><?xml version="1.0" encoding="utf-8"?>
 <p:sld xmlns:a="http://schemas.openxmlformats.org/drawingml/2006/main" xmlns:r="http://schemas.openxmlformats.org/officeDocument/2006/relationships" xmlns:p="http://schemas.openxmlformats.org/presentationml/2006/main">
   <p:cSld>
     <p:spTree>
@@ -7998,7 +9133,7 @@
 </p:sld>
 </file>
 
-<file path=ppt/slides/slide13.xml><?xml version="1.0" encoding="utf-8"?>
+<file path=ppt/slides/slide14.xml><?xml version="1.0" encoding="utf-8"?>
 <p:sld xmlns:a="http://schemas.openxmlformats.org/drawingml/2006/main" xmlns:r="http://schemas.openxmlformats.org/officeDocument/2006/relationships" xmlns:p="http://schemas.openxmlformats.org/presentationml/2006/main">
   <p:cSld>
     <p:spTree>
@@ -9153,6 +10288,818 @@
 </file>
 
 <file path=ppt/slides/slide3.xml><?xml version="1.0" encoding="utf-8"?>
+<p:sld xmlns:a="http://schemas.openxmlformats.org/drawingml/2006/main" xmlns:r="http://schemas.openxmlformats.org/officeDocument/2006/relationships" xmlns:p="http://schemas.openxmlformats.org/presentationml/2006/main">
+  <p:cSld>
+    <p:spTree>
+      <p:nvGrpSpPr>
+        <p:cNvPr id="1" name=""/>
+        <p:cNvGrpSpPr/>
+        <p:nvPr/>
+      </p:nvGrpSpPr>
+      <p:grpSpPr>
+        <a:xfrm>
+          <a:off x="0" y="0"/>
+          <a:ext cx="0" cy="0"/>
+          <a:chOff x="0" y="0"/>
+          <a:chExt cx="0" cy="0"/>
+        </a:xfrm>
+      </p:grpSpPr>
+      <p:grpSp>
+        <p:nvGrpSpPr>
+          <p:cNvPr id="4" name="Gruppieren 3">
+            <a:extLst>
+              <a:ext uri="{FF2B5EF4-FFF2-40B4-BE49-F238E27FC236}">
+                <a16:creationId xmlns:a16="http://schemas.microsoft.com/office/drawing/2014/main" id="{928CAA16-67CB-4A99-A49C-80F22865C38A}"/>
+              </a:ext>
+            </a:extLst>
+          </p:cNvPr>
+          <p:cNvGrpSpPr>
+            <a:grpSpLocks noChangeAspect="1"/>
+          </p:cNvGrpSpPr>
+          <p:nvPr/>
+        </p:nvGrpSpPr>
+        <p:grpSpPr>
+          <a:xfrm>
+            <a:off x="710758" y="145244"/>
+            <a:ext cx="8598634" cy="5953667"/>
+            <a:chOff x="4168743" y="1754812"/>
+            <a:chExt cx="5165225" cy="3576385"/>
+          </a:xfrm>
+        </p:grpSpPr>
+        <p:sp>
+          <p:nvSpPr>
+            <p:cNvPr id="5" name="Rechteck: abgerundete Ecken 4">
+              <a:extLst>
+                <a:ext uri="{FF2B5EF4-FFF2-40B4-BE49-F238E27FC236}">
+                  <a16:creationId xmlns:a16="http://schemas.microsoft.com/office/drawing/2014/main" id="{D44DF9CD-1CF7-4237-8564-82668A2FE14D}"/>
+                </a:ext>
+              </a:extLst>
+            </p:cNvPr>
+            <p:cNvSpPr/>
+            <p:nvPr/>
+          </p:nvSpPr>
+          <p:spPr>
+            <a:xfrm rot="21113087">
+              <a:off x="4233616" y="1979945"/>
+              <a:ext cx="5046210" cy="3140403"/>
+            </a:xfrm>
+            <a:prstGeom prst="roundRect">
+              <a:avLst>
+                <a:gd name="adj" fmla="val 11051"/>
+              </a:avLst>
+            </a:prstGeom>
+            <a:solidFill>
+              <a:srgbClr val="ECE9FC"/>
+            </a:solidFill>
+            <a:ln w="101600" cap="rnd" cmpd="sng">
+              <a:solidFill>
+                <a:srgbClr val="D1DDF7"/>
+              </a:solidFill>
+              <a:round/>
+            </a:ln>
+          </p:spPr>
+          <p:style>
+            <a:lnRef idx="2">
+              <a:schemeClr val="accent1">
+                <a:shade val="50000"/>
+              </a:schemeClr>
+            </a:lnRef>
+            <a:fillRef idx="1">
+              <a:schemeClr val="accent1"/>
+            </a:fillRef>
+            <a:effectRef idx="0">
+              <a:schemeClr val="accent1"/>
+            </a:effectRef>
+            <a:fontRef idx="minor">
+              <a:schemeClr val="lt1"/>
+            </a:fontRef>
+          </p:style>
+          <p:txBody>
+            <a:bodyPr rtlCol="0" anchor="ctr"/>
+            <a:lstStyle/>
+            <a:p>
+              <a:pPr algn="ctr"/>
+              <a:endParaRPr lang="de-DE" dirty="0"/>
+            </a:p>
+          </p:txBody>
+        </p:sp>
+        <p:cxnSp>
+          <p:nvCxnSpPr>
+            <p:cNvPr id="6" name="Gerader Verbinder 5">
+              <a:extLst>
+                <a:ext uri="{FF2B5EF4-FFF2-40B4-BE49-F238E27FC236}">
+                  <a16:creationId xmlns:a16="http://schemas.microsoft.com/office/drawing/2014/main" id="{FC19C1F6-10CF-4038-9E4A-6B3EB6D8AFD0}"/>
+                </a:ext>
+              </a:extLst>
+            </p:cNvPr>
+            <p:cNvCxnSpPr>
+              <a:cxnSpLocks/>
+            </p:cNvCxnSpPr>
+            <p:nvPr/>
+          </p:nvCxnSpPr>
+          <p:spPr>
+            <a:xfrm>
+              <a:off x="5055781" y="2198587"/>
+              <a:ext cx="466437" cy="3132610"/>
+            </a:xfrm>
+            <a:prstGeom prst="line">
+              <a:avLst/>
+            </a:prstGeom>
+            <a:ln w="101600">
+              <a:solidFill>
+                <a:srgbClr val="D1DDF7"/>
+              </a:solidFill>
+            </a:ln>
+          </p:spPr>
+          <p:style>
+            <a:lnRef idx="1">
+              <a:schemeClr val="accent1"/>
+            </a:lnRef>
+            <a:fillRef idx="0">
+              <a:schemeClr val="accent1"/>
+            </a:fillRef>
+            <a:effectRef idx="0">
+              <a:schemeClr val="accent1"/>
+            </a:effectRef>
+            <a:fontRef idx="minor">
+              <a:schemeClr val="tx1"/>
+            </a:fontRef>
+          </p:style>
+        </p:cxnSp>
+        <p:grpSp>
+          <p:nvGrpSpPr>
+            <p:cNvPr id="7" name="Gruppieren 6">
+              <a:extLst>
+                <a:ext uri="{FF2B5EF4-FFF2-40B4-BE49-F238E27FC236}">
+                  <a16:creationId xmlns:a16="http://schemas.microsoft.com/office/drawing/2014/main" id="{25288533-91ED-47B3-A149-D4037375FB88}"/>
+                </a:ext>
+              </a:extLst>
+            </p:cNvPr>
+            <p:cNvGrpSpPr>
+              <a:grpSpLocks noChangeAspect="1"/>
+            </p:cNvGrpSpPr>
+            <p:nvPr/>
+          </p:nvGrpSpPr>
+          <p:grpSpPr>
+            <a:xfrm rot="21072129">
+              <a:off x="4687628" y="4597984"/>
+              <a:ext cx="539071" cy="557484"/>
+              <a:chOff x="2444024" y="1798320"/>
+              <a:chExt cx="626836" cy="648248"/>
+            </a:xfrm>
+          </p:grpSpPr>
+          <p:cxnSp>
+            <p:nvCxnSpPr>
+              <p:cNvPr id="22" name="Gerader Verbinder 21">
+                <a:extLst>
+                  <a:ext uri="{FF2B5EF4-FFF2-40B4-BE49-F238E27FC236}">
+                    <a16:creationId xmlns:a16="http://schemas.microsoft.com/office/drawing/2014/main" id="{45925367-5DAE-404E-B59D-05F83EC0CBF3}"/>
+                  </a:ext>
+                </a:extLst>
+              </p:cNvPr>
+              <p:cNvCxnSpPr>
+                <a:cxnSpLocks/>
+              </p:cNvCxnSpPr>
+              <p:nvPr/>
+            </p:nvCxnSpPr>
+            <p:spPr>
+              <a:xfrm flipV="1">
+                <a:off x="2444024" y="1798320"/>
+                <a:ext cx="626836" cy="648248"/>
+              </a:xfrm>
+              <a:prstGeom prst="line">
+                <a:avLst/>
+              </a:prstGeom>
+              <a:ln w="127000" cap="rnd">
+                <a:solidFill>
+                  <a:srgbClr val="CC3300"/>
+                </a:solidFill>
+                <a:bevel/>
+              </a:ln>
+            </p:spPr>
+            <p:style>
+              <a:lnRef idx="1">
+                <a:schemeClr val="dk1"/>
+              </a:lnRef>
+              <a:fillRef idx="0">
+                <a:schemeClr val="dk1"/>
+              </a:fillRef>
+              <a:effectRef idx="0">
+                <a:schemeClr val="dk1"/>
+              </a:effectRef>
+              <a:fontRef idx="minor">
+                <a:schemeClr val="tx1"/>
+              </a:fontRef>
+            </p:style>
+          </p:cxnSp>
+          <p:cxnSp>
+            <p:nvCxnSpPr>
+              <p:cNvPr id="23" name="Gerader Verbinder 22">
+                <a:extLst>
+                  <a:ext uri="{FF2B5EF4-FFF2-40B4-BE49-F238E27FC236}">
+                    <a16:creationId xmlns:a16="http://schemas.microsoft.com/office/drawing/2014/main" id="{B3CC28CF-2C32-4F18-BA74-63CD8C408CBB}"/>
+                  </a:ext>
+                </a:extLst>
+              </p:cNvPr>
+              <p:cNvCxnSpPr>
+                <a:cxnSpLocks/>
+              </p:cNvCxnSpPr>
+              <p:nvPr/>
+            </p:nvCxnSpPr>
+            <p:spPr>
+              <a:xfrm flipH="1" flipV="1">
+                <a:off x="2444024" y="1798320"/>
+                <a:ext cx="626836" cy="648248"/>
+              </a:xfrm>
+              <a:prstGeom prst="line">
+                <a:avLst/>
+              </a:prstGeom>
+              <a:ln w="127000" cap="rnd">
+                <a:solidFill>
+                  <a:srgbClr val="CC3300"/>
+                </a:solidFill>
+                <a:bevel/>
+              </a:ln>
+            </p:spPr>
+            <p:style>
+              <a:lnRef idx="1">
+                <a:schemeClr val="dk1"/>
+              </a:lnRef>
+              <a:fillRef idx="0">
+                <a:schemeClr val="dk1"/>
+              </a:fillRef>
+              <a:effectRef idx="0">
+                <a:schemeClr val="dk1"/>
+              </a:effectRef>
+              <a:fontRef idx="minor">
+                <a:schemeClr val="tx1"/>
+              </a:fontRef>
+            </p:style>
+          </p:cxnSp>
+        </p:grpSp>
+        <p:cxnSp>
+          <p:nvCxnSpPr>
+            <p:cNvPr id="8" name="Gerader Verbinder 7">
+              <a:extLst>
+                <a:ext uri="{FF2B5EF4-FFF2-40B4-BE49-F238E27FC236}">
+                  <a16:creationId xmlns:a16="http://schemas.microsoft.com/office/drawing/2014/main" id="{3FF22205-94E0-48E3-B06E-577797183D2E}"/>
+                </a:ext>
+              </a:extLst>
+            </p:cNvPr>
+            <p:cNvCxnSpPr>
+              <a:cxnSpLocks/>
+            </p:cNvCxnSpPr>
+            <p:nvPr/>
+          </p:nvCxnSpPr>
+          <p:spPr>
+            <a:xfrm flipV="1">
+              <a:off x="4168743" y="2701867"/>
+              <a:ext cx="5020199" cy="757711"/>
+            </a:xfrm>
+            <a:prstGeom prst="line">
+              <a:avLst/>
+            </a:prstGeom>
+            <a:ln w="101600">
+              <a:solidFill>
+                <a:srgbClr val="D1DDF7"/>
+              </a:solidFill>
+            </a:ln>
+          </p:spPr>
+          <p:style>
+            <a:lnRef idx="1">
+              <a:schemeClr val="accent1"/>
+            </a:lnRef>
+            <a:fillRef idx="0">
+              <a:schemeClr val="accent1"/>
+            </a:fillRef>
+            <a:effectRef idx="0">
+              <a:schemeClr val="accent1"/>
+            </a:effectRef>
+            <a:fontRef idx="minor">
+              <a:schemeClr val="tx1"/>
+            </a:fontRef>
+          </p:style>
+        </p:cxnSp>
+        <p:cxnSp>
+          <p:nvCxnSpPr>
+            <p:cNvPr id="9" name="Gerader Verbinder 8">
+              <a:extLst>
+                <a:ext uri="{FF2B5EF4-FFF2-40B4-BE49-F238E27FC236}">
+                  <a16:creationId xmlns:a16="http://schemas.microsoft.com/office/drawing/2014/main" id="{6D989F84-A680-45E7-8044-4BC7DF117724}"/>
+                </a:ext>
+              </a:extLst>
+            </p:cNvPr>
+            <p:cNvCxnSpPr>
+              <a:cxnSpLocks/>
+            </p:cNvCxnSpPr>
+            <p:nvPr/>
+          </p:nvCxnSpPr>
+          <p:spPr>
+            <a:xfrm flipV="1">
+              <a:off x="4338290" y="3751476"/>
+              <a:ext cx="4995678" cy="712344"/>
+            </a:xfrm>
+            <a:prstGeom prst="line">
+              <a:avLst/>
+            </a:prstGeom>
+            <a:ln w="101600">
+              <a:solidFill>
+                <a:srgbClr val="D1DDF7"/>
+              </a:solidFill>
+            </a:ln>
+          </p:spPr>
+          <p:style>
+            <a:lnRef idx="1">
+              <a:schemeClr val="accent1"/>
+            </a:lnRef>
+            <a:fillRef idx="0">
+              <a:schemeClr val="accent1"/>
+            </a:fillRef>
+            <a:effectRef idx="0">
+              <a:schemeClr val="accent1"/>
+            </a:effectRef>
+            <a:fontRef idx="minor">
+              <a:schemeClr val="tx1"/>
+            </a:fontRef>
+          </p:style>
+        </p:cxnSp>
+        <p:cxnSp>
+          <p:nvCxnSpPr>
+            <p:cNvPr id="10" name="Gerader Verbinder 9">
+              <a:extLst>
+                <a:ext uri="{FF2B5EF4-FFF2-40B4-BE49-F238E27FC236}">
+                  <a16:creationId xmlns:a16="http://schemas.microsoft.com/office/drawing/2014/main" id="{332A39F6-5AEC-4FF2-91A8-569AF77B81EF}"/>
+                </a:ext>
+              </a:extLst>
+            </p:cNvPr>
+            <p:cNvCxnSpPr>
+              <a:cxnSpLocks/>
+            </p:cNvCxnSpPr>
+            <p:nvPr/>
+          </p:nvCxnSpPr>
+          <p:spPr>
+            <a:xfrm>
+              <a:off x="6095999" y="2044601"/>
+              <a:ext cx="443312" cy="3108955"/>
+            </a:xfrm>
+            <a:prstGeom prst="line">
+              <a:avLst/>
+            </a:prstGeom>
+            <a:ln w="101600">
+              <a:solidFill>
+                <a:srgbClr val="D1DDF7"/>
+              </a:solidFill>
+            </a:ln>
+          </p:spPr>
+          <p:style>
+            <a:lnRef idx="1">
+              <a:schemeClr val="accent1"/>
+            </a:lnRef>
+            <a:fillRef idx="0">
+              <a:schemeClr val="accent1"/>
+            </a:fillRef>
+            <a:effectRef idx="0">
+              <a:schemeClr val="accent1"/>
+            </a:effectRef>
+            <a:fontRef idx="minor">
+              <a:schemeClr val="tx1"/>
+            </a:fontRef>
+          </p:style>
+        </p:cxnSp>
+        <p:cxnSp>
+          <p:nvCxnSpPr>
+            <p:cNvPr id="11" name="Gerader Verbinder 10">
+              <a:extLst>
+                <a:ext uri="{FF2B5EF4-FFF2-40B4-BE49-F238E27FC236}">
+                  <a16:creationId xmlns:a16="http://schemas.microsoft.com/office/drawing/2014/main" id="{22C62D63-8A16-4F52-8945-9C1BF2C5AD29}"/>
+                </a:ext>
+              </a:extLst>
+            </p:cNvPr>
+            <p:cNvCxnSpPr>
+              <a:cxnSpLocks/>
+            </p:cNvCxnSpPr>
+            <p:nvPr/>
+          </p:nvCxnSpPr>
+          <p:spPr>
+            <a:xfrm>
+              <a:off x="8153309" y="1754812"/>
+              <a:ext cx="469064" cy="3108385"/>
+            </a:xfrm>
+            <a:prstGeom prst="line">
+              <a:avLst/>
+            </a:prstGeom>
+            <a:ln w="101600">
+              <a:solidFill>
+                <a:srgbClr val="D1DDF7"/>
+              </a:solidFill>
+            </a:ln>
+          </p:spPr>
+          <p:style>
+            <a:lnRef idx="1">
+              <a:schemeClr val="accent1"/>
+            </a:lnRef>
+            <a:fillRef idx="0">
+              <a:schemeClr val="accent1"/>
+            </a:fillRef>
+            <a:effectRef idx="0">
+              <a:schemeClr val="accent1"/>
+            </a:effectRef>
+            <a:fontRef idx="minor">
+              <a:schemeClr val="tx1"/>
+            </a:fontRef>
+          </p:style>
+        </p:cxnSp>
+        <p:cxnSp>
+          <p:nvCxnSpPr>
+            <p:cNvPr id="12" name="Gerader Verbinder 11">
+              <a:extLst>
+                <a:ext uri="{FF2B5EF4-FFF2-40B4-BE49-F238E27FC236}">
+                  <a16:creationId xmlns:a16="http://schemas.microsoft.com/office/drawing/2014/main" id="{01CC707E-C87E-45C0-BBAC-E7235BA966E8}"/>
+                </a:ext>
+              </a:extLst>
+            </p:cNvPr>
+            <p:cNvCxnSpPr>
+              <a:cxnSpLocks/>
+            </p:cNvCxnSpPr>
+            <p:nvPr/>
+          </p:nvCxnSpPr>
+          <p:spPr>
+            <a:xfrm>
+              <a:off x="7113092" y="1930557"/>
+              <a:ext cx="458285" cy="3074955"/>
+            </a:xfrm>
+            <a:prstGeom prst="line">
+              <a:avLst/>
+            </a:prstGeom>
+            <a:ln w="101600">
+              <a:solidFill>
+                <a:srgbClr val="D1DDF7"/>
+              </a:solidFill>
+            </a:ln>
+          </p:spPr>
+          <p:style>
+            <a:lnRef idx="1">
+              <a:schemeClr val="accent1"/>
+            </a:lnRef>
+            <a:fillRef idx="0">
+              <a:schemeClr val="accent1"/>
+            </a:fillRef>
+            <a:effectRef idx="0">
+              <a:schemeClr val="accent1"/>
+            </a:effectRef>
+            <a:fontRef idx="minor">
+              <a:schemeClr val="tx1"/>
+            </a:fontRef>
+          </p:style>
+        </p:cxnSp>
+        <p:grpSp>
+          <p:nvGrpSpPr>
+            <p:cNvPr id="13" name="Gruppieren 12">
+              <a:extLst>
+                <a:ext uri="{FF2B5EF4-FFF2-40B4-BE49-F238E27FC236}">
+                  <a16:creationId xmlns:a16="http://schemas.microsoft.com/office/drawing/2014/main" id="{036F7612-DF73-4ABC-B708-F1772948E653}"/>
+                </a:ext>
+              </a:extLst>
+            </p:cNvPr>
+            <p:cNvGrpSpPr>
+              <a:grpSpLocks noChangeAspect="1"/>
+            </p:cNvGrpSpPr>
+            <p:nvPr/>
+          </p:nvGrpSpPr>
+          <p:grpSpPr>
+            <a:xfrm rot="21072129">
+              <a:off x="5391697" y="2389160"/>
+              <a:ext cx="539071" cy="557484"/>
+              <a:chOff x="2444024" y="1798320"/>
+              <a:chExt cx="626836" cy="648248"/>
+            </a:xfrm>
+          </p:grpSpPr>
+          <p:cxnSp>
+            <p:nvCxnSpPr>
+              <p:cNvPr id="20" name="Gerader Verbinder 19">
+                <a:extLst>
+                  <a:ext uri="{FF2B5EF4-FFF2-40B4-BE49-F238E27FC236}">
+                    <a16:creationId xmlns:a16="http://schemas.microsoft.com/office/drawing/2014/main" id="{0EB9775B-989E-49C8-A40D-95349D7548DF}"/>
+                  </a:ext>
+                </a:extLst>
+              </p:cNvPr>
+              <p:cNvCxnSpPr>
+                <a:cxnSpLocks/>
+              </p:cNvCxnSpPr>
+              <p:nvPr/>
+            </p:nvCxnSpPr>
+            <p:spPr>
+              <a:xfrm flipV="1">
+                <a:off x="2444024" y="1798320"/>
+                <a:ext cx="626836" cy="648248"/>
+              </a:xfrm>
+              <a:prstGeom prst="line">
+                <a:avLst/>
+              </a:prstGeom>
+              <a:ln w="127000" cap="rnd">
+                <a:solidFill>
+                  <a:srgbClr val="CC3300"/>
+                </a:solidFill>
+                <a:bevel/>
+              </a:ln>
+            </p:spPr>
+            <p:style>
+              <a:lnRef idx="1">
+                <a:schemeClr val="dk1"/>
+              </a:lnRef>
+              <a:fillRef idx="0">
+                <a:schemeClr val="dk1"/>
+              </a:fillRef>
+              <a:effectRef idx="0">
+                <a:schemeClr val="dk1"/>
+              </a:effectRef>
+              <a:fontRef idx="minor">
+                <a:schemeClr val="tx1"/>
+              </a:fontRef>
+            </p:style>
+          </p:cxnSp>
+          <p:cxnSp>
+            <p:nvCxnSpPr>
+              <p:cNvPr id="21" name="Gerader Verbinder 20">
+                <a:extLst>
+                  <a:ext uri="{FF2B5EF4-FFF2-40B4-BE49-F238E27FC236}">
+                    <a16:creationId xmlns:a16="http://schemas.microsoft.com/office/drawing/2014/main" id="{2BD0301A-BBE3-4E00-A77C-C7981A6A83CC}"/>
+                  </a:ext>
+                </a:extLst>
+              </p:cNvPr>
+              <p:cNvCxnSpPr>
+                <a:cxnSpLocks/>
+              </p:cNvCxnSpPr>
+              <p:nvPr/>
+            </p:nvCxnSpPr>
+            <p:spPr>
+              <a:xfrm flipH="1" flipV="1">
+                <a:off x="2444024" y="1798320"/>
+                <a:ext cx="626836" cy="648248"/>
+              </a:xfrm>
+              <a:prstGeom prst="line">
+                <a:avLst/>
+              </a:prstGeom>
+              <a:ln w="127000" cap="rnd">
+                <a:solidFill>
+                  <a:srgbClr val="CC3300"/>
+                </a:solidFill>
+                <a:bevel/>
+              </a:ln>
+            </p:spPr>
+            <p:style>
+              <a:lnRef idx="1">
+                <a:schemeClr val="dk1"/>
+              </a:lnRef>
+              <a:fillRef idx="0">
+                <a:schemeClr val="dk1"/>
+              </a:fillRef>
+              <a:effectRef idx="0">
+                <a:schemeClr val="dk1"/>
+              </a:effectRef>
+              <a:fontRef idx="minor">
+                <a:schemeClr val="tx1"/>
+              </a:fontRef>
+            </p:style>
+          </p:cxnSp>
+        </p:grpSp>
+        <p:grpSp>
+          <p:nvGrpSpPr>
+            <p:cNvPr id="14" name="Gruppieren 13">
+              <a:extLst>
+                <a:ext uri="{FF2B5EF4-FFF2-40B4-BE49-F238E27FC236}">
+                  <a16:creationId xmlns:a16="http://schemas.microsoft.com/office/drawing/2014/main" id="{7509C3C1-1CF8-4B01-8A48-37CA2C72D3EF}"/>
+                </a:ext>
+              </a:extLst>
+            </p:cNvPr>
+            <p:cNvGrpSpPr>
+              <a:grpSpLocks noChangeAspect="1"/>
+            </p:cNvGrpSpPr>
+            <p:nvPr/>
+          </p:nvGrpSpPr>
+          <p:grpSpPr>
+            <a:xfrm rot="21072129">
+              <a:off x="7601109" y="3150557"/>
+              <a:ext cx="539071" cy="557484"/>
+              <a:chOff x="2444024" y="1798320"/>
+              <a:chExt cx="626836" cy="648248"/>
+            </a:xfrm>
+          </p:grpSpPr>
+          <p:cxnSp>
+            <p:nvCxnSpPr>
+              <p:cNvPr id="18" name="Gerader Verbinder 17">
+                <a:extLst>
+                  <a:ext uri="{FF2B5EF4-FFF2-40B4-BE49-F238E27FC236}">
+                    <a16:creationId xmlns:a16="http://schemas.microsoft.com/office/drawing/2014/main" id="{B0A927EB-082C-4F1F-8930-4625FC4D6C09}"/>
+                  </a:ext>
+                </a:extLst>
+              </p:cNvPr>
+              <p:cNvCxnSpPr>
+                <a:cxnSpLocks/>
+              </p:cNvCxnSpPr>
+              <p:nvPr/>
+            </p:nvCxnSpPr>
+            <p:spPr>
+              <a:xfrm flipV="1">
+                <a:off x="2444024" y="1798320"/>
+                <a:ext cx="626836" cy="648248"/>
+              </a:xfrm>
+              <a:prstGeom prst="line">
+                <a:avLst/>
+              </a:prstGeom>
+              <a:ln w="127000" cap="rnd">
+                <a:solidFill>
+                  <a:srgbClr val="CC3300"/>
+                </a:solidFill>
+                <a:bevel/>
+              </a:ln>
+            </p:spPr>
+            <p:style>
+              <a:lnRef idx="1">
+                <a:schemeClr val="dk1"/>
+              </a:lnRef>
+              <a:fillRef idx="0">
+                <a:schemeClr val="dk1"/>
+              </a:fillRef>
+              <a:effectRef idx="0">
+                <a:schemeClr val="dk1"/>
+              </a:effectRef>
+              <a:fontRef idx="minor">
+                <a:schemeClr val="tx1"/>
+              </a:fontRef>
+            </p:style>
+          </p:cxnSp>
+          <p:cxnSp>
+            <p:nvCxnSpPr>
+              <p:cNvPr id="19" name="Gerader Verbinder 18">
+                <a:extLst>
+                  <a:ext uri="{FF2B5EF4-FFF2-40B4-BE49-F238E27FC236}">
+                    <a16:creationId xmlns:a16="http://schemas.microsoft.com/office/drawing/2014/main" id="{29F305E7-CE31-4353-80EE-3F16392334BE}"/>
+                  </a:ext>
+                </a:extLst>
+              </p:cNvPr>
+              <p:cNvCxnSpPr>
+                <a:cxnSpLocks/>
+              </p:cNvCxnSpPr>
+              <p:nvPr/>
+            </p:nvCxnSpPr>
+            <p:spPr>
+              <a:xfrm flipH="1" flipV="1">
+                <a:off x="2444024" y="1798320"/>
+                <a:ext cx="626836" cy="648248"/>
+              </a:xfrm>
+              <a:prstGeom prst="line">
+                <a:avLst/>
+              </a:prstGeom>
+              <a:ln w="127000" cap="rnd">
+                <a:solidFill>
+                  <a:srgbClr val="CC3300"/>
+                </a:solidFill>
+                <a:bevel/>
+              </a:ln>
+            </p:spPr>
+            <p:style>
+              <a:lnRef idx="1">
+                <a:schemeClr val="dk1"/>
+              </a:lnRef>
+              <a:fillRef idx="0">
+                <a:schemeClr val="dk1"/>
+              </a:fillRef>
+              <a:effectRef idx="0">
+                <a:schemeClr val="dk1"/>
+              </a:effectRef>
+              <a:fontRef idx="minor">
+                <a:schemeClr val="tx1"/>
+              </a:fontRef>
+            </p:style>
+          </p:cxnSp>
+        </p:grpSp>
+        <p:grpSp>
+          <p:nvGrpSpPr>
+            <p:cNvPr id="15" name="Gruppieren 14">
+              <a:extLst>
+                <a:ext uri="{FF2B5EF4-FFF2-40B4-BE49-F238E27FC236}">
+                  <a16:creationId xmlns:a16="http://schemas.microsoft.com/office/drawing/2014/main" id="{1993B830-AD1B-4921-B664-D129CEA5625A}"/>
+                </a:ext>
+              </a:extLst>
+            </p:cNvPr>
+            <p:cNvGrpSpPr>
+              <a:grpSpLocks noChangeAspect="1"/>
+            </p:cNvGrpSpPr>
+            <p:nvPr/>
+          </p:nvGrpSpPr>
+          <p:grpSpPr>
+            <a:xfrm rot="21072129">
+              <a:off x="6718305" y="4312671"/>
+              <a:ext cx="539071" cy="557484"/>
+              <a:chOff x="2444024" y="1798320"/>
+              <a:chExt cx="626836" cy="648248"/>
+            </a:xfrm>
+          </p:grpSpPr>
+          <p:cxnSp>
+            <p:nvCxnSpPr>
+              <p:cNvPr id="16" name="Gerader Verbinder 15">
+                <a:extLst>
+                  <a:ext uri="{FF2B5EF4-FFF2-40B4-BE49-F238E27FC236}">
+                    <a16:creationId xmlns:a16="http://schemas.microsoft.com/office/drawing/2014/main" id="{6DB80ED5-47FA-49ED-9CE0-B02662E7201F}"/>
+                  </a:ext>
+                </a:extLst>
+              </p:cNvPr>
+              <p:cNvCxnSpPr>
+                <a:cxnSpLocks/>
+              </p:cNvCxnSpPr>
+              <p:nvPr/>
+            </p:nvCxnSpPr>
+            <p:spPr>
+              <a:xfrm flipV="1">
+                <a:off x="2444024" y="1798320"/>
+                <a:ext cx="626836" cy="648248"/>
+              </a:xfrm>
+              <a:prstGeom prst="line">
+                <a:avLst/>
+              </a:prstGeom>
+              <a:ln w="127000" cap="rnd">
+                <a:solidFill>
+                  <a:srgbClr val="CC3300"/>
+                </a:solidFill>
+                <a:bevel/>
+              </a:ln>
+            </p:spPr>
+            <p:style>
+              <a:lnRef idx="1">
+                <a:schemeClr val="dk1"/>
+              </a:lnRef>
+              <a:fillRef idx="0">
+                <a:schemeClr val="dk1"/>
+              </a:fillRef>
+              <a:effectRef idx="0">
+                <a:schemeClr val="dk1"/>
+              </a:effectRef>
+              <a:fontRef idx="minor">
+                <a:schemeClr val="tx1"/>
+              </a:fontRef>
+            </p:style>
+          </p:cxnSp>
+          <p:cxnSp>
+            <p:nvCxnSpPr>
+              <p:cNvPr id="17" name="Gerader Verbinder 16">
+                <a:extLst>
+                  <a:ext uri="{FF2B5EF4-FFF2-40B4-BE49-F238E27FC236}">
+                    <a16:creationId xmlns:a16="http://schemas.microsoft.com/office/drawing/2014/main" id="{DBDE1A50-80AE-4C19-A963-4D1D6ECC3BEE}"/>
+                  </a:ext>
+                </a:extLst>
+              </p:cNvPr>
+              <p:cNvCxnSpPr>
+                <a:cxnSpLocks/>
+              </p:cNvCxnSpPr>
+              <p:nvPr/>
+            </p:nvCxnSpPr>
+            <p:spPr>
+              <a:xfrm flipH="1" flipV="1">
+                <a:off x="2444024" y="1798320"/>
+                <a:ext cx="626836" cy="648248"/>
+              </a:xfrm>
+              <a:prstGeom prst="line">
+                <a:avLst/>
+              </a:prstGeom>
+              <a:ln w="127000" cap="rnd">
+                <a:solidFill>
+                  <a:srgbClr val="CC3300"/>
+                </a:solidFill>
+                <a:bevel/>
+              </a:ln>
+            </p:spPr>
+            <p:style>
+              <a:lnRef idx="1">
+                <a:schemeClr val="dk1"/>
+              </a:lnRef>
+              <a:fillRef idx="0">
+                <a:schemeClr val="dk1"/>
+              </a:fillRef>
+              <a:effectRef idx="0">
+                <a:schemeClr val="dk1"/>
+              </a:effectRef>
+              <a:fontRef idx="minor">
+                <a:schemeClr val="tx1"/>
+              </a:fontRef>
+            </p:style>
+          </p:cxnSp>
+        </p:grpSp>
+      </p:grpSp>
+    </p:spTree>
+    <p:extLst>
+      <p:ext uri="{BB962C8B-B14F-4D97-AF65-F5344CB8AC3E}">
+        <p14:creationId xmlns:p14="http://schemas.microsoft.com/office/powerpoint/2010/main" val="3785403613"/>
+      </p:ext>
+    </p:extLst>
+  </p:cSld>
+  <p:clrMapOvr>
+    <a:masterClrMapping/>
+  </p:clrMapOvr>
+</p:sld>
+</file>
+
+<file path=ppt/slides/slide4.xml><?xml version="1.0" encoding="utf-8"?>
 <p:sld xmlns:a="http://schemas.openxmlformats.org/drawingml/2006/main" xmlns:r="http://schemas.openxmlformats.org/officeDocument/2006/relationships" xmlns:p="http://schemas.openxmlformats.org/presentationml/2006/main">
   <p:cSld>
     <p:spTree>
@@ -10944,7 +12891,7 @@
 </p:sld>
 </file>
 
-<file path=ppt/slides/slide4.xml><?xml version="1.0" encoding="utf-8"?>
+<file path=ppt/slides/slide5.xml><?xml version="1.0" encoding="utf-8"?>
 <p:sld xmlns:a="http://schemas.openxmlformats.org/drawingml/2006/main" xmlns:r="http://schemas.openxmlformats.org/officeDocument/2006/relationships" xmlns:p="http://schemas.openxmlformats.org/presentationml/2006/main">
   <p:cSld>
     <p:spTree>
@@ -11016,7 +12963,7 @@
 </p:sld>
 </file>
 
-<file path=ppt/slides/slide5.xml><?xml version="1.0" encoding="utf-8"?>
+<file path=ppt/slides/slide6.xml><?xml version="1.0" encoding="utf-8"?>
 <p:sld xmlns:a="http://schemas.openxmlformats.org/drawingml/2006/main" xmlns:r="http://schemas.openxmlformats.org/officeDocument/2006/relationships" xmlns:p="http://schemas.openxmlformats.org/presentationml/2006/main">
   <p:cSld>
     <p:spTree>
@@ -11165,7 +13112,7 @@
 </p:sld>
 </file>
 
-<file path=ppt/slides/slide6.xml><?xml version="1.0" encoding="utf-8"?>
+<file path=ppt/slides/slide7.xml><?xml version="1.0" encoding="utf-8"?>
 <p:sld xmlns:a="http://schemas.openxmlformats.org/drawingml/2006/main" xmlns:r="http://schemas.openxmlformats.org/officeDocument/2006/relationships" xmlns:p="http://schemas.openxmlformats.org/presentationml/2006/main">
   <p:cSld>
     <p:spTree>
@@ -11613,7 +13560,7 @@
 </p:sld>
 </file>
 
-<file path=ppt/slides/slide7.xml><?xml version="1.0" encoding="utf-8"?>
+<file path=ppt/slides/slide8.xml><?xml version="1.0" encoding="utf-8"?>
 <p:sld xmlns:a="http://schemas.openxmlformats.org/drawingml/2006/main" xmlns:r="http://schemas.openxmlformats.org/officeDocument/2006/relationships" xmlns:p="http://schemas.openxmlformats.org/presentationml/2006/main">
   <p:cSld>
     <p:spTree>
@@ -12285,7 +14232,7 @@
 </p:sld>
 </file>
 
-<file path=ppt/slides/slide8.xml><?xml version="1.0" encoding="utf-8"?>
+<file path=ppt/slides/slide9.xml><?xml version="1.0" encoding="utf-8"?>
 <p:sld xmlns:a="http://schemas.openxmlformats.org/drawingml/2006/main" xmlns:r="http://schemas.openxmlformats.org/officeDocument/2006/relationships" xmlns:p="http://schemas.openxmlformats.org/presentationml/2006/main">
   <p:cSld>
     <p:spTree>
@@ -13606,1140 +15553,6 @@
 </p:sld>
 </file>
 
-<file path=ppt/slides/slide9.xml><?xml version="1.0" encoding="utf-8"?>
-<p:sld xmlns:a="http://schemas.openxmlformats.org/drawingml/2006/main" xmlns:r="http://schemas.openxmlformats.org/officeDocument/2006/relationships" xmlns:p="http://schemas.openxmlformats.org/presentationml/2006/main">
-  <p:cSld>
-    <p:spTree>
-      <p:nvGrpSpPr>
-        <p:cNvPr id="1" name=""/>
-        <p:cNvGrpSpPr/>
-        <p:nvPr/>
-      </p:nvGrpSpPr>
-      <p:grpSpPr>
-        <a:xfrm>
-          <a:off x="0" y="0"/>
-          <a:ext cx="0" cy="0"/>
-          <a:chOff x="0" y="0"/>
-          <a:chExt cx="0" cy="0"/>
-        </a:xfrm>
-      </p:grpSpPr>
-      <p:sp>
-        <p:nvSpPr>
-          <p:cNvPr id="3" name="Rechteck 2">
-            <a:extLst>
-              <a:ext uri="{FF2B5EF4-FFF2-40B4-BE49-F238E27FC236}">
-                <a16:creationId xmlns:a16="http://schemas.microsoft.com/office/drawing/2014/main" id="{04B5591F-5C9D-4870-8C8B-3D766540D435}"/>
-              </a:ext>
-            </a:extLst>
-          </p:cNvPr>
-          <p:cNvSpPr/>
-          <p:nvPr/>
-        </p:nvSpPr>
-        <p:spPr>
-          <a:xfrm>
-            <a:off x="4848225" y="907257"/>
-            <a:ext cx="2520000" cy="5044656"/>
-          </a:xfrm>
-          <a:prstGeom prst="rect">
-            <a:avLst/>
-          </a:prstGeom>
-          <a:solidFill>
-            <a:srgbClr val="ECE9FC"/>
-          </a:solidFill>
-          <a:ln>
-            <a:noFill/>
-          </a:ln>
-        </p:spPr>
-        <p:style>
-          <a:lnRef idx="2">
-            <a:schemeClr val="accent1">
-              <a:shade val="50000"/>
-            </a:schemeClr>
-          </a:lnRef>
-          <a:fillRef idx="1">
-            <a:schemeClr val="accent1"/>
-          </a:fillRef>
-          <a:effectRef idx="0">
-            <a:schemeClr val="accent1"/>
-          </a:effectRef>
-          <a:fontRef idx="minor">
-            <a:schemeClr val="lt1"/>
-          </a:fontRef>
-        </p:style>
-        <p:txBody>
-          <a:bodyPr rtlCol="0" anchor="ctr"/>
-          <a:lstStyle/>
-          <a:p>
-            <a:pPr algn="ctr"/>
-            <a:endParaRPr lang="de-DE" dirty="0"/>
-          </a:p>
-        </p:txBody>
-      </p:sp>
-      <p:sp>
-        <p:nvSpPr>
-          <p:cNvPr id="19" name="Rechteck 18">
-            <a:extLst>
-              <a:ext uri="{FF2B5EF4-FFF2-40B4-BE49-F238E27FC236}">
-                <a16:creationId xmlns:a16="http://schemas.microsoft.com/office/drawing/2014/main" id="{EE42C676-BC59-444A-9545-BE3962464E87}"/>
-              </a:ext>
-            </a:extLst>
-          </p:cNvPr>
-          <p:cNvSpPr/>
-          <p:nvPr/>
-        </p:nvSpPr>
-        <p:spPr>
-          <a:xfrm>
-            <a:off x="4765673" y="907257"/>
-            <a:ext cx="72000" cy="4953793"/>
-          </a:xfrm>
-          <a:prstGeom prst="rect">
-            <a:avLst/>
-          </a:prstGeom>
-          <a:ln w="9525">
-            <a:noFill/>
-          </a:ln>
-        </p:spPr>
-        <p:style>
-          <a:lnRef idx="2">
-            <a:schemeClr val="dk1">
-              <a:shade val="50000"/>
-            </a:schemeClr>
-          </a:lnRef>
-          <a:fillRef idx="1">
-            <a:schemeClr val="dk1"/>
-          </a:fillRef>
-          <a:effectRef idx="0">
-            <a:schemeClr val="dk1"/>
-          </a:effectRef>
-          <a:fontRef idx="minor">
-            <a:schemeClr val="lt1"/>
-          </a:fontRef>
-        </p:style>
-        <p:txBody>
-          <a:bodyPr rtlCol="0" anchor="ctr"/>
-          <a:lstStyle/>
-          <a:p>
-            <a:pPr algn="ctr"/>
-            <a:endParaRPr lang="de-DE"/>
-          </a:p>
-        </p:txBody>
-      </p:sp>
-      <p:grpSp>
-        <p:nvGrpSpPr>
-          <p:cNvPr id="50" name="Gruppieren 49">
-            <a:extLst>
-              <a:ext uri="{FF2B5EF4-FFF2-40B4-BE49-F238E27FC236}">
-                <a16:creationId xmlns:a16="http://schemas.microsoft.com/office/drawing/2014/main" id="{38E3DDDE-093D-4785-AB58-0997A1A2F6BE}"/>
-              </a:ext>
-            </a:extLst>
-          </p:cNvPr>
-          <p:cNvGrpSpPr/>
-          <p:nvPr/>
-        </p:nvGrpSpPr>
-        <p:grpSpPr>
-          <a:xfrm>
-            <a:off x="4546600" y="3429000"/>
-            <a:ext cx="3289602" cy="2251646"/>
-            <a:chOff x="4546600" y="3429000"/>
-            <a:chExt cx="3289602" cy="2251646"/>
-          </a:xfrm>
-        </p:grpSpPr>
-        <p:grpSp>
-          <p:nvGrpSpPr>
-            <p:cNvPr id="7" name="Gruppieren 6">
-              <a:extLst>
-                <a:ext uri="{FF2B5EF4-FFF2-40B4-BE49-F238E27FC236}">
-                  <a16:creationId xmlns:a16="http://schemas.microsoft.com/office/drawing/2014/main" id="{B12105FB-DB5D-46E8-BD0E-AD84D49102E3}"/>
-                </a:ext>
-              </a:extLst>
-            </p:cNvPr>
-            <p:cNvGrpSpPr>
-              <a:grpSpLocks noChangeAspect="1"/>
-            </p:cNvGrpSpPr>
-            <p:nvPr/>
-          </p:nvGrpSpPr>
-          <p:grpSpPr>
-            <a:xfrm>
-              <a:off x="4546600" y="3429000"/>
-              <a:ext cx="3289602" cy="2251646"/>
-              <a:chOff x="4162538" y="1754812"/>
-              <a:chExt cx="5208401" cy="3565012"/>
-            </a:xfrm>
-          </p:grpSpPr>
-          <p:sp>
-            <p:nvSpPr>
-              <p:cNvPr id="8" name="Rechteck: abgerundete Ecken 7">
-                <a:extLst>
-                  <a:ext uri="{FF2B5EF4-FFF2-40B4-BE49-F238E27FC236}">
-                    <a16:creationId xmlns:a16="http://schemas.microsoft.com/office/drawing/2014/main" id="{49B38451-F86C-47B9-84DF-D1672673850F}"/>
-                  </a:ext>
-                </a:extLst>
-              </p:cNvPr>
-              <p:cNvSpPr/>
-              <p:nvPr/>
-            </p:nvSpPr>
-            <p:spPr>
-              <a:xfrm rot="21113087">
-                <a:off x="4233616" y="1979945"/>
-                <a:ext cx="5046210" cy="3140403"/>
-              </a:xfrm>
-              <a:prstGeom prst="roundRect">
-                <a:avLst>
-                  <a:gd name="adj" fmla="val 11051"/>
-                </a:avLst>
-              </a:prstGeom>
-              <a:solidFill>
-                <a:srgbClr val="ECE9FC"/>
-              </a:solidFill>
-              <a:ln w="76200" cap="rnd" cmpd="sng">
-                <a:solidFill>
-                  <a:srgbClr val="D1DDF7"/>
-                </a:solidFill>
-                <a:round/>
-              </a:ln>
-            </p:spPr>
-            <p:style>
-              <a:lnRef idx="2">
-                <a:schemeClr val="accent1">
-                  <a:shade val="50000"/>
-                </a:schemeClr>
-              </a:lnRef>
-              <a:fillRef idx="1">
-                <a:schemeClr val="accent1"/>
-              </a:fillRef>
-              <a:effectRef idx="0">
-                <a:schemeClr val="accent1"/>
-              </a:effectRef>
-              <a:fontRef idx="minor">
-                <a:schemeClr val="lt1"/>
-              </a:fontRef>
-            </p:style>
-            <p:txBody>
-              <a:bodyPr rtlCol="0" anchor="ctr"/>
-              <a:lstStyle/>
-              <a:p>
-                <a:pPr algn="ctr"/>
-                <a:endParaRPr lang="de-DE" dirty="0"/>
-              </a:p>
-            </p:txBody>
-          </p:sp>
-          <p:cxnSp>
-            <p:nvCxnSpPr>
-              <p:cNvPr id="9" name="Gerader Verbinder 8">
-                <a:extLst>
-                  <a:ext uri="{FF2B5EF4-FFF2-40B4-BE49-F238E27FC236}">
-                    <a16:creationId xmlns:a16="http://schemas.microsoft.com/office/drawing/2014/main" id="{289E7F2E-5D03-433C-B606-2EB7ABAB13EA}"/>
-                  </a:ext>
-                </a:extLst>
-              </p:cNvPr>
-              <p:cNvCxnSpPr>
-                <a:cxnSpLocks/>
-              </p:cNvCxnSpPr>
-              <p:nvPr/>
-            </p:nvCxnSpPr>
-            <p:spPr>
-              <a:xfrm>
-                <a:off x="5055783" y="2170954"/>
-                <a:ext cx="466437" cy="3148870"/>
-              </a:xfrm>
-              <a:prstGeom prst="line">
-                <a:avLst/>
-              </a:prstGeom>
-              <a:ln w="76200">
-                <a:solidFill>
-                  <a:srgbClr val="D1DDF7"/>
-                </a:solidFill>
-              </a:ln>
-            </p:spPr>
-            <p:style>
-              <a:lnRef idx="1">
-                <a:schemeClr val="accent1"/>
-              </a:lnRef>
-              <a:fillRef idx="0">
-                <a:schemeClr val="accent1"/>
-              </a:fillRef>
-              <a:effectRef idx="0">
-                <a:schemeClr val="accent1"/>
-              </a:effectRef>
-              <a:fontRef idx="minor">
-                <a:schemeClr val="tx1"/>
-              </a:fontRef>
-            </p:style>
-          </p:cxnSp>
-          <p:cxnSp>
-            <p:nvCxnSpPr>
-              <p:cNvPr id="11" name="Gerader Verbinder 10">
-                <a:extLst>
-                  <a:ext uri="{FF2B5EF4-FFF2-40B4-BE49-F238E27FC236}">
-                    <a16:creationId xmlns:a16="http://schemas.microsoft.com/office/drawing/2014/main" id="{B103D0FC-111F-4168-A4CA-D754233ADA19}"/>
-                  </a:ext>
-                </a:extLst>
-              </p:cNvPr>
-              <p:cNvCxnSpPr>
-                <a:cxnSpLocks/>
-              </p:cNvCxnSpPr>
-              <p:nvPr/>
-            </p:nvCxnSpPr>
-            <p:spPr>
-              <a:xfrm flipV="1">
-                <a:off x="4162538" y="2696959"/>
-                <a:ext cx="5020199" cy="757711"/>
-              </a:xfrm>
-              <a:prstGeom prst="line">
-                <a:avLst/>
-              </a:prstGeom>
-              <a:ln w="76200">
-                <a:solidFill>
-                  <a:srgbClr val="D1DDF7"/>
-                </a:solidFill>
-              </a:ln>
-            </p:spPr>
-            <p:style>
-              <a:lnRef idx="1">
-                <a:schemeClr val="accent1"/>
-              </a:lnRef>
-              <a:fillRef idx="0">
-                <a:schemeClr val="accent1"/>
-              </a:fillRef>
-              <a:effectRef idx="0">
-                <a:schemeClr val="accent1"/>
-              </a:effectRef>
-              <a:fontRef idx="minor">
-                <a:schemeClr val="tx1"/>
-              </a:fontRef>
-            </p:style>
-          </p:cxnSp>
-          <p:cxnSp>
-            <p:nvCxnSpPr>
-              <p:cNvPr id="12" name="Gerader Verbinder 11">
-                <a:extLst>
-                  <a:ext uri="{FF2B5EF4-FFF2-40B4-BE49-F238E27FC236}">
-                    <a16:creationId xmlns:a16="http://schemas.microsoft.com/office/drawing/2014/main" id="{35E76898-9553-4AA0-8FD8-11547D97BBB4}"/>
-                  </a:ext>
-                </a:extLst>
-              </p:cNvPr>
-              <p:cNvCxnSpPr>
-                <a:cxnSpLocks/>
-              </p:cNvCxnSpPr>
-              <p:nvPr/>
-            </p:nvCxnSpPr>
-            <p:spPr>
-              <a:xfrm flipV="1">
-                <a:off x="4375261" y="3745389"/>
-                <a:ext cx="4995678" cy="712344"/>
-              </a:xfrm>
-              <a:prstGeom prst="line">
-                <a:avLst/>
-              </a:prstGeom>
-              <a:ln w="76200">
-                <a:solidFill>
-                  <a:srgbClr val="D1DDF7"/>
-                </a:solidFill>
-              </a:ln>
-            </p:spPr>
-            <p:style>
-              <a:lnRef idx="1">
-                <a:schemeClr val="accent1"/>
-              </a:lnRef>
-              <a:fillRef idx="0">
-                <a:schemeClr val="accent1"/>
-              </a:fillRef>
-              <a:effectRef idx="0">
-                <a:schemeClr val="accent1"/>
-              </a:effectRef>
-              <a:fontRef idx="minor">
-                <a:schemeClr val="tx1"/>
-              </a:fontRef>
-            </p:style>
-          </p:cxnSp>
-          <p:cxnSp>
-            <p:nvCxnSpPr>
-              <p:cNvPr id="13" name="Gerader Verbinder 12">
-                <a:extLst>
-                  <a:ext uri="{FF2B5EF4-FFF2-40B4-BE49-F238E27FC236}">
-                    <a16:creationId xmlns:a16="http://schemas.microsoft.com/office/drawing/2014/main" id="{9BB4B93B-5E88-4E60-9DAF-908393844C4E}"/>
-                  </a:ext>
-                </a:extLst>
-              </p:cNvPr>
-              <p:cNvCxnSpPr>
-                <a:cxnSpLocks/>
-              </p:cNvCxnSpPr>
-              <p:nvPr/>
-            </p:nvCxnSpPr>
-            <p:spPr>
-              <a:xfrm>
-                <a:off x="6096000" y="1995668"/>
-                <a:ext cx="443312" cy="3108955"/>
-              </a:xfrm>
-              <a:prstGeom prst="line">
-                <a:avLst/>
-              </a:prstGeom>
-              <a:ln w="76200">
-                <a:solidFill>
-                  <a:srgbClr val="D1DDF7"/>
-                </a:solidFill>
-              </a:ln>
-            </p:spPr>
-            <p:style>
-              <a:lnRef idx="1">
-                <a:schemeClr val="accent1"/>
-              </a:lnRef>
-              <a:fillRef idx="0">
-                <a:schemeClr val="accent1"/>
-              </a:fillRef>
-              <a:effectRef idx="0">
-                <a:schemeClr val="accent1"/>
-              </a:effectRef>
-              <a:fontRef idx="minor">
-                <a:schemeClr val="tx1"/>
-              </a:fontRef>
-            </p:style>
-          </p:cxnSp>
-          <p:cxnSp>
-            <p:nvCxnSpPr>
-              <p:cNvPr id="14" name="Gerader Verbinder 13">
-                <a:extLst>
-                  <a:ext uri="{FF2B5EF4-FFF2-40B4-BE49-F238E27FC236}">
-                    <a16:creationId xmlns:a16="http://schemas.microsoft.com/office/drawing/2014/main" id="{786B4DFD-810C-4576-A57C-3D8271C77F55}"/>
-                  </a:ext>
-                </a:extLst>
-              </p:cNvPr>
-              <p:cNvCxnSpPr>
-                <a:cxnSpLocks/>
-              </p:cNvCxnSpPr>
-              <p:nvPr/>
-            </p:nvCxnSpPr>
-            <p:spPr>
-              <a:xfrm>
-                <a:off x="8153309" y="1754812"/>
-                <a:ext cx="466437" cy="3148870"/>
-              </a:xfrm>
-              <a:prstGeom prst="line">
-                <a:avLst/>
-              </a:prstGeom>
-              <a:ln w="76200">
-                <a:solidFill>
-                  <a:srgbClr val="D1DDF7"/>
-                </a:solidFill>
-              </a:ln>
-            </p:spPr>
-            <p:style>
-              <a:lnRef idx="1">
-                <a:schemeClr val="accent1"/>
-              </a:lnRef>
-              <a:fillRef idx="0">
-                <a:schemeClr val="accent1"/>
-              </a:fillRef>
-              <a:effectRef idx="0">
-                <a:schemeClr val="accent1"/>
-              </a:effectRef>
-              <a:fontRef idx="minor">
-                <a:schemeClr val="tx1"/>
-              </a:fontRef>
-            </p:style>
-          </p:cxnSp>
-          <p:cxnSp>
-            <p:nvCxnSpPr>
-              <p:cNvPr id="15" name="Gerader Verbinder 14">
-                <a:extLst>
-                  <a:ext uri="{FF2B5EF4-FFF2-40B4-BE49-F238E27FC236}">
-                    <a16:creationId xmlns:a16="http://schemas.microsoft.com/office/drawing/2014/main" id="{A15D7ACF-5762-4C9B-B942-9C6D46095AF0}"/>
-                  </a:ext>
-                </a:extLst>
-              </p:cNvPr>
-              <p:cNvCxnSpPr>
-                <a:cxnSpLocks/>
-              </p:cNvCxnSpPr>
-              <p:nvPr/>
-            </p:nvCxnSpPr>
-            <p:spPr>
-              <a:xfrm>
-                <a:off x="7113092" y="1930557"/>
-                <a:ext cx="466437" cy="3148870"/>
-              </a:xfrm>
-              <a:prstGeom prst="line">
-                <a:avLst/>
-              </a:prstGeom>
-              <a:ln w="76200">
-                <a:solidFill>
-                  <a:srgbClr val="D1DDF7"/>
-                </a:solidFill>
-              </a:ln>
-            </p:spPr>
-            <p:style>
-              <a:lnRef idx="1">
-                <a:schemeClr val="accent1"/>
-              </a:lnRef>
-              <a:fillRef idx="0">
-                <a:schemeClr val="accent1"/>
-              </a:fillRef>
-              <a:effectRef idx="0">
-                <a:schemeClr val="accent1"/>
-              </a:effectRef>
-              <a:fontRef idx="minor">
-                <a:schemeClr val="tx1"/>
-              </a:fontRef>
-            </p:style>
-          </p:cxnSp>
-        </p:grpSp>
-        <p:grpSp>
-          <p:nvGrpSpPr>
-            <p:cNvPr id="40" name="Gruppieren 39">
-              <a:extLst>
-                <a:ext uri="{FF2B5EF4-FFF2-40B4-BE49-F238E27FC236}">
-                  <a16:creationId xmlns:a16="http://schemas.microsoft.com/office/drawing/2014/main" id="{2CB34455-C29B-467A-8ED0-E1088916EA75}"/>
-                </a:ext>
-              </a:extLst>
-            </p:cNvPr>
-            <p:cNvGrpSpPr/>
-            <p:nvPr/>
-          </p:nvGrpSpPr>
-          <p:grpSpPr>
-            <a:xfrm rot="21051589">
-              <a:off x="5358382" y="3819596"/>
-              <a:ext cx="282204" cy="403213"/>
-              <a:chOff x="2585034" y="4020194"/>
-              <a:chExt cx="282204" cy="403213"/>
-            </a:xfrm>
-          </p:grpSpPr>
-          <p:cxnSp>
-            <p:nvCxnSpPr>
-              <p:cNvPr id="34" name="Gerader Verbinder 33">
-                <a:extLst>
-                  <a:ext uri="{FF2B5EF4-FFF2-40B4-BE49-F238E27FC236}">
-                    <a16:creationId xmlns:a16="http://schemas.microsoft.com/office/drawing/2014/main" id="{FED83892-2222-46CC-8BE5-731E606CADE3}"/>
-                  </a:ext>
-                </a:extLst>
-              </p:cNvPr>
-              <p:cNvCxnSpPr>
-                <a:cxnSpLocks/>
-              </p:cNvCxnSpPr>
-              <p:nvPr/>
-            </p:nvCxnSpPr>
-            <p:spPr>
-              <a:xfrm flipH="1" flipV="1">
-                <a:off x="2585034" y="4263338"/>
-                <a:ext cx="137897" cy="160069"/>
-              </a:xfrm>
-              <a:prstGeom prst="line">
-                <a:avLst/>
-              </a:prstGeom>
-              <a:ln w="101600" cap="rnd">
-                <a:solidFill>
-                  <a:srgbClr val="AFE09C"/>
-                </a:solidFill>
-                <a:bevel/>
-              </a:ln>
-            </p:spPr>
-            <p:style>
-              <a:lnRef idx="1">
-                <a:schemeClr val="dk1"/>
-              </a:lnRef>
-              <a:fillRef idx="0">
-                <a:schemeClr val="dk1"/>
-              </a:fillRef>
-              <a:effectRef idx="0">
-                <a:schemeClr val="dk1"/>
-              </a:effectRef>
-              <a:fontRef idx="minor">
-                <a:schemeClr val="tx1"/>
-              </a:fontRef>
-            </p:style>
-          </p:cxnSp>
-          <p:cxnSp>
-            <p:nvCxnSpPr>
-              <p:cNvPr id="36" name="Gerader Verbinder 35">
-                <a:extLst>
-                  <a:ext uri="{FF2B5EF4-FFF2-40B4-BE49-F238E27FC236}">
-                    <a16:creationId xmlns:a16="http://schemas.microsoft.com/office/drawing/2014/main" id="{F93D4496-9693-4625-A371-9913B7DAFC72}"/>
-                  </a:ext>
-                </a:extLst>
-              </p:cNvPr>
-              <p:cNvCxnSpPr>
-                <a:cxnSpLocks/>
-              </p:cNvCxnSpPr>
-              <p:nvPr/>
-            </p:nvCxnSpPr>
-            <p:spPr>
-              <a:xfrm flipV="1">
-                <a:off x="2740975" y="4020194"/>
-                <a:ext cx="126263" cy="394012"/>
-              </a:xfrm>
-              <a:prstGeom prst="line">
-                <a:avLst/>
-              </a:prstGeom>
-              <a:ln w="101600" cap="rnd">
-                <a:solidFill>
-                  <a:srgbClr val="AFE09C"/>
-                </a:solidFill>
-                <a:bevel/>
-              </a:ln>
-            </p:spPr>
-            <p:style>
-              <a:lnRef idx="1">
-                <a:schemeClr val="dk1"/>
-              </a:lnRef>
-              <a:fillRef idx="0">
-                <a:schemeClr val="dk1"/>
-              </a:fillRef>
-              <a:effectRef idx="0">
-                <a:schemeClr val="dk1"/>
-              </a:effectRef>
-              <a:fontRef idx="minor">
-                <a:schemeClr val="tx1"/>
-              </a:fontRef>
-            </p:style>
-          </p:cxnSp>
-        </p:grpSp>
-        <p:grpSp>
-          <p:nvGrpSpPr>
-            <p:cNvPr id="41" name="Gruppieren 40">
-              <a:extLst>
-                <a:ext uri="{FF2B5EF4-FFF2-40B4-BE49-F238E27FC236}">
-                  <a16:creationId xmlns:a16="http://schemas.microsoft.com/office/drawing/2014/main" id="{3C60AA83-CE84-46F8-B9FB-438C9C2E858A}"/>
-                </a:ext>
-              </a:extLst>
-            </p:cNvPr>
-            <p:cNvGrpSpPr/>
-            <p:nvPr/>
-          </p:nvGrpSpPr>
-          <p:grpSpPr>
-            <a:xfrm rot="21051589">
-              <a:off x="6187080" y="5019165"/>
-              <a:ext cx="282204" cy="403213"/>
-              <a:chOff x="2585034" y="4020194"/>
-              <a:chExt cx="282204" cy="403213"/>
-            </a:xfrm>
-          </p:grpSpPr>
-          <p:cxnSp>
-            <p:nvCxnSpPr>
-              <p:cNvPr id="42" name="Gerader Verbinder 41">
-                <a:extLst>
-                  <a:ext uri="{FF2B5EF4-FFF2-40B4-BE49-F238E27FC236}">
-                    <a16:creationId xmlns:a16="http://schemas.microsoft.com/office/drawing/2014/main" id="{B6D677EB-9AEC-4080-8A39-7EEC0A145D31}"/>
-                  </a:ext>
-                </a:extLst>
-              </p:cNvPr>
-              <p:cNvCxnSpPr>
-                <a:cxnSpLocks/>
-              </p:cNvCxnSpPr>
-              <p:nvPr/>
-            </p:nvCxnSpPr>
-            <p:spPr>
-              <a:xfrm flipH="1" flipV="1">
-                <a:off x="2585034" y="4263338"/>
-                <a:ext cx="137897" cy="160069"/>
-              </a:xfrm>
-              <a:prstGeom prst="line">
-                <a:avLst/>
-              </a:prstGeom>
-              <a:ln w="101600" cap="rnd">
-                <a:solidFill>
-                  <a:srgbClr val="AFE09C"/>
-                </a:solidFill>
-                <a:bevel/>
-              </a:ln>
-            </p:spPr>
-            <p:style>
-              <a:lnRef idx="1">
-                <a:schemeClr val="dk1"/>
-              </a:lnRef>
-              <a:fillRef idx="0">
-                <a:schemeClr val="dk1"/>
-              </a:fillRef>
-              <a:effectRef idx="0">
-                <a:schemeClr val="dk1"/>
-              </a:effectRef>
-              <a:fontRef idx="minor">
-                <a:schemeClr val="tx1"/>
-              </a:fontRef>
-            </p:style>
-          </p:cxnSp>
-          <p:cxnSp>
-            <p:nvCxnSpPr>
-              <p:cNvPr id="43" name="Gerader Verbinder 42">
-                <a:extLst>
-                  <a:ext uri="{FF2B5EF4-FFF2-40B4-BE49-F238E27FC236}">
-                    <a16:creationId xmlns:a16="http://schemas.microsoft.com/office/drawing/2014/main" id="{CEDCFEA2-8278-41AA-800A-DAB2527D42B1}"/>
-                  </a:ext>
-                </a:extLst>
-              </p:cNvPr>
-              <p:cNvCxnSpPr>
-                <a:cxnSpLocks/>
-              </p:cNvCxnSpPr>
-              <p:nvPr/>
-            </p:nvCxnSpPr>
-            <p:spPr>
-              <a:xfrm flipV="1">
-                <a:off x="2740975" y="4020194"/>
-                <a:ext cx="126263" cy="394012"/>
-              </a:xfrm>
-              <a:prstGeom prst="line">
-                <a:avLst/>
-              </a:prstGeom>
-              <a:ln w="101600" cap="rnd">
-                <a:solidFill>
-                  <a:srgbClr val="AFE09C"/>
-                </a:solidFill>
-                <a:bevel/>
-              </a:ln>
-            </p:spPr>
-            <p:style>
-              <a:lnRef idx="1">
-                <a:schemeClr val="dk1"/>
-              </a:lnRef>
-              <a:fillRef idx="0">
-                <a:schemeClr val="dk1"/>
-              </a:fillRef>
-              <a:effectRef idx="0">
-                <a:schemeClr val="dk1"/>
-              </a:effectRef>
-              <a:fontRef idx="minor">
-                <a:schemeClr val="tx1"/>
-              </a:fontRef>
-            </p:style>
-          </p:cxnSp>
-        </p:grpSp>
-        <p:grpSp>
-          <p:nvGrpSpPr>
-            <p:cNvPr id="44" name="Gruppieren 43">
-              <a:extLst>
-                <a:ext uri="{FF2B5EF4-FFF2-40B4-BE49-F238E27FC236}">
-                  <a16:creationId xmlns:a16="http://schemas.microsoft.com/office/drawing/2014/main" id="{B7412787-9D3C-4BC6-91D7-56C42F80004C}"/>
-                </a:ext>
-              </a:extLst>
-            </p:cNvPr>
-            <p:cNvGrpSpPr/>
-            <p:nvPr/>
-          </p:nvGrpSpPr>
-          <p:grpSpPr>
-            <a:xfrm rot="21051589">
-              <a:off x="6732228" y="4285672"/>
-              <a:ext cx="282204" cy="403213"/>
-              <a:chOff x="2585034" y="4020194"/>
-              <a:chExt cx="282204" cy="403213"/>
-            </a:xfrm>
-          </p:grpSpPr>
-          <p:cxnSp>
-            <p:nvCxnSpPr>
-              <p:cNvPr id="45" name="Gerader Verbinder 44">
-                <a:extLst>
-                  <a:ext uri="{FF2B5EF4-FFF2-40B4-BE49-F238E27FC236}">
-                    <a16:creationId xmlns:a16="http://schemas.microsoft.com/office/drawing/2014/main" id="{84FACAAD-BD60-49A3-B805-569EB95D7674}"/>
-                  </a:ext>
-                </a:extLst>
-              </p:cNvPr>
-              <p:cNvCxnSpPr>
-                <a:cxnSpLocks/>
-              </p:cNvCxnSpPr>
-              <p:nvPr/>
-            </p:nvCxnSpPr>
-            <p:spPr>
-              <a:xfrm flipH="1" flipV="1">
-                <a:off x="2585034" y="4263338"/>
-                <a:ext cx="137897" cy="160069"/>
-              </a:xfrm>
-              <a:prstGeom prst="line">
-                <a:avLst/>
-              </a:prstGeom>
-              <a:ln w="101600" cap="rnd">
-                <a:solidFill>
-                  <a:srgbClr val="AFE09C"/>
-                </a:solidFill>
-                <a:bevel/>
-              </a:ln>
-            </p:spPr>
-            <p:style>
-              <a:lnRef idx="1">
-                <a:schemeClr val="dk1"/>
-              </a:lnRef>
-              <a:fillRef idx="0">
-                <a:schemeClr val="dk1"/>
-              </a:fillRef>
-              <a:effectRef idx="0">
-                <a:schemeClr val="dk1"/>
-              </a:effectRef>
-              <a:fontRef idx="minor">
-                <a:schemeClr val="tx1"/>
-              </a:fontRef>
-            </p:style>
-          </p:cxnSp>
-          <p:cxnSp>
-            <p:nvCxnSpPr>
-              <p:cNvPr id="46" name="Gerader Verbinder 45">
-                <a:extLst>
-                  <a:ext uri="{FF2B5EF4-FFF2-40B4-BE49-F238E27FC236}">
-                    <a16:creationId xmlns:a16="http://schemas.microsoft.com/office/drawing/2014/main" id="{5BC0E967-D306-46E2-BE2D-4AD59C148F83}"/>
-                  </a:ext>
-                </a:extLst>
-              </p:cNvPr>
-              <p:cNvCxnSpPr>
-                <a:cxnSpLocks/>
-              </p:cNvCxnSpPr>
-              <p:nvPr/>
-            </p:nvCxnSpPr>
-            <p:spPr>
-              <a:xfrm flipV="1">
-                <a:off x="2740975" y="4020194"/>
-                <a:ext cx="126263" cy="394012"/>
-              </a:xfrm>
-              <a:prstGeom prst="line">
-                <a:avLst/>
-              </a:prstGeom>
-              <a:ln w="101600" cap="rnd">
-                <a:solidFill>
-                  <a:srgbClr val="AFE09C"/>
-                </a:solidFill>
-                <a:bevel/>
-              </a:ln>
-            </p:spPr>
-            <p:style>
-              <a:lnRef idx="1">
-                <a:schemeClr val="dk1"/>
-              </a:lnRef>
-              <a:fillRef idx="0">
-                <a:schemeClr val="dk1"/>
-              </a:fillRef>
-              <a:effectRef idx="0">
-                <a:schemeClr val="dk1"/>
-              </a:effectRef>
-              <a:fontRef idx="minor">
-                <a:schemeClr val="tx1"/>
-              </a:fontRef>
-            </p:style>
-          </p:cxnSp>
-        </p:grpSp>
-        <p:grpSp>
-          <p:nvGrpSpPr>
-            <p:cNvPr id="47" name="Gruppieren 46">
-              <a:extLst>
-                <a:ext uri="{FF2B5EF4-FFF2-40B4-BE49-F238E27FC236}">
-                  <a16:creationId xmlns:a16="http://schemas.microsoft.com/office/drawing/2014/main" id="{80A9686D-6229-43B3-92B3-A068AAD07628}"/>
-                </a:ext>
-              </a:extLst>
-            </p:cNvPr>
-            <p:cNvGrpSpPr/>
-            <p:nvPr/>
-          </p:nvGrpSpPr>
-          <p:grpSpPr>
-            <a:xfrm rot="21051589">
-              <a:off x="4897588" y="5206792"/>
-              <a:ext cx="282204" cy="403213"/>
-              <a:chOff x="2585034" y="4020194"/>
-              <a:chExt cx="282204" cy="403213"/>
-            </a:xfrm>
-          </p:grpSpPr>
-          <p:cxnSp>
-            <p:nvCxnSpPr>
-              <p:cNvPr id="48" name="Gerader Verbinder 47">
-                <a:extLst>
-                  <a:ext uri="{FF2B5EF4-FFF2-40B4-BE49-F238E27FC236}">
-                    <a16:creationId xmlns:a16="http://schemas.microsoft.com/office/drawing/2014/main" id="{3DA35493-CE92-4522-9F66-19EF48C07EBF}"/>
-                  </a:ext>
-                </a:extLst>
-              </p:cNvPr>
-              <p:cNvCxnSpPr>
-                <a:cxnSpLocks/>
-              </p:cNvCxnSpPr>
-              <p:nvPr/>
-            </p:nvCxnSpPr>
-            <p:spPr>
-              <a:xfrm flipH="1" flipV="1">
-                <a:off x="2585034" y="4263338"/>
-                <a:ext cx="137897" cy="160069"/>
-              </a:xfrm>
-              <a:prstGeom prst="line">
-                <a:avLst/>
-              </a:prstGeom>
-              <a:ln w="101600" cap="rnd">
-                <a:solidFill>
-                  <a:srgbClr val="AFE09C"/>
-                </a:solidFill>
-                <a:bevel/>
-              </a:ln>
-            </p:spPr>
-            <p:style>
-              <a:lnRef idx="1">
-                <a:schemeClr val="dk1"/>
-              </a:lnRef>
-              <a:fillRef idx="0">
-                <a:schemeClr val="dk1"/>
-              </a:fillRef>
-              <a:effectRef idx="0">
-                <a:schemeClr val="dk1"/>
-              </a:effectRef>
-              <a:fontRef idx="minor">
-                <a:schemeClr val="tx1"/>
-              </a:fontRef>
-            </p:style>
-          </p:cxnSp>
-          <p:cxnSp>
-            <p:nvCxnSpPr>
-              <p:cNvPr id="49" name="Gerader Verbinder 48">
-                <a:extLst>
-                  <a:ext uri="{FF2B5EF4-FFF2-40B4-BE49-F238E27FC236}">
-                    <a16:creationId xmlns:a16="http://schemas.microsoft.com/office/drawing/2014/main" id="{91957CA5-6F4E-4E45-B2E7-DE0BAED3FCDD}"/>
-                  </a:ext>
-                </a:extLst>
-              </p:cNvPr>
-              <p:cNvCxnSpPr>
-                <a:cxnSpLocks/>
-              </p:cNvCxnSpPr>
-              <p:nvPr/>
-            </p:nvCxnSpPr>
-            <p:spPr>
-              <a:xfrm flipV="1">
-                <a:off x="2740975" y="4020194"/>
-                <a:ext cx="126263" cy="394012"/>
-              </a:xfrm>
-              <a:prstGeom prst="line">
-                <a:avLst/>
-              </a:prstGeom>
-              <a:ln w="101600" cap="rnd">
-                <a:solidFill>
-                  <a:srgbClr val="AFE09C"/>
-                </a:solidFill>
-                <a:bevel/>
-              </a:ln>
-            </p:spPr>
-            <p:style>
-              <a:lnRef idx="1">
-                <a:schemeClr val="dk1"/>
-              </a:lnRef>
-              <a:fillRef idx="0">
-                <a:schemeClr val="dk1"/>
-              </a:fillRef>
-              <a:effectRef idx="0">
-                <a:schemeClr val="dk1"/>
-              </a:effectRef>
-              <a:fontRef idx="minor">
-                <a:schemeClr val="tx1"/>
-              </a:fontRef>
-            </p:style>
-          </p:cxnSp>
-        </p:grpSp>
-      </p:grpSp>
-      <p:sp>
-        <p:nvSpPr>
-          <p:cNvPr id="4" name="Rechteck 3">
-            <a:extLst>
-              <a:ext uri="{FF2B5EF4-FFF2-40B4-BE49-F238E27FC236}">
-                <a16:creationId xmlns:a16="http://schemas.microsoft.com/office/drawing/2014/main" id="{3A3AEFB1-BB9C-4D3F-8C2B-D2304B0393C4}"/>
-              </a:ext>
-            </a:extLst>
-          </p:cNvPr>
-          <p:cNvSpPr/>
-          <p:nvPr/>
-        </p:nvSpPr>
-        <p:spPr>
-          <a:xfrm>
-            <a:off x="3555206" y="996067"/>
-            <a:ext cx="1200702" cy="5633333"/>
-          </a:xfrm>
-          <a:prstGeom prst="rect">
-            <a:avLst/>
-          </a:prstGeom>
-          <a:solidFill>
-            <a:schemeClr val="bg1"/>
-          </a:solidFill>
-          <a:ln>
-            <a:noFill/>
-          </a:ln>
-        </p:spPr>
-        <p:style>
-          <a:lnRef idx="2">
-            <a:schemeClr val="accent1">
-              <a:shade val="50000"/>
-            </a:schemeClr>
-          </a:lnRef>
-          <a:fillRef idx="1">
-            <a:schemeClr val="accent1"/>
-          </a:fillRef>
-          <a:effectRef idx="0">
-            <a:schemeClr val="accent1"/>
-          </a:effectRef>
-          <a:fontRef idx="minor">
-            <a:schemeClr val="lt1"/>
-          </a:fontRef>
-        </p:style>
-        <p:txBody>
-          <a:bodyPr rtlCol="0" anchor="ctr"/>
-          <a:lstStyle/>
-          <a:p>
-            <a:pPr algn="ctr"/>
-            <a:endParaRPr lang="de-DE"/>
-          </a:p>
-        </p:txBody>
-      </p:sp>
-      <p:sp>
-        <p:nvSpPr>
-          <p:cNvPr id="32" name="Rechteck 31">
-            <a:extLst>
-              <a:ext uri="{FF2B5EF4-FFF2-40B4-BE49-F238E27FC236}">
-                <a16:creationId xmlns:a16="http://schemas.microsoft.com/office/drawing/2014/main" id="{F8C4B1B2-D92B-4258-AED7-FB3F9E62E991}"/>
-              </a:ext>
-            </a:extLst>
-          </p:cNvPr>
-          <p:cNvSpPr/>
-          <p:nvPr/>
-        </p:nvSpPr>
-        <p:spPr>
-          <a:xfrm>
-            <a:off x="7439507" y="723333"/>
-            <a:ext cx="1200702" cy="5633333"/>
-          </a:xfrm>
-          <a:prstGeom prst="rect">
-            <a:avLst/>
-          </a:prstGeom>
-          <a:solidFill>
-            <a:schemeClr val="bg1"/>
-          </a:solidFill>
-          <a:ln>
-            <a:noFill/>
-          </a:ln>
-        </p:spPr>
-        <p:style>
-          <a:lnRef idx="2">
-            <a:schemeClr val="accent1">
-              <a:shade val="50000"/>
-            </a:schemeClr>
-          </a:lnRef>
-          <a:fillRef idx="1">
-            <a:schemeClr val="accent1"/>
-          </a:fillRef>
-          <a:effectRef idx="0">
-            <a:schemeClr val="accent1"/>
-          </a:effectRef>
-          <a:fontRef idx="minor">
-            <a:schemeClr val="lt1"/>
-          </a:fontRef>
-        </p:style>
-        <p:txBody>
-          <a:bodyPr rtlCol="0" anchor="ctr"/>
-          <a:lstStyle/>
-          <a:p>
-            <a:pPr algn="ctr"/>
-            <a:endParaRPr lang="de-DE"/>
-          </a:p>
-        </p:txBody>
-      </p:sp>
-      <p:sp>
-        <p:nvSpPr>
-          <p:cNvPr id="5" name="Rechteck 4">
-            <a:extLst>
-              <a:ext uri="{FF2B5EF4-FFF2-40B4-BE49-F238E27FC236}">
-                <a16:creationId xmlns:a16="http://schemas.microsoft.com/office/drawing/2014/main" id="{9A40B1A2-15CF-487B-A563-285F13DDC0E3}"/>
-              </a:ext>
-            </a:extLst>
-          </p:cNvPr>
-          <p:cNvSpPr/>
-          <p:nvPr/>
-        </p:nvSpPr>
-        <p:spPr>
-          <a:xfrm>
-            <a:off x="4754875" y="2654299"/>
-            <a:ext cx="95731" cy="3296443"/>
-          </a:xfrm>
-          <a:prstGeom prst="rect">
-            <a:avLst/>
-          </a:prstGeom>
-          <a:solidFill>
-            <a:schemeClr val="tx1"/>
-          </a:solidFill>
-          <a:ln>
-            <a:noFill/>
-          </a:ln>
-        </p:spPr>
-        <p:style>
-          <a:lnRef idx="2">
-            <a:schemeClr val="accent1">
-              <a:shade val="50000"/>
-            </a:schemeClr>
-          </a:lnRef>
-          <a:fillRef idx="1">
-            <a:schemeClr val="accent1"/>
-          </a:fillRef>
-          <a:effectRef idx="0">
-            <a:schemeClr val="accent1"/>
-          </a:effectRef>
-          <a:fontRef idx="minor">
-            <a:schemeClr val="lt1"/>
-          </a:fontRef>
-        </p:style>
-        <p:txBody>
-          <a:bodyPr rtlCol="0" anchor="ctr"/>
-          <a:lstStyle/>
-          <a:p>
-            <a:pPr algn="ctr"/>
-            <a:endParaRPr lang="de-DE"/>
-          </a:p>
-        </p:txBody>
-      </p:sp>
-      <p:sp>
-        <p:nvSpPr>
-          <p:cNvPr id="33" name="Rechteck 32">
-            <a:extLst>
-              <a:ext uri="{FF2B5EF4-FFF2-40B4-BE49-F238E27FC236}">
-                <a16:creationId xmlns:a16="http://schemas.microsoft.com/office/drawing/2014/main" id="{4EB7B10F-210F-464C-8431-DB63B36D5E45}"/>
-              </a:ext>
-            </a:extLst>
-          </p:cNvPr>
-          <p:cNvSpPr/>
-          <p:nvPr/>
-        </p:nvSpPr>
-        <p:spPr>
-          <a:xfrm>
-            <a:off x="7366934" y="2615117"/>
-            <a:ext cx="72573" cy="3296443"/>
-          </a:xfrm>
-          <a:prstGeom prst="rect">
-            <a:avLst/>
-          </a:prstGeom>
-          <a:solidFill>
-            <a:schemeClr val="tx1"/>
-          </a:solidFill>
-          <a:ln>
-            <a:noFill/>
-          </a:ln>
-        </p:spPr>
-        <p:style>
-          <a:lnRef idx="2">
-            <a:schemeClr val="accent1">
-              <a:shade val="50000"/>
-            </a:schemeClr>
-          </a:lnRef>
-          <a:fillRef idx="1">
-            <a:schemeClr val="accent1"/>
-          </a:fillRef>
-          <a:effectRef idx="0">
-            <a:schemeClr val="accent1"/>
-          </a:effectRef>
-          <a:fontRef idx="minor">
-            <a:schemeClr val="lt1"/>
-          </a:fontRef>
-        </p:style>
-        <p:txBody>
-          <a:bodyPr rtlCol="0" anchor="ctr"/>
-          <a:lstStyle/>
-          <a:p>
-            <a:pPr algn="ctr"/>
-            <a:endParaRPr lang="de-DE"/>
-          </a:p>
-        </p:txBody>
-      </p:sp>
-    </p:spTree>
-    <p:extLst>
-      <p:ext uri="{BB962C8B-B14F-4D97-AF65-F5344CB8AC3E}">
-        <p14:creationId xmlns:p14="http://schemas.microsoft.com/office/powerpoint/2010/main" val="3359478284"/>
-      </p:ext>
-    </p:extLst>
-  </p:cSld>
-  <p:clrMapOvr>
-    <a:masterClrMapping/>
-  </p:clrMapOvr>
-</p:sld>
-</file>
-
 <file path=ppt/theme/theme1.xml><?xml version="1.0" encoding="utf-8"?>
 <a:theme xmlns:a="http://schemas.openxmlformats.org/drawingml/2006/main" name="Office">
   <a:themeElements>

</xml_diff>

<commit_message>
Redesign abgeschlossen; Touchicon geändert
</commit_message>
<xml_diff>
--- a/doc/vertretungsalarm.pptx
+++ b/doc/vertretungsalarm.pptx
@@ -272,7 +272,7 @@
           <a:p>
             <a:fld id="{E4E225A6-F9C6-4B3F-A3A1-E1FDB84ED865}" type="datetimeFigureOut">
               <a:rPr lang="de-DE" smtClean="0"/>
-              <a:t>06.01.2020</a:t>
+              <a:t>27.02.2020</a:t>
             </a:fld>
             <a:endParaRPr lang="de-DE"/>
           </a:p>
@@ -560,7 +560,7 @@
           <a:p>
             <a:fld id="{E4E225A6-F9C6-4B3F-A3A1-E1FDB84ED865}" type="datetimeFigureOut">
               <a:rPr lang="de-DE" smtClean="0"/>
-              <a:t>06.01.2020</a:t>
+              <a:t>27.02.2020</a:t>
             </a:fld>
             <a:endParaRPr lang="de-DE"/>
           </a:p>
@@ -758,7 +758,7 @@
           <a:p>
             <a:fld id="{E4E225A6-F9C6-4B3F-A3A1-E1FDB84ED865}" type="datetimeFigureOut">
               <a:rPr lang="de-DE" smtClean="0"/>
-              <a:t>06.01.2020</a:t>
+              <a:t>27.02.2020</a:t>
             </a:fld>
             <a:endParaRPr lang="de-DE"/>
           </a:p>
@@ -966,7 +966,7 @@
           <a:p>
             <a:fld id="{E4E225A6-F9C6-4B3F-A3A1-E1FDB84ED865}" type="datetimeFigureOut">
               <a:rPr lang="de-DE" smtClean="0"/>
-              <a:t>06.01.2020</a:t>
+              <a:t>27.02.2020</a:t>
             </a:fld>
             <a:endParaRPr lang="de-DE"/>
           </a:p>
@@ -1164,7 +1164,7 @@
           <a:p>
             <a:fld id="{E4E225A6-F9C6-4B3F-A3A1-E1FDB84ED865}" type="datetimeFigureOut">
               <a:rPr lang="de-DE" smtClean="0"/>
-              <a:t>06.01.2020</a:t>
+              <a:t>27.02.2020</a:t>
             </a:fld>
             <a:endParaRPr lang="de-DE"/>
           </a:p>
@@ -1439,7 +1439,7 @@
           <a:p>
             <a:fld id="{E4E225A6-F9C6-4B3F-A3A1-E1FDB84ED865}" type="datetimeFigureOut">
               <a:rPr lang="de-DE" smtClean="0"/>
-              <a:t>06.01.2020</a:t>
+              <a:t>27.02.2020</a:t>
             </a:fld>
             <a:endParaRPr lang="de-DE"/>
           </a:p>
@@ -1704,7 +1704,7 @@
           <a:p>
             <a:fld id="{E4E225A6-F9C6-4B3F-A3A1-E1FDB84ED865}" type="datetimeFigureOut">
               <a:rPr lang="de-DE" smtClean="0"/>
-              <a:t>06.01.2020</a:t>
+              <a:t>27.02.2020</a:t>
             </a:fld>
             <a:endParaRPr lang="de-DE"/>
           </a:p>
@@ -2116,7 +2116,7 @@
           <a:p>
             <a:fld id="{E4E225A6-F9C6-4B3F-A3A1-E1FDB84ED865}" type="datetimeFigureOut">
               <a:rPr lang="de-DE" smtClean="0"/>
-              <a:t>06.01.2020</a:t>
+              <a:t>27.02.2020</a:t>
             </a:fld>
             <a:endParaRPr lang="de-DE"/>
           </a:p>
@@ -2257,7 +2257,7 @@
           <a:p>
             <a:fld id="{E4E225A6-F9C6-4B3F-A3A1-E1FDB84ED865}" type="datetimeFigureOut">
               <a:rPr lang="de-DE" smtClean="0"/>
-              <a:t>06.01.2020</a:t>
+              <a:t>27.02.2020</a:t>
             </a:fld>
             <a:endParaRPr lang="de-DE"/>
           </a:p>
@@ -2370,7 +2370,7 @@
           <a:p>
             <a:fld id="{E4E225A6-F9C6-4B3F-A3A1-E1FDB84ED865}" type="datetimeFigureOut">
               <a:rPr lang="de-DE" smtClean="0"/>
-              <a:t>06.01.2020</a:t>
+              <a:t>27.02.2020</a:t>
             </a:fld>
             <a:endParaRPr lang="de-DE"/>
           </a:p>
@@ -2817,7 +2817,7 @@
           <a:p>
             <a:fld id="{E4E225A6-F9C6-4B3F-A3A1-E1FDB84ED865}" type="datetimeFigureOut">
               <a:rPr lang="de-DE" smtClean="0"/>
-              <a:t>06.01.2020</a:t>
+              <a:t>27.02.2020</a:t>
             </a:fld>
             <a:endParaRPr lang="de-DE"/>
           </a:p>
@@ -3058,7 +3058,7 @@
           <a:p>
             <a:fld id="{E4E225A6-F9C6-4B3F-A3A1-E1FDB84ED865}" type="datetimeFigureOut">
               <a:rPr lang="de-DE" smtClean="0"/>
-              <a:t>06.01.2020</a:t>
+              <a:t>27.02.2020</a:t>
             </a:fld>
             <a:endParaRPr lang="de-DE"/>
           </a:p>
@@ -9201,7 +9201,7 @@
             <a:avLst/>
           </a:prstGeom>
           <a:solidFill>
-            <a:srgbClr val="CCEBBF"/>
+            <a:srgbClr val="F0C267"/>
           </a:solidFill>
           <a:ln w="57150" cap="rnd">
             <a:noFill/>
@@ -9464,7 +9464,7 @@
           <a:noFill/>
           <a:ln w="57150" cap="rnd">
             <a:solidFill>
-              <a:schemeClr val="tx1"/>
+              <a:srgbClr val="000000"/>
             </a:solidFill>
             <a:round/>
           </a:ln>
@@ -9494,243 +9494,134 @@
           </a:p>
         </p:txBody>
       </p:sp>
+      <p:sp>
+        <p:nvSpPr>
+          <p:cNvPr id="18" name="Rechteck: abgerundete Ecken 17">
+            <a:extLst>
+              <a:ext uri="{FF2B5EF4-FFF2-40B4-BE49-F238E27FC236}">
+                <a16:creationId xmlns:a16="http://schemas.microsoft.com/office/drawing/2014/main" id="{EC22BA8F-9FE2-4511-A6C7-6B4D833C737F}"/>
+              </a:ext>
+            </a:extLst>
+          </p:cNvPr>
+          <p:cNvSpPr/>
+          <p:nvPr/>
+        </p:nvSpPr>
+        <p:spPr>
+          <a:xfrm rot="21113087">
+            <a:off x="4233616" y="1979945"/>
+            <a:ext cx="5046210" cy="3140403"/>
+          </a:xfrm>
+          <a:prstGeom prst="roundRect">
+            <a:avLst>
+              <a:gd name="adj" fmla="val 11051"/>
+            </a:avLst>
+          </a:prstGeom>
+          <a:solidFill>
+            <a:srgbClr val="FDFDFE"/>
+          </a:solidFill>
+          <a:ln w="76200" cap="rnd" cmpd="sng">
+            <a:solidFill>
+              <a:srgbClr val="000000"/>
+            </a:solidFill>
+            <a:round/>
+          </a:ln>
+        </p:spPr>
+        <p:style>
+          <a:lnRef idx="2">
+            <a:schemeClr val="accent1">
+              <a:shade val="50000"/>
+            </a:schemeClr>
+          </a:lnRef>
+          <a:fillRef idx="1">
+            <a:schemeClr val="accent1"/>
+          </a:fillRef>
+          <a:effectRef idx="0">
+            <a:schemeClr val="accent1"/>
+          </a:effectRef>
+          <a:fontRef idx="minor">
+            <a:schemeClr val="lt1"/>
+          </a:fontRef>
+        </p:style>
+        <p:txBody>
+          <a:bodyPr rtlCol="0" anchor="ctr"/>
+          <a:lstStyle/>
+          <a:p>
+            <a:pPr algn="ctr"/>
+            <a:endParaRPr lang="de-DE" dirty="0"/>
+          </a:p>
+        </p:txBody>
+      </p:sp>
+      <p:cxnSp>
+        <p:nvCxnSpPr>
+          <p:cNvPr id="25" name="Gerader Verbinder 24">
+            <a:extLst>
+              <a:ext uri="{FF2B5EF4-FFF2-40B4-BE49-F238E27FC236}">
+                <a16:creationId xmlns:a16="http://schemas.microsoft.com/office/drawing/2014/main" id="{5AE27AFE-130A-4A22-AA06-D25ECAD76EDE}"/>
+              </a:ext>
+            </a:extLst>
+          </p:cNvPr>
+          <p:cNvCxnSpPr>
+            <a:cxnSpLocks/>
+          </p:cNvCxnSpPr>
+          <p:nvPr/>
+        </p:nvCxnSpPr>
+        <p:spPr>
+          <a:xfrm>
+            <a:off x="5055783" y="2170711"/>
+            <a:ext cx="466437" cy="3148870"/>
+          </a:xfrm>
+          <a:prstGeom prst="line">
+            <a:avLst/>
+          </a:prstGeom>
+          <a:ln w="38100">
+            <a:solidFill>
+              <a:srgbClr val="000000"/>
+            </a:solidFill>
+          </a:ln>
+        </p:spPr>
+        <p:style>
+          <a:lnRef idx="1">
+            <a:schemeClr val="accent1"/>
+          </a:lnRef>
+          <a:fillRef idx="0">
+            <a:schemeClr val="accent1"/>
+          </a:fillRef>
+          <a:effectRef idx="0">
+            <a:schemeClr val="accent1"/>
+          </a:effectRef>
+          <a:fontRef idx="minor">
+            <a:schemeClr val="tx1"/>
+          </a:fontRef>
+        </p:style>
+      </p:cxnSp>
       <p:grpSp>
         <p:nvGrpSpPr>
-          <p:cNvPr id="3" name="Gruppieren 2">
-            <a:extLst>
-              <a:ext uri="{FF2B5EF4-FFF2-40B4-BE49-F238E27FC236}">
-                <a16:creationId xmlns:a16="http://schemas.microsoft.com/office/drawing/2014/main" id="{3BFEF264-F0EC-4A58-9966-3FEDE3EBC821}"/>
-              </a:ext>
-            </a:extLst>
-          </p:cNvPr>
-          <p:cNvGrpSpPr/>
+          <p:cNvPr id="54" name="Gruppieren 53">
+            <a:extLst>
+              <a:ext uri="{FF2B5EF4-FFF2-40B4-BE49-F238E27FC236}">
+                <a16:creationId xmlns:a16="http://schemas.microsoft.com/office/drawing/2014/main" id="{E99881FA-F41E-4DBD-BC28-086F0A7FE110}"/>
+              </a:ext>
+            </a:extLst>
+          </p:cNvPr>
+          <p:cNvGrpSpPr>
+            <a:grpSpLocks noChangeAspect="1"/>
+          </p:cNvGrpSpPr>
           <p:nvPr/>
         </p:nvGrpSpPr>
         <p:grpSpPr>
-          <a:xfrm>
-            <a:off x="4162538" y="1754812"/>
-            <a:ext cx="5208401" cy="3565012"/>
-            <a:chOff x="4162538" y="1754812"/>
-            <a:chExt cx="5208401" cy="3565012"/>
+          <a:xfrm rot="21072129">
+            <a:off x="4687628" y="4601408"/>
+            <a:ext cx="539071" cy="557484"/>
+            <a:chOff x="2444024" y="1798320"/>
+            <a:chExt cx="626836" cy="648248"/>
           </a:xfrm>
         </p:grpSpPr>
-        <p:sp>
-          <p:nvSpPr>
-            <p:cNvPr id="18" name="Rechteck: abgerundete Ecken 17">
+        <p:cxnSp>
+          <p:nvCxnSpPr>
+            <p:cNvPr id="7" name="Gerader Verbinder 6">
               <a:extLst>
                 <a:ext uri="{FF2B5EF4-FFF2-40B4-BE49-F238E27FC236}">
-                  <a16:creationId xmlns:a16="http://schemas.microsoft.com/office/drawing/2014/main" id="{EC22BA8F-9FE2-4511-A6C7-6B4D833C737F}"/>
-                </a:ext>
-              </a:extLst>
-            </p:cNvPr>
-            <p:cNvSpPr/>
-            <p:nvPr/>
-          </p:nvSpPr>
-          <p:spPr>
-            <a:xfrm rot="21113087">
-              <a:off x="4233616" y="1979945"/>
-              <a:ext cx="5046210" cy="3140403"/>
-            </a:xfrm>
-            <a:prstGeom prst="roundRect">
-              <a:avLst>
-                <a:gd name="adj" fmla="val 11051"/>
-              </a:avLst>
-            </a:prstGeom>
-            <a:solidFill>
-              <a:srgbClr val="ECE9FC"/>
-            </a:solidFill>
-            <a:ln w="76200" cap="rnd" cmpd="sng">
-              <a:solidFill>
-                <a:srgbClr val="D1DDF7"/>
-              </a:solidFill>
-              <a:round/>
-            </a:ln>
-          </p:spPr>
-          <p:style>
-            <a:lnRef idx="2">
-              <a:schemeClr val="accent1">
-                <a:shade val="50000"/>
-              </a:schemeClr>
-            </a:lnRef>
-            <a:fillRef idx="1">
-              <a:schemeClr val="accent1"/>
-            </a:fillRef>
-            <a:effectRef idx="0">
-              <a:schemeClr val="accent1"/>
-            </a:effectRef>
-            <a:fontRef idx="minor">
-              <a:schemeClr val="lt1"/>
-            </a:fontRef>
-          </p:style>
-          <p:txBody>
-            <a:bodyPr rtlCol="0" anchor="ctr"/>
-            <a:lstStyle/>
-            <a:p>
-              <a:pPr algn="ctr"/>
-              <a:endParaRPr lang="de-DE" dirty="0"/>
-            </a:p>
-          </p:txBody>
-        </p:sp>
-        <p:cxnSp>
-          <p:nvCxnSpPr>
-            <p:cNvPr id="25" name="Gerader Verbinder 24">
-              <a:extLst>
-                <a:ext uri="{FF2B5EF4-FFF2-40B4-BE49-F238E27FC236}">
-                  <a16:creationId xmlns:a16="http://schemas.microsoft.com/office/drawing/2014/main" id="{5AE27AFE-130A-4A22-AA06-D25ECAD76EDE}"/>
-                </a:ext>
-              </a:extLst>
-            </p:cNvPr>
-            <p:cNvCxnSpPr>
-              <a:cxnSpLocks/>
-            </p:cNvCxnSpPr>
-            <p:nvPr/>
-          </p:nvCxnSpPr>
-          <p:spPr>
-            <a:xfrm>
-              <a:off x="5055783" y="2170954"/>
-              <a:ext cx="466437" cy="3148870"/>
-            </a:xfrm>
-            <a:prstGeom prst="line">
-              <a:avLst/>
-            </a:prstGeom>
-            <a:ln w="76200">
-              <a:solidFill>
-                <a:srgbClr val="D1DDF7"/>
-              </a:solidFill>
-            </a:ln>
-          </p:spPr>
-          <p:style>
-            <a:lnRef idx="1">
-              <a:schemeClr val="accent1"/>
-            </a:lnRef>
-            <a:fillRef idx="0">
-              <a:schemeClr val="accent1"/>
-            </a:fillRef>
-            <a:effectRef idx="0">
-              <a:schemeClr val="accent1"/>
-            </a:effectRef>
-            <a:fontRef idx="minor">
-              <a:schemeClr val="tx1"/>
-            </a:fontRef>
-          </p:style>
-        </p:cxnSp>
-        <p:grpSp>
-          <p:nvGrpSpPr>
-            <p:cNvPr id="54" name="Gruppieren 53">
-              <a:extLst>
-                <a:ext uri="{FF2B5EF4-FFF2-40B4-BE49-F238E27FC236}">
-                  <a16:creationId xmlns:a16="http://schemas.microsoft.com/office/drawing/2014/main" id="{E99881FA-F41E-4DBD-BC28-086F0A7FE110}"/>
-                </a:ext>
-              </a:extLst>
-            </p:cNvPr>
-            <p:cNvGrpSpPr>
-              <a:grpSpLocks noChangeAspect="1"/>
-            </p:cNvGrpSpPr>
-            <p:nvPr/>
-          </p:nvGrpSpPr>
-          <p:grpSpPr>
-            <a:xfrm rot="21072129">
-              <a:off x="4687628" y="4597984"/>
-              <a:ext cx="539071" cy="557484"/>
-              <a:chOff x="2444024" y="1798320"/>
-              <a:chExt cx="626836" cy="648248"/>
-            </a:xfrm>
-          </p:grpSpPr>
-          <p:cxnSp>
-            <p:nvCxnSpPr>
-              <p:cNvPr id="7" name="Gerader Verbinder 6">
-                <a:extLst>
-                  <a:ext uri="{FF2B5EF4-FFF2-40B4-BE49-F238E27FC236}">
-                    <a16:creationId xmlns:a16="http://schemas.microsoft.com/office/drawing/2014/main" id="{11987D9C-6DD1-498E-974A-9382884C9751}"/>
-                  </a:ext>
-                </a:extLst>
-              </p:cNvPr>
-              <p:cNvCxnSpPr>
-                <a:cxnSpLocks/>
-              </p:cNvCxnSpPr>
-              <p:nvPr/>
-            </p:nvCxnSpPr>
-            <p:spPr>
-              <a:xfrm flipV="1">
-                <a:off x="2444024" y="1798320"/>
-                <a:ext cx="626836" cy="648248"/>
-              </a:xfrm>
-              <a:prstGeom prst="line">
-                <a:avLst/>
-              </a:prstGeom>
-              <a:ln w="101600" cap="rnd">
-                <a:solidFill>
-                  <a:srgbClr val="CC3300"/>
-                </a:solidFill>
-                <a:bevel/>
-              </a:ln>
-            </p:spPr>
-            <p:style>
-              <a:lnRef idx="1">
-                <a:schemeClr val="dk1"/>
-              </a:lnRef>
-              <a:fillRef idx="0">
-                <a:schemeClr val="dk1"/>
-              </a:fillRef>
-              <a:effectRef idx="0">
-                <a:schemeClr val="dk1"/>
-              </a:effectRef>
-              <a:fontRef idx="minor">
-                <a:schemeClr val="tx1"/>
-              </a:fontRef>
-            </p:style>
-          </p:cxnSp>
-          <p:cxnSp>
-            <p:nvCxnSpPr>
-              <p:cNvPr id="53" name="Gerader Verbinder 52">
-                <a:extLst>
-                  <a:ext uri="{FF2B5EF4-FFF2-40B4-BE49-F238E27FC236}">
-                    <a16:creationId xmlns:a16="http://schemas.microsoft.com/office/drawing/2014/main" id="{25933FA0-36CD-48E1-A6EC-4EE36F87A8C3}"/>
-                  </a:ext>
-                </a:extLst>
-              </p:cNvPr>
-              <p:cNvCxnSpPr>
-                <a:cxnSpLocks/>
-              </p:cNvCxnSpPr>
-              <p:nvPr/>
-            </p:nvCxnSpPr>
-            <p:spPr>
-              <a:xfrm flipH="1" flipV="1">
-                <a:off x="2444024" y="1798320"/>
-                <a:ext cx="626836" cy="648248"/>
-              </a:xfrm>
-              <a:prstGeom prst="line">
-                <a:avLst/>
-              </a:prstGeom>
-              <a:ln w="101600" cap="rnd">
-                <a:solidFill>
-                  <a:srgbClr val="CC3300"/>
-                </a:solidFill>
-                <a:bevel/>
-              </a:ln>
-            </p:spPr>
-            <p:style>
-              <a:lnRef idx="1">
-                <a:schemeClr val="dk1"/>
-              </a:lnRef>
-              <a:fillRef idx="0">
-                <a:schemeClr val="dk1"/>
-              </a:fillRef>
-              <a:effectRef idx="0">
-                <a:schemeClr val="dk1"/>
-              </a:effectRef>
-              <a:fontRef idx="minor">
-                <a:schemeClr val="tx1"/>
-              </a:fontRef>
-            </p:style>
-          </p:cxnSp>
-        </p:grpSp>
-        <p:cxnSp>
-          <p:nvCxnSpPr>
-            <p:cNvPr id="33" name="Gerader Verbinder 32">
-              <a:extLst>
-                <a:ext uri="{FF2B5EF4-FFF2-40B4-BE49-F238E27FC236}">
-                  <a16:creationId xmlns:a16="http://schemas.microsoft.com/office/drawing/2014/main" id="{F78569C6-F8A7-4BE3-8FE8-B8E1BCDD29C3}"/>
+                  <a16:creationId xmlns:a16="http://schemas.microsoft.com/office/drawing/2014/main" id="{11987D9C-6DD1-498E-974A-9382884C9751}"/>
                 </a:ext>
               </a:extLst>
             </p:cNvPr>
@@ -9741,27 +9632,28 @@
           </p:nvCxnSpPr>
           <p:spPr>
             <a:xfrm flipV="1">
-              <a:off x="4162538" y="2696959"/>
-              <a:ext cx="5020199" cy="757711"/>
+              <a:off x="2444024" y="1798320"/>
+              <a:ext cx="626836" cy="648248"/>
             </a:xfrm>
             <a:prstGeom prst="line">
               <a:avLst/>
             </a:prstGeom>
-            <a:ln w="76200">
+            <a:ln w="101600" cap="rnd">
               <a:solidFill>
-                <a:srgbClr val="D1DDF7"/>
+                <a:srgbClr val="F0C267"/>
               </a:solidFill>
+              <a:bevel/>
             </a:ln>
           </p:spPr>
           <p:style>
             <a:lnRef idx="1">
-              <a:schemeClr val="accent1"/>
+              <a:schemeClr val="dk1"/>
             </a:lnRef>
             <a:fillRef idx="0">
-              <a:schemeClr val="accent1"/>
+              <a:schemeClr val="dk1"/>
             </a:fillRef>
             <a:effectRef idx="0">
-              <a:schemeClr val="accent1"/>
+              <a:schemeClr val="dk1"/>
             </a:effectRef>
             <a:fontRef idx="minor">
               <a:schemeClr val="tx1"/>
@@ -9770,10 +9662,292 @@
         </p:cxnSp>
         <p:cxnSp>
           <p:nvCxnSpPr>
-            <p:cNvPr id="41" name="Gerader Verbinder 40">
+            <p:cNvPr id="53" name="Gerader Verbinder 52">
               <a:extLst>
                 <a:ext uri="{FF2B5EF4-FFF2-40B4-BE49-F238E27FC236}">
-                  <a16:creationId xmlns:a16="http://schemas.microsoft.com/office/drawing/2014/main" id="{5A6597DA-AF5D-45D3-93A5-C7D0F7F8BCB7}"/>
+                  <a16:creationId xmlns:a16="http://schemas.microsoft.com/office/drawing/2014/main" id="{25933FA0-36CD-48E1-A6EC-4EE36F87A8C3}"/>
+                </a:ext>
+              </a:extLst>
+            </p:cNvPr>
+            <p:cNvCxnSpPr>
+              <a:cxnSpLocks/>
+            </p:cNvCxnSpPr>
+            <p:nvPr/>
+          </p:nvCxnSpPr>
+          <p:spPr>
+            <a:xfrm flipH="1" flipV="1">
+              <a:off x="2444024" y="1798320"/>
+              <a:ext cx="626836" cy="648248"/>
+            </a:xfrm>
+            <a:prstGeom prst="line">
+              <a:avLst/>
+            </a:prstGeom>
+            <a:ln w="101600" cap="rnd">
+              <a:solidFill>
+                <a:srgbClr val="F0C267"/>
+              </a:solidFill>
+              <a:bevel/>
+            </a:ln>
+          </p:spPr>
+          <p:style>
+            <a:lnRef idx="1">
+              <a:schemeClr val="dk1"/>
+            </a:lnRef>
+            <a:fillRef idx="0">
+              <a:schemeClr val="dk1"/>
+            </a:fillRef>
+            <a:effectRef idx="0">
+              <a:schemeClr val="dk1"/>
+            </a:effectRef>
+            <a:fontRef idx="minor">
+              <a:schemeClr val="tx1"/>
+            </a:fontRef>
+          </p:style>
+        </p:cxnSp>
+      </p:grpSp>
+      <p:cxnSp>
+        <p:nvCxnSpPr>
+          <p:cNvPr id="33" name="Gerader Verbinder 32">
+            <a:extLst>
+              <a:ext uri="{FF2B5EF4-FFF2-40B4-BE49-F238E27FC236}">
+                <a16:creationId xmlns:a16="http://schemas.microsoft.com/office/drawing/2014/main" id="{F78569C6-F8A7-4BE3-8FE8-B8E1BCDD29C3}"/>
+              </a:ext>
+            </a:extLst>
+          </p:cNvPr>
+          <p:cNvCxnSpPr>
+            <a:cxnSpLocks/>
+          </p:cNvCxnSpPr>
+          <p:nvPr/>
+        </p:nvCxnSpPr>
+        <p:spPr>
+          <a:xfrm flipV="1">
+            <a:off x="4162538" y="2696716"/>
+            <a:ext cx="5020199" cy="757711"/>
+          </a:xfrm>
+          <a:prstGeom prst="line">
+            <a:avLst/>
+          </a:prstGeom>
+          <a:ln w="38100">
+            <a:solidFill>
+              <a:srgbClr val="000000"/>
+            </a:solidFill>
+          </a:ln>
+        </p:spPr>
+        <p:style>
+          <a:lnRef idx="1">
+            <a:schemeClr val="accent1"/>
+          </a:lnRef>
+          <a:fillRef idx="0">
+            <a:schemeClr val="accent1"/>
+          </a:fillRef>
+          <a:effectRef idx="0">
+            <a:schemeClr val="accent1"/>
+          </a:effectRef>
+          <a:fontRef idx="minor">
+            <a:schemeClr val="tx1"/>
+          </a:fontRef>
+        </p:style>
+      </p:cxnSp>
+      <p:cxnSp>
+        <p:nvCxnSpPr>
+          <p:cNvPr id="41" name="Gerader Verbinder 40">
+            <a:extLst>
+              <a:ext uri="{FF2B5EF4-FFF2-40B4-BE49-F238E27FC236}">
+                <a16:creationId xmlns:a16="http://schemas.microsoft.com/office/drawing/2014/main" id="{5A6597DA-AF5D-45D3-93A5-C7D0F7F8BCB7}"/>
+              </a:ext>
+            </a:extLst>
+          </p:cNvPr>
+          <p:cNvCxnSpPr>
+            <a:cxnSpLocks/>
+          </p:cNvCxnSpPr>
+          <p:nvPr/>
+        </p:nvCxnSpPr>
+        <p:spPr>
+          <a:xfrm flipV="1">
+            <a:off x="4375261" y="3745146"/>
+            <a:ext cx="4995678" cy="712344"/>
+          </a:xfrm>
+          <a:prstGeom prst="line">
+            <a:avLst/>
+          </a:prstGeom>
+          <a:ln w="38100">
+            <a:solidFill>
+              <a:srgbClr val="000000"/>
+            </a:solidFill>
+          </a:ln>
+        </p:spPr>
+        <p:style>
+          <a:lnRef idx="1">
+            <a:schemeClr val="accent1"/>
+          </a:lnRef>
+          <a:fillRef idx="0">
+            <a:schemeClr val="accent1"/>
+          </a:fillRef>
+          <a:effectRef idx="0">
+            <a:schemeClr val="accent1"/>
+          </a:effectRef>
+          <a:fontRef idx="minor">
+            <a:schemeClr val="tx1"/>
+          </a:fontRef>
+        </p:style>
+      </p:cxnSp>
+      <p:cxnSp>
+        <p:nvCxnSpPr>
+          <p:cNvPr id="42" name="Gerader Verbinder 41">
+            <a:extLst>
+              <a:ext uri="{FF2B5EF4-FFF2-40B4-BE49-F238E27FC236}">
+                <a16:creationId xmlns:a16="http://schemas.microsoft.com/office/drawing/2014/main" id="{1E0B3D83-8502-4FAC-9133-31DB48E7A8A7}"/>
+              </a:ext>
+            </a:extLst>
+          </p:cNvPr>
+          <p:cNvCxnSpPr>
+            <a:cxnSpLocks/>
+          </p:cNvCxnSpPr>
+          <p:nvPr/>
+        </p:nvCxnSpPr>
+        <p:spPr>
+          <a:xfrm>
+            <a:off x="6096000" y="2018528"/>
+            <a:ext cx="443312" cy="3108955"/>
+          </a:xfrm>
+          <a:prstGeom prst="line">
+            <a:avLst/>
+          </a:prstGeom>
+          <a:ln w="38100">
+            <a:solidFill>
+              <a:srgbClr val="000000"/>
+            </a:solidFill>
+          </a:ln>
+        </p:spPr>
+        <p:style>
+          <a:lnRef idx="1">
+            <a:schemeClr val="accent1"/>
+          </a:lnRef>
+          <a:fillRef idx="0">
+            <a:schemeClr val="accent1"/>
+          </a:fillRef>
+          <a:effectRef idx="0">
+            <a:schemeClr val="accent1"/>
+          </a:effectRef>
+          <a:fontRef idx="minor">
+            <a:schemeClr val="tx1"/>
+          </a:fontRef>
+        </p:style>
+      </p:cxnSp>
+      <p:cxnSp>
+        <p:nvCxnSpPr>
+          <p:cNvPr id="45" name="Gerader Verbinder 44">
+            <a:extLst>
+              <a:ext uri="{FF2B5EF4-FFF2-40B4-BE49-F238E27FC236}">
+                <a16:creationId xmlns:a16="http://schemas.microsoft.com/office/drawing/2014/main" id="{52947AB7-CF4F-4BDA-A498-888B3327B1CD}"/>
+              </a:ext>
+            </a:extLst>
+          </p:cNvPr>
+          <p:cNvCxnSpPr>
+            <a:cxnSpLocks/>
+          </p:cNvCxnSpPr>
+          <p:nvPr/>
+        </p:nvCxnSpPr>
+        <p:spPr>
+          <a:xfrm>
+            <a:off x="8153309" y="1754812"/>
+            <a:ext cx="466437" cy="3148870"/>
+          </a:xfrm>
+          <a:prstGeom prst="line">
+            <a:avLst/>
+          </a:prstGeom>
+          <a:ln w="38100">
+            <a:solidFill>
+              <a:srgbClr val="000000"/>
+            </a:solidFill>
+          </a:ln>
+        </p:spPr>
+        <p:style>
+          <a:lnRef idx="1">
+            <a:schemeClr val="accent1"/>
+          </a:lnRef>
+          <a:fillRef idx="0">
+            <a:schemeClr val="accent1"/>
+          </a:fillRef>
+          <a:effectRef idx="0">
+            <a:schemeClr val="accent1"/>
+          </a:effectRef>
+          <a:fontRef idx="minor">
+            <a:schemeClr val="tx1"/>
+          </a:fontRef>
+        </p:style>
+      </p:cxnSp>
+      <p:cxnSp>
+        <p:nvCxnSpPr>
+          <p:cNvPr id="46" name="Gerader Verbinder 45">
+            <a:extLst>
+              <a:ext uri="{FF2B5EF4-FFF2-40B4-BE49-F238E27FC236}">
+                <a16:creationId xmlns:a16="http://schemas.microsoft.com/office/drawing/2014/main" id="{E7B3AAC5-BC07-4864-A1D4-9B37D24A5D3B}"/>
+              </a:ext>
+            </a:extLst>
+          </p:cNvPr>
+          <p:cNvCxnSpPr>
+            <a:cxnSpLocks/>
+          </p:cNvCxnSpPr>
+          <p:nvPr/>
+        </p:nvCxnSpPr>
+        <p:spPr>
+          <a:xfrm>
+            <a:off x="7113092" y="1907697"/>
+            <a:ext cx="466437" cy="3148870"/>
+          </a:xfrm>
+          <a:prstGeom prst="line">
+            <a:avLst/>
+          </a:prstGeom>
+          <a:ln w="38100">
+            <a:solidFill>
+              <a:srgbClr val="000000"/>
+            </a:solidFill>
+          </a:ln>
+        </p:spPr>
+        <p:style>
+          <a:lnRef idx="1">
+            <a:schemeClr val="accent1"/>
+          </a:lnRef>
+          <a:fillRef idx="0">
+            <a:schemeClr val="accent1"/>
+          </a:fillRef>
+          <a:effectRef idx="0">
+            <a:schemeClr val="accent1"/>
+          </a:effectRef>
+          <a:fontRef idx="minor">
+            <a:schemeClr val="tx1"/>
+          </a:fontRef>
+        </p:style>
+      </p:cxnSp>
+      <p:grpSp>
+        <p:nvGrpSpPr>
+          <p:cNvPr id="64" name="Gruppieren 63">
+            <a:extLst>
+              <a:ext uri="{FF2B5EF4-FFF2-40B4-BE49-F238E27FC236}">
+                <a16:creationId xmlns:a16="http://schemas.microsoft.com/office/drawing/2014/main" id="{92981324-0674-484F-9968-88C4A07BD7BB}"/>
+              </a:ext>
+            </a:extLst>
+          </p:cNvPr>
+          <p:cNvGrpSpPr>
+            <a:grpSpLocks noChangeAspect="1"/>
+          </p:cNvGrpSpPr>
+          <p:nvPr/>
+        </p:nvGrpSpPr>
+        <p:grpSpPr>
+          <a:xfrm rot="21072129">
+            <a:off x="5391698" y="2392584"/>
+            <a:ext cx="539072" cy="557484"/>
+            <a:chOff x="2444024" y="1798320"/>
+            <a:chExt cx="626837" cy="648248"/>
+          </a:xfrm>
+        </p:grpSpPr>
+        <p:cxnSp>
+          <p:nvCxnSpPr>
+            <p:cNvPr id="65" name="Gerader Verbinder 64">
+              <a:extLst>
+                <a:ext uri="{FF2B5EF4-FFF2-40B4-BE49-F238E27FC236}">
+                  <a16:creationId xmlns:a16="http://schemas.microsoft.com/office/drawing/2014/main" id="{7A4AEBA9-7BD9-431A-B83A-7A67A861F752}"/>
                 </a:ext>
               </a:extLst>
             </p:cNvPr>
@@ -9784,27 +9958,28 @@
           </p:nvCxnSpPr>
           <p:spPr>
             <a:xfrm flipV="1">
-              <a:off x="4375261" y="3745389"/>
-              <a:ext cx="4995678" cy="712344"/>
+              <a:off x="2444024" y="1798320"/>
+              <a:ext cx="626836" cy="648248"/>
             </a:xfrm>
             <a:prstGeom prst="line">
               <a:avLst/>
             </a:prstGeom>
-            <a:ln w="76200">
+            <a:ln w="101600" cap="rnd">
               <a:solidFill>
-                <a:srgbClr val="D1DDF7"/>
+                <a:srgbClr val="F0C267"/>
               </a:solidFill>
+              <a:bevel/>
             </a:ln>
           </p:spPr>
           <p:style>
             <a:lnRef idx="1">
-              <a:schemeClr val="accent1"/>
+              <a:schemeClr val="dk1"/>
             </a:lnRef>
             <a:fillRef idx="0">
-              <a:schemeClr val="accent1"/>
+              <a:schemeClr val="dk1"/>
             </a:fillRef>
             <a:effectRef idx="0">
-              <a:schemeClr val="accent1"/>
+              <a:schemeClr val="dk1"/>
             </a:effectRef>
             <a:fontRef idx="minor">
               <a:schemeClr val="tx1"/>
@@ -9813,10 +9988,10 @@
         </p:cxnSp>
         <p:cxnSp>
           <p:nvCxnSpPr>
-            <p:cNvPr id="42" name="Gerader Verbinder 41">
+            <p:cNvPr id="66" name="Gerader Verbinder 65">
               <a:extLst>
                 <a:ext uri="{FF2B5EF4-FFF2-40B4-BE49-F238E27FC236}">
-                  <a16:creationId xmlns:a16="http://schemas.microsoft.com/office/drawing/2014/main" id="{1E0B3D83-8502-4FAC-9133-31DB48E7A8A7}"/>
+                  <a16:creationId xmlns:a16="http://schemas.microsoft.com/office/drawing/2014/main" id="{BF0A17A6-4D65-40AA-9B8E-E97E90DDD836}"/>
                 </a:ext>
               </a:extLst>
             </p:cNvPr>
@@ -9826,40 +10001,64 @@
             <p:nvPr/>
           </p:nvCxnSpPr>
           <p:spPr>
-            <a:xfrm>
-              <a:off x="6096000" y="1995668"/>
-              <a:ext cx="443312" cy="3108955"/>
+            <a:xfrm flipH="1" flipV="1">
+              <a:off x="2444025" y="1798320"/>
+              <a:ext cx="626836" cy="648248"/>
             </a:xfrm>
             <a:prstGeom prst="line">
               <a:avLst/>
             </a:prstGeom>
-            <a:ln w="76200">
+            <a:ln w="101600" cap="rnd">
               <a:solidFill>
-                <a:srgbClr val="D1DDF7"/>
+                <a:srgbClr val="F0C267"/>
               </a:solidFill>
+              <a:bevel/>
             </a:ln>
           </p:spPr>
           <p:style>
             <a:lnRef idx="1">
-              <a:schemeClr val="accent1"/>
+              <a:schemeClr val="dk1"/>
             </a:lnRef>
             <a:fillRef idx="0">
-              <a:schemeClr val="accent1"/>
+              <a:schemeClr val="dk1"/>
             </a:fillRef>
             <a:effectRef idx="0">
-              <a:schemeClr val="accent1"/>
+              <a:schemeClr val="dk1"/>
             </a:effectRef>
             <a:fontRef idx="minor">
               <a:schemeClr val="tx1"/>
             </a:fontRef>
           </p:style>
         </p:cxnSp>
+      </p:grpSp>
+      <p:grpSp>
+        <p:nvGrpSpPr>
+          <p:cNvPr id="67" name="Gruppieren 66">
+            <a:extLst>
+              <a:ext uri="{FF2B5EF4-FFF2-40B4-BE49-F238E27FC236}">
+                <a16:creationId xmlns:a16="http://schemas.microsoft.com/office/drawing/2014/main" id="{0B094D02-8A79-446E-A40E-60B95B957DBB}"/>
+              </a:ext>
+            </a:extLst>
+          </p:cNvPr>
+          <p:cNvGrpSpPr>
+            <a:grpSpLocks noChangeAspect="1"/>
+          </p:cNvGrpSpPr>
+          <p:nvPr/>
+        </p:nvGrpSpPr>
+        <p:grpSpPr>
+          <a:xfrm rot="21072129">
+            <a:off x="7601109" y="3150557"/>
+            <a:ext cx="539071" cy="557484"/>
+            <a:chOff x="2444024" y="1798320"/>
+            <a:chExt cx="626836" cy="648248"/>
+          </a:xfrm>
+        </p:grpSpPr>
         <p:cxnSp>
           <p:nvCxnSpPr>
-            <p:cNvPr id="45" name="Gerader Verbinder 44">
+            <p:cNvPr id="68" name="Gerader Verbinder 67">
               <a:extLst>
                 <a:ext uri="{FF2B5EF4-FFF2-40B4-BE49-F238E27FC236}">
-                  <a16:creationId xmlns:a16="http://schemas.microsoft.com/office/drawing/2014/main" id="{52947AB7-CF4F-4BDA-A498-888B3327B1CD}"/>
+                  <a16:creationId xmlns:a16="http://schemas.microsoft.com/office/drawing/2014/main" id="{69C3865A-7C74-49EA-B328-6EA3F3FD5DE1}"/>
                 </a:ext>
               </a:extLst>
             </p:cNvPr>
@@ -9869,28 +10068,29 @@
             <p:nvPr/>
           </p:nvCxnSpPr>
           <p:spPr>
-            <a:xfrm>
-              <a:off x="8153309" y="1754812"/>
-              <a:ext cx="466437" cy="3148870"/>
+            <a:xfrm flipV="1">
+              <a:off x="2444024" y="1798320"/>
+              <a:ext cx="626836" cy="648248"/>
             </a:xfrm>
             <a:prstGeom prst="line">
               <a:avLst/>
             </a:prstGeom>
-            <a:ln w="76200">
+            <a:ln w="101600" cap="rnd">
               <a:solidFill>
-                <a:srgbClr val="D1DDF7"/>
+                <a:srgbClr val="F0C267"/>
               </a:solidFill>
+              <a:bevel/>
             </a:ln>
           </p:spPr>
           <p:style>
             <a:lnRef idx="1">
-              <a:schemeClr val="accent1"/>
+              <a:schemeClr val="dk1"/>
             </a:lnRef>
             <a:fillRef idx="0">
-              <a:schemeClr val="accent1"/>
+              <a:schemeClr val="dk1"/>
             </a:fillRef>
             <a:effectRef idx="0">
-              <a:schemeClr val="accent1"/>
+              <a:schemeClr val="dk1"/>
             </a:effectRef>
             <a:fontRef idx="minor">
               <a:schemeClr val="tx1"/>
@@ -9899,10 +10099,10 @@
         </p:cxnSp>
         <p:cxnSp>
           <p:nvCxnSpPr>
-            <p:cNvPr id="46" name="Gerader Verbinder 45">
+            <p:cNvPr id="69" name="Gerader Verbinder 68">
               <a:extLst>
                 <a:ext uri="{FF2B5EF4-FFF2-40B4-BE49-F238E27FC236}">
-                  <a16:creationId xmlns:a16="http://schemas.microsoft.com/office/drawing/2014/main" id="{E7B3AAC5-BC07-4864-A1D4-9B37D24A5D3B}"/>
+                  <a16:creationId xmlns:a16="http://schemas.microsoft.com/office/drawing/2014/main" id="{300BE4E0-89C4-47E9-8E93-0AE23F5380F7}"/>
                 </a:ext>
               </a:extLst>
             </p:cNvPr>
@@ -9912,367 +10112,146 @@
             <p:nvPr/>
           </p:nvCxnSpPr>
           <p:spPr>
-            <a:xfrm>
-              <a:off x="7113092" y="1930557"/>
-              <a:ext cx="466437" cy="3148870"/>
+            <a:xfrm flipH="1" flipV="1">
+              <a:off x="2444024" y="1798320"/>
+              <a:ext cx="626836" cy="648248"/>
             </a:xfrm>
             <a:prstGeom prst="line">
               <a:avLst/>
             </a:prstGeom>
-            <a:ln w="76200">
+            <a:ln w="101600" cap="rnd">
               <a:solidFill>
-                <a:srgbClr val="D1DDF7"/>
+                <a:srgbClr val="F0C267"/>
               </a:solidFill>
+              <a:bevel/>
             </a:ln>
           </p:spPr>
           <p:style>
             <a:lnRef idx="1">
-              <a:schemeClr val="accent1"/>
+              <a:schemeClr val="dk1"/>
             </a:lnRef>
             <a:fillRef idx="0">
-              <a:schemeClr val="accent1"/>
+              <a:schemeClr val="dk1"/>
             </a:fillRef>
             <a:effectRef idx="0">
-              <a:schemeClr val="accent1"/>
+              <a:schemeClr val="dk1"/>
             </a:effectRef>
             <a:fontRef idx="minor">
               <a:schemeClr val="tx1"/>
             </a:fontRef>
           </p:style>
         </p:cxnSp>
-        <p:grpSp>
-          <p:nvGrpSpPr>
-            <p:cNvPr id="64" name="Gruppieren 63">
+      </p:grpSp>
+      <p:grpSp>
+        <p:nvGrpSpPr>
+          <p:cNvPr id="70" name="Gruppieren 69">
+            <a:extLst>
+              <a:ext uri="{FF2B5EF4-FFF2-40B4-BE49-F238E27FC236}">
+                <a16:creationId xmlns:a16="http://schemas.microsoft.com/office/drawing/2014/main" id="{B46F0684-EBBA-4097-9406-FDD837DFA5C9}"/>
+              </a:ext>
+            </a:extLst>
+          </p:cNvPr>
+          <p:cNvGrpSpPr>
+            <a:grpSpLocks noChangeAspect="1"/>
+          </p:cNvGrpSpPr>
+          <p:nvPr/>
+        </p:nvGrpSpPr>
+        <p:grpSpPr>
+          <a:xfrm rot="21072129">
+            <a:off x="6718305" y="4312671"/>
+            <a:ext cx="539071" cy="557484"/>
+            <a:chOff x="2444024" y="1798320"/>
+            <a:chExt cx="626836" cy="648248"/>
+          </a:xfrm>
+        </p:grpSpPr>
+        <p:cxnSp>
+          <p:nvCxnSpPr>
+            <p:cNvPr id="71" name="Gerader Verbinder 70">
               <a:extLst>
                 <a:ext uri="{FF2B5EF4-FFF2-40B4-BE49-F238E27FC236}">
-                  <a16:creationId xmlns:a16="http://schemas.microsoft.com/office/drawing/2014/main" id="{92981324-0674-484F-9968-88C4A07BD7BB}"/>
+                  <a16:creationId xmlns:a16="http://schemas.microsoft.com/office/drawing/2014/main" id="{513DCAB0-05DA-47FD-AC36-82ABA51A77E6}"/>
                 </a:ext>
               </a:extLst>
             </p:cNvPr>
-            <p:cNvGrpSpPr>
-              <a:grpSpLocks noChangeAspect="1"/>
-            </p:cNvGrpSpPr>
+            <p:cNvCxnSpPr>
+              <a:cxnSpLocks/>
+            </p:cNvCxnSpPr>
             <p:nvPr/>
-          </p:nvGrpSpPr>
-          <p:grpSpPr>
-            <a:xfrm rot="21072129">
-              <a:off x="5391697" y="2389160"/>
-              <a:ext cx="539071" cy="557484"/>
-              <a:chOff x="2444024" y="1798320"/>
-              <a:chExt cx="626836" cy="648248"/>
+          </p:nvCxnSpPr>
+          <p:spPr>
+            <a:xfrm flipV="1">
+              <a:off x="2444024" y="1798320"/>
+              <a:ext cx="626836" cy="648248"/>
             </a:xfrm>
-          </p:grpSpPr>
-          <p:cxnSp>
-            <p:nvCxnSpPr>
-              <p:cNvPr id="65" name="Gerader Verbinder 64">
-                <a:extLst>
-                  <a:ext uri="{FF2B5EF4-FFF2-40B4-BE49-F238E27FC236}">
-                    <a16:creationId xmlns:a16="http://schemas.microsoft.com/office/drawing/2014/main" id="{7A4AEBA9-7BD9-431A-B83A-7A67A861F752}"/>
-                  </a:ext>
-                </a:extLst>
-              </p:cNvPr>
-              <p:cNvCxnSpPr>
-                <a:cxnSpLocks/>
-              </p:cNvCxnSpPr>
-              <p:nvPr/>
-            </p:nvCxnSpPr>
-            <p:spPr>
-              <a:xfrm flipV="1">
-                <a:off x="2444024" y="1798320"/>
-                <a:ext cx="626836" cy="648248"/>
-              </a:xfrm>
-              <a:prstGeom prst="line">
-                <a:avLst/>
-              </a:prstGeom>
-              <a:ln w="101600" cap="rnd">
-                <a:solidFill>
-                  <a:srgbClr val="CC3300"/>
-                </a:solidFill>
-                <a:bevel/>
-              </a:ln>
-            </p:spPr>
-            <p:style>
-              <a:lnRef idx="1">
-                <a:schemeClr val="dk1"/>
-              </a:lnRef>
-              <a:fillRef idx="0">
-                <a:schemeClr val="dk1"/>
-              </a:fillRef>
-              <a:effectRef idx="0">
-                <a:schemeClr val="dk1"/>
-              </a:effectRef>
-              <a:fontRef idx="minor">
-                <a:schemeClr val="tx1"/>
-              </a:fontRef>
-            </p:style>
-          </p:cxnSp>
-          <p:cxnSp>
-            <p:nvCxnSpPr>
-              <p:cNvPr id="66" name="Gerader Verbinder 65">
-                <a:extLst>
-                  <a:ext uri="{FF2B5EF4-FFF2-40B4-BE49-F238E27FC236}">
-                    <a16:creationId xmlns:a16="http://schemas.microsoft.com/office/drawing/2014/main" id="{BF0A17A6-4D65-40AA-9B8E-E97E90DDD836}"/>
-                  </a:ext>
-                </a:extLst>
-              </p:cNvPr>
-              <p:cNvCxnSpPr>
-                <a:cxnSpLocks/>
-              </p:cNvCxnSpPr>
-              <p:nvPr/>
-            </p:nvCxnSpPr>
-            <p:spPr>
-              <a:xfrm flipH="1" flipV="1">
-                <a:off x="2444024" y="1798320"/>
-                <a:ext cx="626836" cy="648248"/>
-              </a:xfrm>
-              <a:prstGeom prst="line">
-                <a:avLst/>
-              </a:prstGeom>
-              <a:ln w="101600" cap="rnd">
-                <a:solidFill>
-                  <a:srgbClr val="CC3300"/>
-                </a:solidFill>
-                <a:bevel/>
-              </a:ln>
-            </p:spPr>
-            <p:style>
-              <a:lnRef idx="1">
-                <a:schemeClr val="dk1"/>
-              </a:lnRef>
-              <a:fillRef idx="0">
-                <a:schemeClr val="dk1"/>
-              </a:fillRef>
-              <a:effectRef idx="0">
-                <a:schemeClr val="dk1"/>
-              </a:effectRef>
-              <a:fontRef idx="minor">
-                <a:schemeClr val="tx1"/>
-              </a:fontRef>
-            </p:style>
-          </p:cxnSp>
-        </p:grpSp>
-        <p:grpSp>
-          <p:nvGrpSpPr>
-            <p:cNvPr id="67" name="Gruppieren 66">
+            <a:prstGeom prst="line">
+              <a:avLst/>
+            </a:prstGeom>
+            <a:ln w="101600" cap="rnd">
+              <a:solidFill>
+                <a:srgbClr val="F0C267"/>
+              </a:solidFill>
+              <a:bevel/>
+            </a:ln>
+          </p:spPr>
+          <p:style>
+            <a:lnRef idx="1">
+              <a:schemeClr val="dk1"/>
+            </a:lnRef>
+            <a:fillRef idx="0">
+              <a:schemeClr val="dk1"/>
+            </a:fillRef>
+            <a:effectRef idx="0">
+              <a:schemeClr val="dk1"/>
+            </a:effectRef>
+            <a:fontRef idx="minor">
+              <a:schemeClr val="tx1"/>
+            </a:fontRef>
+          </p:style>
+        </p:cxnSp>
+        <p:cxnSp>
+          <p:nvCxnSpPr>
+            <p:cNvPr id="72" name="Gerader Verbinder 71">
               <a:extLst>
                 <a:ext uri="{FF2B5EF4-FFF2-40B4-BE49-F238E27FC236}">
-                  <a16:creationId xmlns:a16="http://schemas.microsoft.com/office/drawing/2014/main" id="{0B094D02-8A79-446E-A40E-60B95B957DBB}"/>
+                  <a16:creationId xmlns:a16="http://schemas.microsoft.com/office/drawing/2014/main" id="{303E3FE9-83FB-49DC-9323-E0AC8A979E92}"/>
                 </a:ext>
               </a:extLst>
             </p:cNvPr>
-            <p:cNvGrpSpPr>
-              <a:grpSpLocks noChangeAspect="1"/>
-            </p:cNvGrpSpPr>
+            <p:cNvCxnSpPr>
+              <a:cxnSpLocks/>
+            </p:cNvCxnSpPr>
             <p:nvPr/>
-          </p:nvGrpSpPr>
-          <p:grpSpPr>
-            <a:xfrm rot="21072129">
-              <a:off x="7601109" y="3150557"/>
-              <a:ext cx="539071" cy="557484"/>
-              <a:chOff x="2444024" y="1798320"/>
-              <a:chExt cx="626836" cy="648248"/>
+          </p:nvCxnSpPr>
+          <p:spPr>
+            <a:xfrm flipH="1" flipV="1">
+              <a:off x="2444024" y="1798320"/>
+              <a:ext cx="626836" cy="648248"/>
             </a:xfrm>
-          </p:grpSpPr>
-          <p:cxnSp>
-            <p:nvCxnSpPr>
-              <p:cNvPr id="68" name="Gerader Verbinder 67">
-                <a:extLst>
-                  <a:ext uri="{FF2B5EF4-FFF2-40B4-BE49-F238E27FC236}">
-                    <a16:creationId xmlns:a16="http://schemas.microsoft.com/office/drawing/2014/main" id="{69C3865A-7C74-49EA-B328-6EA3F3FD5DE1}"/>
-                  </a:ext>
-                </a:extLst>
-              </p:cNvPr>
-              <p:cNvCxnSpPr>
-                <a:cxnSpLocks/>
-              </p:cNvCxnSpPr>
-              <p:nvPr/>
-            </p:nvCxnSpPr>
-            <p:spPr>
-              <a:xfrm flipV="1">
-                <a:off x="2444024" y="1798320"/>
-                <a:ext cx="626836" cy="648248"/>
-              </a:xfrm>
-              <a:prstGeom prst="line">
-                <a:avLst/>
-              </a:prstGeom>
-              <a:ln w="101600" cap="rnd">
-                <a:solidFill>
-                  <a:srgbClr val="CC3300"/>
-                </a:solidFill>
-                <a:bevel/>
-              </a:ln>
-            </p:spPr>
-            <p:style>
-              <a:lnRef idx="1">
-                <a:schemeClr val="dk1"/>
-              </a:lnRef>
-              <a:fillRef idx="0">
-                <a:schemeClr val="dk1"/>
-              </a:fillRef>
-              <a:effectRef idx="0">
-                <a:schemeClr val="dk1"/>
-              </a:effectRef>
-              <a:fontRef idx="minor">
-                <a:schemeClr val="tx1"/>
-              </a:fontRef>
-            </p:style>
-          </p:cxnSp>
-          <p:cxnSp>
-            <p:nvCxnSpPr>
-              <p:cNvPr id="69" name="Gerader Verbinder 68">
-                <a:extLst>
-                  <a:ext uri="{FF2B5EF4-FFF2-40B4-BE49-F238E27FC236}">
-                    <a16:creationId xmlns:a16="http://schemas.microsoft.com/office/drawing/2014/main" id="{300BE4E0-89C4-47E9-8E93-0AE23F5380F7}"/>
-                  </a:ext>
-                </a:extLst>
-              </p:cNvPr>
-              <p:cNvCxnSpPr>
-                <a:cxnSpLocks/>
-              </p:cNvCxnSpPr>
-              <p:nvPr/>
-            </p:nvCxnSpPr>
-            <p:spPr>
-              <a:xfrm flipH="1" flipV="1">
-                <a:off x="2444024" y="1798320"/>
-                <a:ext cx="626836" cy="648248"/>
-              </a:xfrm>
-              <a:prstGeom prst="line">
-                <a:avLst/>
-              </a:prstGeom>
-              <a:ln w="101600" cap="rnd">
-                <a:solidFill>
-                  <a:srgbClr val="CC3300"/>
-                </a:solidFill>
-                <a:bevel/>
-              </a:ln>
-            </p:spPr>
-            <p:style>
-              <a:lnRef idx="1">
-                <a:schemeClr val="dk1"/>
-              </a:lnRef>
-              <a:fillRef idx="0">
-                <a:schemeClr val="dk1"/>
-              </a:fillRef>
-              <a:effectRef idx="0">
-                <a:schemeClr val="dk1"/>
-              </a:effectRef>
-              <a:fontRef idx="minor">
-                <a:schemeClr val="tx1"/>
-              </a:fontRef>
-            </p:style>
-          </p:cxnSp>
-        </p:grpSp>
-        <p:grpSp>
-          <p:nvGrpSpPr>
-            <p:cNvPr id="70" name="Gruppieren 69">
-              <a:extLst>
-                <a:ext uri="{FF2B5EF4-FFF2-40B4-BE49-F238E27FC236}">
-                  <a16:creationId xmlns:a16="http://schemas.microsoft.com/office/drawing/2014/main" id="{B46F0684-EBBA-4097-9406-FDD837DFA5C9}"/>
-                </a:ext>
-              </a:extLst>
-            </p:cNvPr>
-            <p:cNvGrpSpPr>
-              <a:grpSpLocks noChangeAspect="1"/>
-            </p:cNvGrpSpPr>
-            <p:nvPr/>
-          </p:nvGrpSpPr>
-          <p:grpSpPr>
-            <a:xfrm rot="21072129">
-              <a:off x="6718305" y="4312671"/>
-              <a:ext cx="539071" cy="557484"/>
-              <a:chOff x="2444024" y="1798320"/>
-              <a:chExt cx="626836" cy="648248"/>
-            </a:xfrm>
-          </p:grpSpPr>
-          <p:cxnSp>
-            <p:nvCxnSpPr>
-              <p:cNvPr id="71" name="Gerader Verbinder 70">
-                <a:extLst>
-                  <a:ext uri="{FF2B5EF4-FFF2-40B4-BE49-F238E27FC236}">
-                    <a16:creationId xmlns:a16="http://schemas.microsoft.com/office/drawing/2014/main" id="{513DCAB0-05DA-47FD-AC36-82ABA51A77E6}"/>
-                  </a:ext>
-                </a:extLst>
-              </p:cNvPr>
-              <p:cNvCxnSpPr>
-                <a:cxnSpLocks/>
-              </p:cNvCxnSpPr>
-              <p:nvPr/>
-            </p:nvCxnSpPr>
-            <p:spPr>
-              <a:xfrm flipV="1">
-                <a:off x="2444024" y="1798320"/>
-                <a:ext cx="626836" cy="648248"/>
-              </a:xfrm>
-              <a:prstGeom prst="line">
-                <a:avLst/>
-              </a:prstGeom>
-              <a:ln w="101600" cap="rnd">
-                <a:solidFill>
-                  <a:srgbClr val="CC3300"/>
-                </a:solidFill>
-                <a:bevel/>
-              </a:ln>
-            </p:spPr>
-            <p:style>
-              <a:lnRef idx="1">
-                <a:schemeClr val="dk1"/>
-              </a:lnRef>
-              <a:fillRef idx="0">
-                <a:schemeClr val="dk1"/>
-              </a:fillRef>
-              <a:effectRef idx="0">
-                <a:schemeClr val="dk1"/>
-              </a:effectRef>
-              <a:fontRef idx="minor">
-                <a:schemeClr val="tx1"/>
-              </a:fontRef>
-            </p:style>
-          </p:cxnSp>
-          <p:cxnSp>
-            <p:nvCxnSpPr>
-              <p:cNvPr id="72" name="Gerader Verbinder 71">
-                <a:extLst>
-                  <a:ext uri="{FF2B5EF4-FFF2-40B4-BE49-F238E27FC236}">
-                    <a16:creationId xmlns:a16="http://schemas.microsoft.com/office/drawing/2014/main" id="{303E3FE9-83FB-49DC-9323-E0AC8A979E92}"/>
-                  </a:ext>
-                </a:extLst>
-              </p:cNvPr>
-              <p:cNvCxnSpPr>
-                <a:cxnSpLocks/>
-              </p:cNvCxnSpPr>
-              <p:nvPr/>
-            </p:nvCxnSpPr>
-            <p:spPr>
-              <a:xfrm flipH="1" flipV="1">
-                <a:off x="2444024" y="1798320"/>
-                <a:ext cx="626836" cy="648248"/>
-              </a:xfrm>
-              <a:prstGeom prst="line">
-                <a:avLst/>
-              </a:prstGeom>
-              <a:ln w="101600" cap="rnd">
-                <a:solidFill>
-                  <a:srgbClr val="CC3300"/>
-                </a:solidFill>
-                <a:bevel/>
-              </a:ln>
-            </p:spPr>
-            <p:style>
-              <a:lnRef idx="1">
-                <a:schemeClr val="dk1"/>
-              </a:lnRef>
-              <a:fillRef idx="0">
-                <a:schemeClr val="dk1"/>
-              </a:fillRef>
-              <a:effectRef idx="0">
-                <a:schemeClr val="dk1"/>
-              </a:effectRef>
-              <a:fontRef idx="minor">
-                <a:schemeClr val="tx1"/>
-              </a:fontRef>
-            </p:style>
-          </p:cxnSp>
-        </p:grpSp>
+            <a:prstGeom prst="line">
+              <a:avLst/>
+            </a:prstGeom>
+            <a:ln w="101600" cap="rnd">
+              <a:solidFill>
+                <a:srgbClr val="F0C267"/>
+              </a:solidFill>
+              <a:bevel/>
+            </a:ln>
+          </p:spPr>
+          <p:style>
+            <a:lnRef idx="1">
+              <a:schemeClr val="dk1"/>
+            </a:lnRef>
+            <a:fillRef idx="0">
+              <a:schemeClr val="dk1"/>
+            </a:fillRef>
+            <a:effectRef idx="0">
+              <a:schemeClr val="dk1"/>
+            </a:effectRef>
+            <a:fontRef idx="minor">
+              <a:schemeClr val="tx1"/>
+            </a:fontRef>
+          </p:style>
+        </p:cxnSp>
       </p:grpSp>
     </p:spTree>
     <p:extLst>

</xml_diff>